<commit_message>
Added thank you slide
</commit_message>
<xml_diff>
--- a/SCaRArcade.pptx
+++ b/SCaRArcade.pptx
@@ -11,6 +11,7 @@
     <p:sldId id="261" r:id="rId5"/>
     <p:sldId id="262" r:id="rId6"/>
     <p:sldId id="263" r:id="rId7"/>
+    <p:sldId id="266" r:id="rId8"/>
   </p:sldIdLst>
   <p:sldSz cx="12192000" cy="6858000"/>
   <p:notesSz cx="6858000" cy="9144000"/>
@@ -109,6 +110,11 @@
       </a:defRPr>
     </a:lvl9pPr>
   </p:defaultTextStyle>
+  <p:extLst>
+    <p:ext uri="{EFAFB233-063F-42B5-8137-9DF3F51BA10A}">
+      <p15:sldGuideLst xmlns:p15="http://schemas.microsoft.com/office/powerpoint/2012/main"/>
+    </p:ext>
+  </p:extLst>
 </p:presentation>
 </file>
 
@@ -4388,7 +4394,7 @@
           <a:p>
             <a:fld id="{48A87A34-81AB-432B-8DAE-1953F412C126}" type="datetimeFigureOut">
               <a:rPr lang="en-US" dirty="0"/>
-              <a:t>3/13/2017</a:t>
+              <a:t>13-Mar-17</a:t>
             </a:fld>
             <a:endParaRPr lang="en-US" dirty="0"/>
           </a:p>
@@ -4650,7 +4656,7 @@
           <a:p>
             <a:fld id="{48A87A34-81AB-432B-8DAE-1953F412C126}" type="datetimeFigureOut">
               <a:rPr lang="en-US" dirty="0"/>
-              <a:t>3/13/2017</a:t>
+              <a:t>13-Mar-17</a:t>
             </a:fld>
             <a:endParaRPr lang="en-US" dirty="0"/>
           </a:p>
@@ -4841,7 +4847,7 @@
           <a:p>
             <a:fld id="{48A87A34-81AB-432B-8DAE-1953F412C126}" type="datetimeFigureOut">
               <a:rPr lang="en-US" dirty="0"/>
-              <a:t>3/13/2017</a:t>
+              <a:t>13-Mar-17</a:t>
             </a:fld>
             <a:endParaRPr lang="en-US" dirty="0"/>
           </a:p>
@@ -5099,7 +5105,7 @@
           <a:p>
             <a:fld id="{48A87A34-81AB-432B-8DAE-1953F412C126}" type="datetimeFigureOut">
               <a:rPr lang="en-US" dirty="0"/>
-              <a:t>3/13/2017</a:t>
+              <a:t>13-Mar-17</a:t>
             </a:fld>
             <a:endParaRPr lang="en-US" dirty="0"/>
           </a:p>
@@ -5528,7 +5534,7 @@
           <a:p>
             <a:fld id="{48A87A34-81AB-432B-8DAE-1953F412C126}" type="datetimeFigureOut">
               <a:rPr lang="en-US" dirty="0"/>
-              <a:t>3/13/2017</a:t>
+              <a:t>13-Mar-17</a:t>
             </a:fld>
             <a:endParaRPr lang="en-US" dirty="0"/>
           </a:p>
@@ -6069,7 +6075,7 @@
           <a:p>
             <a:fld id="{48A87A34-81AB-432B-8DAE-1953F412C126}" type="datetimeFigureOut">
               <a:rPr lang="en-US" dirty="0"/>
-              <a:t>3/13/2017</a:t>
+              <a:t>13-Mar-17</a:t>
             </a:fld>
             <a:endParaRPr lang="en-US" dirty="0"/>
           </a:p>
@@ -6784,7 +6790,7 @@
           <a:p>
             <a:fld id="{48A87A34-81AB-432B-8DAE-1953F412C126}" type="datetimeFigureOut">
               <a:rPr lang="en-US" dirty="0"/>
-              <a:t>3/13/2017</a:t>
+              <a:t>13-Mar-17</a:t>
             </a:fld>
             <a:endParaRPr lang="en-US" dirty="0"/>
           </a:p>
@@ -6949,7 +6955,7 @@
           <a:p>
             <a:fld id="{48A87A34-81AB-432B-8DAE-1953F412C126}" type="datetimeFigureOut">
               <a:rPr lang="en-US" dirty="0"/>
-              <a:t>3/13/2017</a:t>
+              <a:t>13-Mar-17</a:t>
             </a:fld>
             <a:endParaRPr lang="en-US" dirty="0"/>
           </a:p>
@@ -7124,7 +7130,7 @@
           <a:p>
             <a:fld id="{48A87A34-81AB-432B-8DAE-1953F412C126}" type="datetimeFigureOut">
               <a:rPr lang="en-US" dirty="0"/>
-              <a:t>3/13/2017</a:t>
+              <a:t>13-Mar-17</a:t>
             </a:fld>
             <a:endParaRPr lang="en-US" dirty="0"/>
           </a:p>
@@ -7289,7 +7295,7 @@
           <a:p>
             <a:fld id="{48A87A34-81AB-432B-8DAE-1953F412C126}" type="datetimeFigureOut">
               <a:rPr lang="en-US" dirty="0"/>
-              <a:t>3/13/2017</a:t>
+              <a:t>13-Mar-17</a:t>
             </a:fld>
             <a:endParaRPr lang="en-US" dirty="0"/>
           </a:p>
@@ -7534,7 +7540,7 @@
           <a:p>
             <a:fld id="{48A87A34-81AB-432B-8DAE-1953F412C126}" type="datetimeFigureOut">
               <a:rPr lang="en-US" dirty="0"/>
-              <a:t>3/13/2017</a:t>
+              <a:t>13-Mar-17</a:t>
             </a:fld>
             <a:endParaRPr lang="en-US" dirty="0"/>
           </a:p>
@@ -7761,7 +7767,7 @@
           <a:p>
             <a:fld id="{48A87A34-81AB-432B-8DAE-1953F412C126}" type="datetimeFigureOut">
               <a:rPr lang="en-US" dirty="0"/>
-              <a:t>3/13/2017</a:t>
+              <a:t>13-Mar-17</a:t>
             </a:fld>
             <a:endParaRPr lang="en-US" dirty="0"/>
           </a:p>
@@ -8137,7 +8143,7 @@
           <a:p>
             <a:fld id="{48A87A34-81AB-432B-8DAE-1953F412C126}" type="datetimeFigureOut">
               <a:rPr lang="en-US" dirty="0"/>
-              <a:t>3/13/2017</a:t>
+              <a:t>13-Mar-17</a:t>
             </a:fld>
             <a:endParaRPr lang="en-US" dirty="0"/>
           </a:p>
@@ -8250,7 +8256,7 @@
           <a:p>
             <a:fld id="{48A87A34-81AB-432B-8DAE-1953F412C126}" type="datetimeFigureOut">
               <a:rPr lang="en-US" dirty="0"/>
-              <a:t>3/13/2017</a:t>
+              <a:t>13-Mar-17</a:t>
             </a:fld>
             <a:endParaRPr lang="en-US" dirty="0"/>
           </a:p>
@@ -8340,7 +8346,7 @@
           <a:p>
             <a:fld id="{48A87A34-81AB-432B-8DAE-1953F412C126}" type="datetimeFigureOut">
               <a:rPr lang="en-US" dirty="0"/>
-              <a:t>3/13/2017</a:t>
+              <a:t>13-Mar-17</a:t>
             </a:fld>
             <a:endParaRPr lang="en-US" dirty="0"/>
           </a:p>
@@ -8584,7 +8590,7 @@
           <a:p>
             <a:fld id="{48A87A34-81AB-432B-8DAE-1953F412C126}" type="datetimeFigureOut">
               <a:rPr lang="en-US" dirty="0"/>
-              <a:t>3/13/2017</a:t>
+              <a:t>13-Mar-17</a:t>
             </a:fld>
             <a:endParaRPr lang="en-US" dirty="0"/>
           </a:p>
@@ -8859,7 +8865,7 @@
           <a:p>
             <a:fld id="{48A87A34-81AB-432B-8DAE-1953F412C126}" type="datetimeFigureOut">
               <a:rPr lang="en-US" dirty="0"/>
-              <a:t>3/13/2017</a:t>
+              <a:t>13-Mar-17</a:t>
             </a:fld>
             <a:endParaRPr lang="en-US" dirty="0"/>
           </a:p>
@@ -11932,7 +11938,7 @@
             <a:fld id="{48A87A34-81AB-432B-8DAE-1953F412C126}" type="datetimeFigureOut">
               <a:rPr lang="en-US" dirty="0"/>
               <a:pPr/>
-              <a:t>3/13/2017</a:t>
+              <a:t>13-Mar-17</a:t>
             </a:fld>
             <a:endParaRPr lang="en-US" dirty="0"/>
           </a:p>
@@ -12387,7 +12393,7 @@
           <a:p>
             <a:r>
               <a:rPr lang="en-US" dirty="0"/>
-              <a:t>Presented by Saxon, Charlie, and Ryan.</a:t>
+              <a:t>Presented by Saxon, Charles, and Ryan.</a:t>
             </a:r>
           </a:p>
         </p:txBody>
@@ -12591,11 +12597,7 @@
           <a:p>
             <a:r>
               <a:rPr lang="en-US" dirty="0"/>
-              <a:t>Grid layout with clickable buttons to run a specific </a:t>
-            </a:r>
-            <a:r>
-              <a:rPr lang="en-US"/>
-              <a:t>game.</a:t>
+              <a:t>Grid layout with clickable buttons to run a specific game.</a:t>
             </a:r>
           </a:p>
           <a:p>
@@ -12826,6 +12828,77 @@
     <p:extLst>
       <p:ext uri="{BB962C8B-B14F-4D97-AF65-F5344CB8AC3E}">
         <p14:creationId xmlns:p14="http://schemas.microsoft.com/office/powerpoint/2010/main" val="3153339232"/>
+      </p:ext>
+    </p:extLst>
+  </p:cSld>
+  <p:clrMapOvr>
+    <a:masterClrMapping/>
+  </p:clrMapOvr>
+</p:sld>
+</file>
+
+<file path=ppt/slides/slide7.xml><?xml version="1.0" encoding="utf-8"?>
+<p:sld xmlns:a="http://schemas.openxmlformats.org/drawingml/2006/main" xmlns:r="http://schemas.openxmlformats.org/officeDocument/2006/relationships" xmlns:p="http://schemas.openxmlformats.org/presentationml/2006/main">
+  <p:cSld>
+    <p:spTree>
+      <p:nvGrpSpPr>
+        <p:cNvPr id="1" name=""/>
+        <p:cNvGrpSpPr/>
+        <p:nvPr/>
+      </p:nvGrpSpPr>
+      <p:grpSpPr>
+        <a:xfrm>
+          <a:off x="0" y="0"/>
+          <a:ext cx="0" cy="0"/>
+          <a:chOff x="0" y="0"/>
+          <a:chExt cx="0" cy="0"/>
+        </a:xfrm>
+      </p:grpSpPr>
+      <p:sp>
+        <p:nvSpPr>
+          <p:cNvPr id="2" name="Title 1"/>
+          <p:cNvSpPr>
+            <a:spLocks noGrp="1"/>
+          </p:cNvSpPr>
+          <p:nvPr>
+            <p:ph type="ctrTitle"/>
+          </p:nvPr>
+        </p:nvSpPr>
+        <p:spPr/>
+        <p:txBody>
+          <a:bodyPr/>
+          <a:lstStyle/>
+          <a:p>
+            <a:r>
+              <a:rPr lang="en-US" dirty="0"/>
+              <a:t>THANK YOU.</a:t>
+            </a:r>
+          </a:p>
+        </p:txBody>
+      </p:sp>
+      <p:sp>
+        <p:nvSpPr>
+          <p:cNvPr id="3" name="Subtitle 2"/>
+          <p:cNvSpPr>
+            <a:spLocks noGrp="1"/>
+          </p:cNvSpPr>
+          <p:nvPr>
+            <p:ph type="subTitle" idx="1"/>
+          </p:nvPr>
+        </p:nvSpPr>
+        <p:spPr/>
+        <p:txBody>
+          <a:bodyPr/>
+          <a:lstStyle/>
+          <a:p>
+            <a:endParaRPr lang="en-US"/>
+          </a:p>
+        </p:txBody>
+      </p:sp>
+    </p:spTree>
+    <p:extLst>
+      <p:ext uri="{BB962C8B-B14F-4D97-AF65-F5344CB8AC3E}">
+        <p14:creationId xmlns:p14="http://schemas.microsoft.com/office/powerpoint/2010/main" val="1172278888"/>
       </p:ext>
     </p:extLst>
   </p:cSld>

</xml_diff>

<commit_message>
Update SCaR_Arcade week 6 presentation
Explained a bit more about what we are doing and why. Explained the game
selection interface more deeply, drafted a design of the generic game
menu, and added a few more skeletons of possibly relevant slides.
</commit_message>
<xml_diff>
--- a/SCaRArcade.pptx
+++ b/SCaRArcade.pptx
@@ -7,11 +7,15 @@
   <p:sldIdLst>
     <p:sldId id="256" r:id="rId2"/>
     <p:sldId id="260" r:id="rId3"/>
-    <p:sldId id="265" r:id="rId4"/>
-    <p:sldId id="261" r:id="rId5"/>
-    <p:sldId id="262" r:id="rId6"/>
-    <p:sldId id="263" r:id="rId7"/>
-    <p:sldId id="266" r:id="rId8"/>
+    <p:sldId id="267" r:id="rId4"/>
+    <p:sldId id="265" r:id="rId5"/>
+    <p:sldId id="268" r:id="rId6"/>
+    <p:sldId id="269" r:id="rId7"/>
+    <p:sldId id="261" r:id="rId8"/>
+    <p:sldId id="262" r:id="rId9"/>
+    <p:sldId id="263" r:id="rId10"/>
+    <p:sldId id="270" r:id="rId11"/>
+    <p:sldId id="266" r:id="rId12"/>
   </p:sldIdLst>
   <p:sldSz cx="12192000" cy="6858000"/>
   <p:notesSz cx="6858000" cy="9144000"/>
@@ -168,7 +172,7 @@
           <a:noFill/>
           <a:extLst>
             <a:ext uri="{909E8E84-426E-40dd-AFC4-6F175D3DCCD1}">
-              <a14:hiddenFill xmlns:a14="http://schemas.microsoft.com/office/drawing/2010/main" xmlns="">
+              <a14:hiddenFill xmlns="" xmlns:a14="http://schemas.microsoft.com/office/drawing/2010/main">
                 <a:solidFill>
                   <a:srgbClr val="FFFFFF"/>
                 </a:solidFill>
@@ -228,7 +232,7 @@
             </a:ln>
             <a:extLst>
               <a:ext uri="{91240B29-F687-4f45-9708-019B960494DF}">
-                <a14:hiddenLine xmlns:a14="http://schemas.microsoft.com/office/drawing/2010/main" xmlns="" w="9525">
+                <a14:hiddenLine xmlns="" xmlns:a14="http://schemas.microsoft.com/office/drawing/2010/main" w="9525">
                   <a:solidFill>
                     <a:srgbClr val="000000"/>
                   </a:solidFill>
@@ -318,7 +322,7 @@
             </a:ln>
             <a:extLst>
               <a:ext uri="{91240B29-F687-4f45-9708-019B960494DF}">
-                <a14:hiddenLine xmlns:a14="http://schemas.microsoft.com/office/drawing/2010/main" xmlns="" w="9525">
+                <a14:hiddenLine xmlns="" xmlns:a14="http://schemas.microsoft.com/office/drawing/2010/main" w="9525">
                   <a:solidFill>
                     <a:srgbClr val="000000"/>
                   </a:solidFill>
@@ -408,7 +412,7 @@
             </a:ln>
             <a:extLst>
               <a:ext uri="{91240B29-F687-4f45-9708-019B960494DF}">
-                <a14:hiddenLine xmlns:a14="http://schemas.microsoft.com/office/drawing/2010/main" xmlns="" w="9525">
+                <a14:hiddenLine xmlns="" xmlns:a14="http://schemas.microsoft.com/office/drawing/2010/main" w="9525">
                   <a:solidFill>
                     <a:srgbClr val="000000"/>
                   </a:solidFill>
@@ -442,7 +446,7 @@
             </a:ln>
             <a:extLst>
               <a:ext uri="{91240B29-F687-4f45-9708-019B960494DF}">
-                <a14:hiddenLine xmlns:a14="http://schemas.microsoft.com/office/drawing/2010/main" xmlns="" w="9525">
+                <a14:hiddenLine xmlns="" xmlns:a14="http://schemas.microsoft.com/office/drawing/2010/main" w="9525">
                   <a:solidFill>
                     <a:srgbClr val="000000"/>
                   </a:solidFill>
@@ -532,7 +536,7 @@
             </a:ln>
             <a:extLst>
               <a:ext uri="{91240B29-F687-4f45-9708-019B960494DF}">
-                <a14:hiddenLine xmlns:a14="http://schemas.microsoft.com/office/drawing/2010/main" xmlns="" w="9525">
+                <a14:hiddenLine xmlns="" xmlns:a14="http://schemas.microsoft.com/office/drawing/2010/main" w="9525">
                   <a:solidFill>
                     <a:srgbClr val="000000"/>
                   </a:solidFill>
@@ -594,7 +598,7 @@
             </a:ln>
             <a:extLst>
               <a:ext uri="{91240B29-F687-4f45-9708-019B960494DF}">
-                <a14:hiddenLine xmlns:a14="http://schemas.microsoft.com/office/drawing/2010/main" xmlns="" w="9525">
+                <a14:hiddenLine xmlns="" xmlns:a14="http://schemas.microsoft.com/office/drawing/2010/main" w="9525">
                   <a:solidFill>
                     <a:srgbClr val="000000"/>
                   </a:solidFill>
@@ -656,7 +660,7 @@
             </a:ln>
             <a:extLst>
               <a:ext uri="{91240B29-F687-4f45-9708-019B960494DF}">
-                <a14:hiddenLine xmlns:a14="http://schemas.microsoft.com/office/drawing/2010/main" xmlns="" w="9525">
+                <a14:hiddenLine xmlns="" xmlns:a14="http://schemas.microsoft.com/office/drawing/2010/main" w="9525">
                   <a:solidFill>
                     <a:srgbClr val="000000"/>
                   </a:solidFill>
@@ -746,7 +750,7 @@
             </a:ln>
             <a:extLst>
               <a:ext uri="{91240B29-F687-4f45-9708-019B960494DF}">
-                <a14:hiddenLine xmlns:a14="http://schemas.microsoft.com/office/drawing/2010/main" xmlns="" w="9525">
+                <a14:hiddenLine xmlns="" xmlns:a14="http://schemas.microsoft.com/office/drawing/2010/main" w="9525">
                   <a:solidFill>
                     <a:srgbClr val="000000"/>
                   </a:solidFill>
@@ -808,7 +812,7 @@
             </a:ln>
             <a:extLst>
               <a:ext uri="{91240B29-F687-4f45-9708-019B960494DF}">
-                <a14:hiddenLine xmlns:a14="http://schemas.microsoft.com/office/drawing/2010/main" xmlns="" w="9525">
+                <a14:hiddenLine xmlns="" xmlns:a14="http://schemas.microsoft.com/office/drawing/2010/main" w="9525">
                   <a:solidFill>
                     <a:srgbClr val="000000"/>
                   </a:solidFill>
@@ -870,7 +874,7 @@
             </a:ln>
             <a:extLst>
               <a:ext uri="{91240B29-F687-4f45-9708-019B960494DF}">
-                <a14:hiddenLine xmlns:a14="http://schemas.microsoft.com/office/drawing/2010/main" xmlns="" w="9525">
+                <a14:hiddenLine xmlns="" xmlns:a14="http://schemas.microsoft.com/office/drawing/2010/main" w="9525">
                   <a:solidFill>
                     <a:srgbClr val="000000"/>
                   </a:solidFill>
@@ -960,7 +964,7 @@
             </a:ln>
             <a:extLst>
               <a:ext uri="{91240B29-F687-4f45-9708-019B960494DF}">
-                <a14:hiddenLine xmlns:a14="http://schemas.microsoft.com/office/drawing/2010/main" xmlns="" w="9525">
+                <a14:hiddenLine xmlns="" xmlns:a14="http://schemas.microsoft.com/office/drawing/2010/main" w="9525">
                   <a:solidFill>
                     <a:srgbClr val="000000"/>
                   </a:solidFill>
@@ -1050,7 +1054,7 @@
             </a:ln>
             <a:extLst>
               <a:ext uri="{91240B29-F687-4f45-9708-019B960494DF}">
-                <a14:hiddenLine xmlns:a14="http://schemas.microsoft.com/office/drawing/2010/main" xmlns="" w="9525">
+                <a14:hiddenLine xmlns="" xmlns:a14="http://schemas.microsoft.com/office/drawing/2010/main" w="9525">
                   <a:solidFill>
                     <a:srgbClr val="000000"/>
                   </a:solidFill>
@@ -1112,7 +1116,7 @@
             </a:ln>
             <a:extLst>
               <a:ext uri="{91240B29-F687-4f45-9708-019B960494DF}">
-                <a14:hiddenLine xmlns:a14="http://schemas.microsoft.com/office/drawing/2010/main" xmlns="" w="9525">
+                <a14:hiddenLine xmlns="" xmlns:a14="http://schemas.microsoft.com/office/drawing/2010/main" w="9525">
                   <a:solidFill>
                     <a:srgbClr val="000000"/>
                   </a:solidFill>
@@ -1222,7 +1226,7 @@
             </a:ln>
             <a:extLst>
               <a:ext uri="{91240B29-F687-4f45-9708-019B960494DF}">
-                <a14:hiddenLine xmlns:a14="http://schemas.microsoft.com/office/drawing/2010/main" xmlns="" w="9525">
+                <a14:hiddenLine xmlns="" xmlns:a14="http://schemas.microsoft.com/office/drawing/2010/main" w="9525">
                   <a:solidFill>
                     <a:srgbClr val="000000"/>
                   </a:solidFill>
@@ -1284,7 +1288,7 @@
             </a:ln>
             <a:extLst>
               <a:ext uri="{91240B29-F687-4f45-9708-019B960494DF}">
-                <a14:hiddenLine xmlns:a14="http://schemas.microsoft.com/office/drawing/2010/main" xmlns="" w="9525">
+                <a14:hiddenLine xmlns="" xmlns:a14="http://schemas.microsoft.com/office/drawing/2010/main" w="9525">
                   <a:solidFill>
                     <a:srgbClr val="000000"/>
                   </a:solidFill>
@@ -1374,7 +1378,7 @@
             </a:ln>
             <a:extLst>
               <a:ext uri="{91240B29-F687-4f45-9708-019B960494DF}">
-                <a14:hiddenLine xmlns:a14="http://schemas.microsoft.com/office/drawing/2010/main" xmlns="" w="9525">
+                <a14:hiddenLine xmlns="" xmlns:a14="http://schemas.microsoft.com/office/drawing/2010/main" w="9525">
                   <a:solidFill>
                     <a:srgbClr val="000000"/>
                   </a:solidFill>
@@ -1464,7 +1468,7 @@
             </a:ln>
             <a:extLst>
               <a:ext uri="{91240B29-F687-4f45-9708-019B960494DF}">
-                <a14:hiddenLine xmlns:a14="http://schemas.microsoft.com/office/drawing/2010/main" xmlns="" w="9525">
+                <a14:hiddenLine xmlns="" xmlns:a14="http://schemas.microsoft.com/office/drawing/2010/main" w="9525">
                   <a:solidFill>
                     <a:srgbClr val="000000"/>
                   </a:solidFill>
@@ -1526,7 +1530,7 @@
             </a:ln>
             <a:extLst>
               <a:ext uri="{91240B29-F687-4f45-9708-019B960494DF}">
-                <a14:hiddenLine xmlns:a14="http://schemas.microsoft.com/office/drawing/2010/main" xmlns="" w="9525">
+                <a14:hiddenLine xmlns="" xmlns:a14="http://schemas.microsoft.com/office/drawing/2010/main" w="9525">
                   <a:solidFill>
                     <a:srgbClr val="000000"/>
                   </a:solidFill>
@@ -1616,7 +1620,7 @@
             </a:ln>
             <a:extLst>
               <a:ext uri="{91240B29-F687-4f45-9708-019B960494DF}">
-                <a14:hiddenLine xmlns:a14="http://schemas.microsoft.com/office/drawing/2010/main" xmlns="" w="9525">
+                <a14:hiddenLine xmlns="" xmlns:a14="http://schemas.microsoft.com/office/drawing/2010/main" w="9525">
                   <a:solidFill>
                     <a:srgbClr val="000000"/>
                   </a:solidFill>
@@ -1706,7 +1710,7 @@
             </a:ln>
             <a:extLst>
               <a:ext uri="{91240B29-F687-4f45-9708-019B960494DF}">
-                <a14:hiddenLine xmlns:a14="http://schemas.microsoft.com/office/drawing/2010/main" xmlns="" w="9525">
+                <a14:hiddenLine xmlns="" xmlns:a14="http://schemas.microsoft.com/office/drawing/2010/main" w="9525">
                   <a:solidFill>
                     <a:srgbClr val="000000"/>
                   </a:solidFill>
@@ -1762,7 +1766,7 @@
             </a:ln>
             <a:extLst>
               <a:ext uri="{91240B29-F687-4f45-9708-019B960494DF}">
-                <a14:hiddenLine xmlns:a14="http://schemas.microsoft.com/office/drawing/2010/main" xmlns="" w="9525">
+                <a14:hiddenLine xmlns="" xmlns:a14="http://schemas.microsoft.com/office/drawing/2010/main" w="9525">
                   <a:solidFill>
                     <a:srgbClr val="000000"/>
                   </a:solidFill>
@@ -1852,7 +1856,7 @@
             </a:ln>
             <a:extLst>
               <a:ext uri="{91240B29-F687-4f45-9708-019B960494DF}">
-                <a14:hiddenLine xmlns:a14="http://schemas.microsoft.com/office/drawing/2010/main" xmlns="" w="9525">
+                <a14:hiddenLine xmlns="" xmlns:a14="http://schemas.microsoft.com/office/drawing/2010/main" w="9525">
                   <a:solidFill>
                     <a:srgbClr val="000000"/>
                   </a:solidFill>
@@ -1908,7 +1912,7 @@
             </a:ln>
             <a:extLst>
               <a:ext uri="{91240B29-F687-4f45-9708-019B960494DF}">
-                <a14:hiddenLine xmlns:a14="http://schemas.microsoft.com/office/drawing/2010/main" xmlns="" w="9525">
+                <a14:hiddenLine xmlns="" xmlns:a14="http://schemas.microsoft.com/office/drawing/2010/main" w="9525">
                   <a:solidFill>
                     <a:srgbClr val="000000"/>
                   </a:solidFill>
@@ -1998,7 +2002,7 @@
             </a:ln>
             <a:extLst>
               <a:ext uri="{91240B29-F687-4f45-9708-019B960494DF}">
-                <a14:hiddenLine xmlns:a14="http://schemas.microsoft.com/office/drawing/2010/main" xmlns="" w="9525">
+                <a14:hiddenLine xmlns="" xmlns:a14="http://schemas.microsoft.com/office/drawing/2010/main" w="9525">
                   <a:solidFill>
                     <a:srgbClr val="000000"/>
                   </a:solidFill>
@@ -2066,7 +2070,7 @@
             </a:ln>
             <a:extLst>
               <a:ext uri="{91240B29-F687-4f45-9708-019B960494DF}">
-                <a14:hiddenLine xmlns:a14="http://schemas.microsoft.com/office/drawing/2010/main" xmlns="" w="9525">
+                <a14:hiddenLine xmlns="" xmlns:a14="http://schemas.microsoft.com/office/drawing/2010/main" w="9525">
                   <a:solidFill>
                     <a:srgbClr val="000000"/>
                   </a:solidFill>
@@ -2156,7 +2160,7 @@
             </a:ln>
             <a:extLst>
               <a:ext uri="{91240B29-F687-4f45-9708-019B960494DF}">
-                <a14:hiddenLine xmlns:a14="http://schemas.microsoft.com/office/drawing/2010/main" xmlns="" w="9525">
+                <a14:hiddenLine xmlns="" xmlns:a14="http://schemas.microsoft.com/office/drawing/2010/main" w="9525">
                   <a:solidFill>
                     <a:srgbClr val="000000"/>
                   </a:solidFill>
@@ -2224,7 +2228,7 @@
             </a:ln>
             <a:extLst>
               <a:ext uri="{91240B29-F687-4f45-9708-019B960494DF}">
-                <a14:hiddenLine xmlns:a14="http://schemas.microsoft.com/office/drawing/2010/main" xmlns="" w="9525">
+                <a14:hiddenLine xmlns="" xmlns:a14="http://schemas.microsoft.com/office/drawing/2010/main" w="9525">
                   <a:solidFill>
                     <a:srgbClr val="000000"/>
                   </a:solidFill>
@@ -2314,7 +2318,7 @@
             </a:ln>
             <a:extLst>
               <a:ext uri="{91240B29-F687-4f45-9708-019B960494DF}">
-                <a14:hiddenLine xmlns:a14="http://schemas.microsoft.com/office/drawing/2010/main" xmlns="" w="9525">
+                <a14:hiddenLine xmlns="" xmlns:a14="http://schemas.microsoft.com/office/drawing/2010/main" w="9525">
                   <a:solidFill>
                     <a:srgbClr val="000000"/>
                   </a:solidFill>
@@ -2348,7 +2352,7 @@
             </a:ln>
             <a:extLst>
               <a:ext uri="{91240B29-F687-4f45-9708-019B960494DF}">
-                <a14:hiddenLine xmlns:a14="http://schemas.microsoft.com/office/drawing/2010/main" xmlns="" w="9525">
+                <a14:hiddenLine xmlns="" xmlns:a14="http://schemas.microsoft.com/office/drawing/2010/main" w="9525">
                   <a:solidFill>
                     <a:srgbClr val="000000"/>
                   </a:solidFill>
@@ -2438,7 +2442,7 @@
             </a:ln>
             <a:extLst>
               <a:ext uri="{91240B29-F687-4f45-9708-019B960494DF}">
-                <a14:hiddenLine xmlns:a14="http://schemas.microsoft.com/office/drawing/2010/main" xmlns="" w="9525">
+                <a14:hiddenLine xmlns="" xmlns:a14="http://schemas.microsoft.com/office/drawing/2010/main" w="9525">
                   <a:solidFill>
                     <a:srgbClr val="000000"/>
                   </a:solidFill>
@@ -2500,7 +2504,7 @@
             </a:ln>
             <a:extLst>
               <a:ext uri="{91240B29-F687-4f45-9708-019B960494DF}">
-                <a14:hiddenLine xmlns:a14="http://schemas.microsoft.com/office/drawing/2010/main" xmlns="" w="9525">
+                <a14:hiddenLine xmlns="" xmlns:a14="http://schemas.microsoft.com/office/drawing/2010/main" w="9525">
                   <a:solidFill>
                     <a:srgbClr val="000000"/>
                   </a:solidFill>
@@ -2562,7 +2566,7 @@
             </a:ln>
             <a:extLst>
               <a:ext uri="{91240B29-F687-4f45-9708-019B960494DF}">
-                <a14:hiddenLine xmlns:a14="http://schemas.microsoft.com/office/drawing/2010/main" xmlns="" w="9525">
+                <a14:hiddenLine xmlns="" xmlns:a14="http://schemas.microsoft.com/office/drawing/2010/main" w="9525">
                   <a:solidFill>
                     <a:srgbClr val="000000"/>
                   </a:solidFill>
@@ -2652,7 +2656,7 @@
             </a:ln>
             <a:extLst>
               <a:ext uri="{91240B29-F687-4f45-9708-019B960494DF}">
-                <a14:hiddenLine xmlns:a14="http://schemas.microsoft.com/office/drawing/2010/main" xmlns="" w="9525">
+                <a14:hiddenLine xmlns="" xmlns:a14="http://schemas.microsoft.com/office/drawing/2010/main" w="9525">
                   <a:solidFill>
                     <a:srgbClr val="000000"/>
                   </a:solidFill>
@@ -2720,7 +2724,7 @@
             </a:ln>
             <a:extLst>
               <a:ext uri="{91240B29-F687-4f45-9708-019B960494DF}">
-                <a14:hiddenLine xmlns:a14="http://schemas.microsoft.com/office/drawing/2010/main" xmlns="" w="9525">
+                <a14:hiddenLine xmlns="" xmlns:a14="http://schemas.microsoft.com/office/drawing/2010/main" w="9525">
                   <a:solidFill>
                     <a:srgbClr val="000000"/>
                   </a:solidFill>
@@ -2782,7 +2786,7 @@
             </a:ln>
             <a:extLst>
               <a:ext uri="{91240B29-F687-4f45-9708-019B960494DF}">
-                <a14:hiddenLine xmlns:a14="http://schemas.microsoft.com/office/drawing/2010/main" xmlns="" w="9525">
+                <a14:hiddenLine xmlns="" xmlns:a14="http://schemas.microsoft.com/office/drawing/2010/main" w="9525">
                   <a:solidFill>
                     <a:srgbClr val="000000"/>
                   </a:solidFill>
@@ -2872,7 +2876,7 @@
             </a:ln>
             <a:extLst>
               <a:ext uri="{91240B29-F687-4f45-9708-019B960494DF}">
-                <a14:hiddenLine xmlns:a14="http://schemas.microsoft.com/office/drawing/2010/main" xmlns="" w="9525">
+                <a14:hiddenLine xmlns="" xmlns:a14="http://schemas.microsoft.com/office/drawing/2010/main" w="9525">
                   <a:solidFill>
                     <a:srgbClr val="000000"/>
                   </a:solidFill>
@@ -2934,7 +2938,7 @@
             </a:ln>
             <a:extLst>
               <a:ext uri="{91240B29-F687-4f45-9708-019B960494DF}">
-                <a14:hiddenLine xmlns:a14="http://schemas.microsoft.com/office/drawing/2010/main" xmlns="" w="9525">
+                <a14:hiddenLine xmlns="" xmlns:a14="http://schemas.microsoft.com/office/drawing/2010/main" w="9525">
                   <a:solidFill>
                     <a:srgbClr val="000000"/>
                   </a:solidFill>
@@ -3024,7 +3028,7 @@
             </a:ln>
             <a:extLst>
               <a:ext uri="{91240B29-F687-4f45-9708-019B960494DF}">
-                <a14:hiddenLine xmlns:a14="http://schemas.microsoft.com/office/drawing/2010/main" xmlns="" w="9525">
+                <a14:hiddenLine xmlns="" xmlns:a14="http://schemas.microsoft.com/office/drawing/2010/main" w="9525">
                   <a:solidFill>
                     <a:srgbClr val="000000"/>
                   </a:solidFill>
@@ -3086,7 +3090,7 @@
             </a:ln>
             <a:extLst>
               <a:ext uri="{91240B29-F687-4f45-9708-019B960494DF}">
-                <a14:hiddenLine xmlns:a14="http://schemas.microsoft.com/office/drawing/2010/main" xmlns="" w="9525">
+                <a14:hiddenLine xmlns="" xmlns:a14="http://schemas.microsoft.com/office/drawing/2010/main" w="9525">
                   <a:solidFill>
                     <a:srgbClr val="000000"/>
                   </a:solidFill>
@@ -3176,7 +3180,7 @@
             </a:ln>
             <a:extLst>
               <a:ext uri="{91240B29-F687-4f45-9708-019B960494DF}">
-                <a14:hiddenLine xmlns:a14="http://schemas.microsoft.com/office/drawing/2010/main" xmlns="" w="9525">
+                <a14:hiddenLine xmlns="" xmlns:a14="http://schemas.microsoft.com/office/drawing/2010/main" w="9525">
                   <a:solidFill>
                     <a:srgbClr val="000000"/>
                   </a:solidFill>
@@ -3210,7 +3214,7 @@
             </a:ln>
             <a:extLst>
               <a:ext uri="{91240B29-F687-4f45-9708-019B960494DF}">
-                <a14:hiddenLine xmlns:a14="http://schemas.microsoft.com/office/drawing/2010/main" xmlns="" w="9525">
+                <a14:hiddenLine xmlns="" xmlns:a14="http://schemas.microsoft.com/office/drawing/2010/main" w="9525">
                   <a:solidFill>
                     <a:srgbClr val="000000"/>
                   </a:solidFill>
@@ -3275,7 +3279,7 @@
             </a:ln>
             <a:extLst>
               <a:ext uri="{91240B29-F687-4f45-9708-019B960494DF}">
-                <a14:hiddenLine xmlns:a14="http://schemas.microsoft.com/office/drawing/2010/main" xmlns="" w="9525">
+                <a14:hiddenLine xmlns="" xmlns:a14="http://schemas.microsoft.com/office/drawing/2010/main" w="9525">
                   <a:solidFill>
                     <a:srgbClr val="000000"/>
                   </a:solidFill>
@@ -3365,7 +3369,7 @@
             </a:ln>
             <a:extLst>
               <a:ext uri="{91240B29-F687-4f45-9708-019B960494DF}">
-                <a14:hiddenLine xmlns:a14="http://schemas.microsoft.com/office/drawing/2010/main" xmlns="" w="9525">
+                <a14:hiddenLine xmlns="" xmlns:a14="http://schemas.microsoft.com/office/drawing/2010/main" w="9525">
                   <a:solidFill>
                     <a:srgbClr val="000000"/>
                   </a:solidFill>
@@ -3427,7 +3431,7 @@
             </a:ln>
             <a:extLst>
               <a:ext uri="{91240B29-F687-4f45-9708-019B960494DF}">
-                <a14:hiddenLine xmlns:a14="http://schemas.microsoft.com/office/drawing/2010/main" xmlns="" w="9525">
+                <a14:hiddenLine xmlns="" xmlns:a14="http://schemas.microsoft.com/office/drawing/2010/main" w="9525">
                   <a:solidFill>
                     <a:srgbClr val="000000"/>
                   </a:solidFill>
@@ -3517,7 +3521,7 @@
             </a:ln>
             <a:extLst>
               <a:ext uri="{91240B29-F687-4f45-9708-019B960494DF}">
-                <a14:hiddenLine xmlns:a14="http://schemas.microsoft.com/office/drawing/2010/main" xmlns="" w="9525">
+                <a14:hiddenLine xmlns="" xmlns:a14="http://schemas.microsoft.com/office/drawing/2010/main" w="9525">
                   <a:solidFill>
                     <a:srgbClr val="000000"/>
                   </a:solidFill>
@@ -3607,7 +3611,7 @@
             </a:ln>
             <a:extLst>
               <a:ext uri="{91240B29-F687-4f45-9708-019B960494DF}">
-                <a14:hiddenLine xmlns:a14="http://schemas.microsoft.com/office/drawing/2010/main" xmlns="" w="9525">
+                <a14:hiddenLine xmlns="" xmlns:a14="http://schemas.microsoft.com/office/drawing/2010/main" w="9525">
                   <a:solidFill>
                     <a:srgbClr val="000000"/>
                   </a:solidFill>
@@ -3672,7 +3676,7 @@
             </a:ln>
             <a:extLst>
               <a:ext uri="{91240B29-F687-4f45-9708-019B960494DF}">
-                <a14:hiddenLine xmlns:a14="http://schemas.microsoft.com/office/drawing/2010/main" xmlns="" w="9525">
+                <a14:hiddenLine xmlns="" xmlns:a14="http://schemas.microsoft.com/office/drawing/2010/main" w="9525">
                   <a:solidFill>
                     <a:srgbClr val="000000"/>
                   </a:solidFill>
@@ -3734,7 +3738,7 @@
             </a:ln>
             <a:extLst>
               <a:ext uri="{91240B29-F687-4f45-9708-019B960494DF}">
-                <a14:hiddenLine xmlns:a14="http://schemas.microsoft.com/office/drawing/2010/main" xmlns="" w="9525">
+                <a14:hiddenLine xmlns="" xmlns:a14="http://schemas.microsoft.com/office/drawing/2010/main" w="9525">
                   <a:solidFill>
                     <a:srgbClr val="000000"/>
                   </a:solidFill>
@@ -3824,7 +3828,7 @@
             </a:ln>
             <a:extLst>
               <a:ext uri="{91240B29-F687-4f45-9708-019B960494DF}">
-                <a14:hiddenLine xmlns:a14="http://schemas.microsoft.com/office/drawing/2010/main" xmlns="" w="9525">
+                <a14:hiddenLine xmlns="" xmlns:a14="http://schemas.microsoft.com/office/drawing/2010/main" w="9525">
                   <a:solidFill>
                     <a:srgbClr val="000000"/>
                   </a:solidFill>
@@ -3914,7 +3918,7 @@
             </a:ln>
             <a:extLst>
               <a:ext uri="{91240B29-F687-4f45-9708-019B960494DF}">
-                <a14:hiddenLine xmlns:a14="http://schemas.microsoft.com/office/drawing/2010/main" xmlns="" w="9525">
+                <a14:hiddenLine xmlns="" xmlns:a14="http://schemas.microsoft.com/office/drawing/2010/main" w="9525">
                   <a:solidFill>
                     <a:srgbClr val="000000"/>
                   </a:solidFill>
@@ -3976,7 +3980,7 @@
             </a:ln>
             <a:extLst>
               <a:ext uri="{91240B29-F687-4f45-9708-019B960494DF}">
-                <a14:hiddenLine xmlns:a14="http://schemas.microsoft.com/office/drawing/2010/main" xmlns="" w="9525">
+                <a14:hiddenLine xmlns="" xmlns:a14="http://schemas.microsoft.com/office/drawing/2010/main" w="9525">
                   <a:solidFill>
                     <a:srgbClr val="000000"/>
                   </a:solidFill>
@@ -4096,7 +4100,7 @@
             </a:ln>
             <a:extLst>
               <a:ext uri="{91240B29-F687-4f45-9708-019B960494DF}">
-                <a14:hiddenLine xmlns:a14="http://schemas.microsoft.com/office/drawing/2010/main" xmlns="" w="9525">
+                <a14:hiddenLine xmlns="" xmlns:a14="http://schemas.microsoft.com/office/drawing/2010/main" w="9525">
                   <a:solidFill>
                     <a:srgbClr val="000000"/>
                   </a:solidFill>
@@ -4164,7 +4168,7 @@
             </a:ln>
             <a:extLst>
               <a:ext uri="{91240B29-F687-4f45-9708-019B960494DF}">
-                <a14:hiddenLine xmlns:a14="http://schemas.microsoft.com/office/drawing/2010/main" xmlns="" w="9525">
+                <a14:hiddenLine xmlns="" xmlns:a14="http://schemas.microsoft.com/office/drawing/2010/main" w="9525">
                   <a:solidFill>
                     <a:srgbClr val="000000"/>
                   </a:solidFill>
@@ -4254,7 +4258,7 @@
             </a:ln>
             <a:extLst>
               <a:ext uri="{91240B29-F687-4f45-9708-019B960494DF}">
-                <a14:hiddenLine xmlns:a14="http://schemas.microsoft.com/office/drawing/2010/main" xmlns="" w="9525">
+                <a14:hiddenLine xmlns="" xmlns:a14="http://schemas.microsoft.com/office/drawing/2010/main" w="9525">
                   <a:solidFill>
                     <a:srgbClr val="000000"/>
                   </a:solidFill>
@@ -4394,7 +4398,7 @@
           <a:p>
             <a:fld id="{48A87A34-81AB-432B-8DAE-1953F412C126}" type="datetimeFigureOut">
               <a:rPr lang="en-US" dirty="0"/>
-              <a:t>13-Mar-17</a:t>
+              <a:t>15/03/2017</a:t>
             </a:fld>
             <a:endParaRPr lang="en-US" dirty="0"/>
           </a:p>
@@ -4656,7 +4660,7 @@
           <a:p>
             <a:fld id="{48A87A34-81AB-432B-8DAE-1953F412C126}" type="datetimeFigureOut">
               <a:rPr lang="en-US" dirty="0"/>
-              <a:t>13-Mar-17</a:t>
+              <a:t>15/03/2017</a:t>
             </a:fld>
             <a:endParaRPr lang="en-US" dirty="0"/>
           </a:p>
@@ -4847,7 +4851,7 @@
           <a:p>
             <a:fld id="{48A87A34-81AB-432B-8DAE-1953F412C126}" type="datetimeFigureOut">
               <a:rPr lang="en-US" dirty="0"/>
-              <a:t>13-Mar-17</a:t>
+              <a:t>15/03/2017</a:t>
             </a:fld>
             <a:endParaRPr lang="en-US" dirty="0"/>
           </a:p>
@@ -5105,7 +5109,7 @@
           <a:p>
             <a:fld id="{48A87A34-81AB-432B-8DAE-1953F412C126}" type="datetimeFigureOut">
               <a:rPr lang="en-US" dirty="0"/>
-              <a:t>13-Mar-17</a:t>
+              <a:t>15/03/2017</a:t>
             </a:fld>
             <a:endParaRPr lang="en-US" dirty="0"/>
           </a:p>
@@ -5534,7 +5538,7 @@
           <a:p>
             <a:fld id="{48A87A34-81AB-432B-8DAE-1953F412C126}" type="datetimeFigureOut">
               <a:rPr lang="en-US" dirty="0"/>
-              <a:t>13-Mar-17</a:t>
+              <a:t>15/03/2017</a:t>
             </a:fld>
             <a:endParaRPr lang="en-US" dirty="0"/>
           </a:p>
@@ -6075,7 +6079,7 @@
           <a:p>
             <a:fld id="{48A87A34-81AB-432B-8DAE-1953F412C126}" type="datetimeFigureOut">
               <a:rPr lang="en-US" dirty="0"/>
-              <a:t>13-Mar-17</a:t>
+              <a:t>15/03/2017</a:t>
             </a:fld>
             <a:endParaRPr lang="en-US" dirty="0"/>
           </a:p>
@@ -6790,7 +6794,7 @@
           <a:p>
             <a:fld id="{48A87A34-81AB-432B-8DAE-1953F412C126}" type="datetimeFigureOut">
               <a:rPr lang="en-US" dirty="0"/>
-              <a:t>13-Mar-17</a:t>
+              <a:t>15/03/2017</a:t>
             </a:fld>
             <a:endParaRPr lang="en-US" dirty="0"/>
           </a:p>
@@ -6955,7 +6959,7 @@
           <a:p>
             <a:fld id="{48A87A34-81AB-432B-8DAE-1953F412C126}" type="datetimeFigureOut">
               <a:rPr lang="en-US" dirty="0"/>
-              <a:t>13-Mar-17</a:t>
+              <a:t>15/03/2017</a:t>
             </a:fld>
             <a:endParaRPr lang="en-US" dirty="0"/>
           </a:p>
@@ -7130,7 +7134,7 @@
           <a:p>
             <a:fld id="{48A87A34-81AB-432B-8DAE-1953F412C126}" type="datetimeFigureOut">
               <a:rPr lang="en-US" dirty="0"/>
-              <a:t>13-Mar-17</a:t>
+              <a:t>15/03/2017</a:t>
             </a:fld>
             <a:endParaRPr lang="en-US" dirty="0"/>
           </a:p>
@@ -7295,7 +7299,7 @@
           <a:p>
             <a:fld id="{48A87A34-81AB-432B-8DAE-1953F412C126}" type="datetimeFigureOut">
               <a:rPr lang="en-US" dirty="0"/>
-              <a:t>13-Mar-17</a:t>
+              <a:t>15/03/2017</a:t>
             </a:fld>
             <a:endParaRPr lang="en-US" dirty="0"/>
           </a:p>
@@ -7540,7 +7544,7 @@
           <a:p>
             <a:fld id="{48A87A34-81AB-432B-8DAE-1953F412C126}" type="datetimeFigureOut">
               <a:rPr lang="en-US" dirty="0"/>
-              <a:t>13-Mar-17</a:t>
+              <a:t>15/03/2017</a:t>
             </a:fld>
             <a:endParaRPr lang="en-US" dirty="0"/>
           </a:p>
@@ -7767,7 +7771,7 @@
           <a:p>
             <a:fld id="{48A87A34-81AB-432B-8DAE-1953F412C126}" type="datetimeFigureOut">
               <a:rPr lang="en-US" dirty="0"/>
-              <a:t>13-Mar-17</a:t>
+              <a:t>15/03/2017</a:t>
             </a:fld>
             <a:endParaRPr lang="en-US" dirty="0"/>
           </a:p>
@@ -8143,7 +8147,7 @@
           <a:p>
             <a:fld id="{48A87A34-81AB-432B-8DAE-1953F412C126}" type="datetimeFigureOut">
               <a:rPr lang="en-US" dirty="0"/>
-              <a:t>13-Mar-17</a:t>
+              <a:t>15/03/2017</a:t>
             </a:fld>
             <a:endParaRPr lang="en-US" dirty="0"/>
           </a:p>
@@ -8256,7 +8260,7 @@
           <a:p>
             <a:fld id="{48A87A34-81AB-432B-8DAE-1953F412C126}" type="datetimeFigureOut">
               <a:rPr lang="en-US" dirty="0"/>
-              <a:t>13-Mar-17</a:t>
+              <a:t>15/03/2017</a:t>
             </a:fld>
             <a:endParaRPr lang="en-US" dirty="0"/>
           </a:p>
@@ -8346,7 +8350,7 @@
           <a:p>
             <a:fld id="{48A87A34-81AB-432B-8DAE-1953F412C126}" type="datetimeFigureOut">
               <a:rPr lang="en-US" dirty="0"/>
-              <a:t>13-Mar-17</a:t>
+              <a:t>15/03/2017</a:t>
             </a:fld>
             <a:endParaRPr lang="en-US" dirty="0"/>
           </a:p>
@@ -8590,7 +8594,7 @@
           <a:p>
             <a:fld id="{48A87A34-81AB-432B-8DAE-1953F412C126}" type="datetimeFigureOut">
               <a:rPr lang="en-US" dirty="0"/>
-              <a:t>13-Mar-17</a:t>
+              <a:t>15/03/2017</a:t>
             </a:fld>
             <a:endParaRPr lang="en-US" dirty="0"/>
           </a:p>
@@ -8865,7 +8869,7 @@
           <a:p>
             <a:fld id="{48A87A34-81AB-432B-8DAE-1953F412C126}" type="datetimeFigureOut">
               <a:rPr lang="en-US" dirty="0"/>
-              <a:t>13-Mar-17</a:t>
+              <a:t>15/03/2017</a:t>
             </a:fld>
             <a:endParaRPr lang="en-US" dirty="0"/>
           </a:p>
@@ -8976,7 +8980,7 @@
           <a:noFill/>
           <a:extLst>
             <a:ext uri="{909E8E84-426E-40dd-AFC4-6F175D3DCCD1}">
-              <a14:hiddenFill xmlns:a14="http://schemas.microsoft.com/office/drawing/2010/main" xmlns="">
+              <a14:hiddenFill xmlns="" xmlns:a14="http://schemas.microsoft.com/office/drawing/2010/main">
                 <a:solidFill>
                   <a:srgbClr val="FFFFFF"/>
                 </a:solidFill>
@@ -9050,7 +9054,7 @@
               </a:ln>
               <a:extLst>
                 <a:ext uri="{91240B29-F687-4f45-9708-019B960494DF}">
-                  <a14:hiddenLine xmlns:a14="http://schemas.microsoft.com/office/drawing/2010/main" xmlns="" w="9525">
+                  <a14:hiddenLine xmlns="" xmlns:a14="http://schemas.microsoft.com/office/drawing/2010/main" w="9525">
                     <a:solidFill>
                       <a:srgbClr val="000000"/>
                     </a:solidFill>
@@ -9140,7 +9144,7 @@
               </a:ln>
               <a:extLst>
                 <a:ext uri="{91240B29-F687-4f45-9708-019B960494DF}">
-                  <a14:hiddenLine xmlns:a14="http://schemas.microsoft.com/office/drawing/2010/main" xmlns="" w="9525">
+                  <a14:hiddenLine xmlns="" xmlns:a14="http://schemas.microsoft.com/office/drawing/2010/main" w="9525">
                     <a:solidFill>
                       <a:srgbClr val="000000"/>
                     </a:solidFill>
@@ -9230,7 +9234,7 @@
               </a:ln>
               <a:extLst>
                 <a:ext uri="{91240B29-F687-4f45-9708-019B960494DF}">
-                  <a14:hiddenLine xmlns:a14="http://schemas.microsoft.com/office/drawing/2010/main" xmlns="" w="9525">
+                  <a14:hiddenLine xmlns="" xmlns:a14="http://schemas.microsoft.com/office/drawing/2010/main" w="9525">
                     <a:solidFill>
                       <a:srgbClr val="000000"/>
                     </a:solidFill>
@@ -9292,7 +9296,7 @@
               </a:ln>
               <a:extLst>
                 <a:ext uri="{91240B29-F687-4f45-9708-019B960494DF}">
-                  <a14:hiddenLine xmlns:a14="http://schemas.microsoft.com/office/drawing/2010/main" xmlns="" w="9525">
+                  <a14:hiddenLine xmlns="" xmlns:a14="http://schemas.microsoft.com/office/drawing/2010/main" w="9525">
                     <a:solidFill>
                       <a:srgbClr val="000000"/>
                     </a:solidFill>
@@ -9382,7 +9386,7 @@
               </a:ln>
               <a:extLst>
                 <a:ext uri="{91240B29-F687-4f45-9708-019B960494DF}">
-                  <a14:hiddenLine xmlns:a14="http://schemas.microsoft.com/office/drawing/2010/main" xmlns="" w="9525">
+                  <a14:hiddenLine xmlns="" xmlns:a14="http://schemas.microsoft.com/office/drawing/2010/main" w="9525">
                     <a:solidFill>
                       <a:srgbClr val="000000"/>
                     </a:solidFill>
@@ -9444,7 +9448,7 @@
               </a:ln>
               <a:extLst>
                 <a:ext uri="{91240B29-F687-4f45-9708-019B960494DF}">
-                  <a14:hiddenLine xmlns:a14="http://schemas.microsoft.com/office/drawing/2010/main" xmlns="" w="9525">
+                  <a14:hiddenLine xmlns="" xmlns:a14="http://schemas.microsoft.com/office/drawing/2010/main" w="9525">
                     <a:solidFill>
                       <a:srgbClr val="000000"/>
                     </a:solidFill>
@@ -9506,7 +9510,7 @@
               </a:ln>
               <a:extLst>
                 <a:ext uri="{91240B29-F687-4f45-9708-019B960494DF}">
-                  <a14:hiddenLine xmlns:a14="http://schemas.microsoft.com/office/drawing/2010/main" xmlns="" w="9525">
+                  <a14:hiddenLine xmlns="" xmlns:a14="http://schemas.microsoft.com/office/drawing/2010/main" w="9525">
                     <a:solidFill>
                       <a:srgbClr val="000000"/>
                     </a:solidFill>
@@ -9596,7 +9600,7 @@
               </a:ln>
               <a:extLst>
                 <a:ext uri="{91240B29-F687-4f45-9708-019B960494DF}">
-                  <a14:hiddenLine xmlns:a14="http://schemas.microsoft.com/office/drawing/2010/main" xmlns="" w="9525">
+                  <a14:hiddenLine xmlns="" xmlns:a14="http://schemas.microsoft.com/office/drawing/2010/main" w="9525">
                     <a:solidFill>
                       <a:srgbClr val="000000"/>
                     </a:solidFill>
@@ -9686,7 +9690,7 @@
               </a:ln>
               <a:extLst>
                 <a:ext uri="{91240B29-F687-4f45-9708-019B960494DF}">
-                  <a14:hiddenLine xmlns:a14="http://schemas.microsoft.com/office/drawing/2010/main" xmlns="" w="9525">
+                  <a14:hiddenLine xmlns="" xmlns:a14="http://schemas.microsoft.com/office/drawing/2010/main" w="9525">
                     <a:solidFill>
                       <a:srgbClr val="000000"/>
                     </a:solidFill>
@@ -9748,7 +9752,7 @@
               </a:ln>
               <a:extLst>
                 <a:ext uri="{91240B29-F687-4f45-9708-019B960494DF}">
-                  <a14:hiddenLine xmlns:a14="http://schemas.microsoft.com/office/drawing/2010/main" xmlns="" w="9525">
+                  <a14:hiddenLine xmlns="" xmlns:a14="http://schemas.microsoft.com/office/drawing/2010/main" w="9525">
                     <a:solidFill>
                       <a:srgbClr val="000000"/>
                     </a:solidFill>
@@ -9858,7 +9862,7 @@
               </a:ln>
               <a:extLst>
                 <a:ext uri="{91240B29-F687-4f45-9708-019B960494DF}">
-                  <a14:hiddenLine xmlns:a14="http://schemas.microsoft.com/office/drawing/2010/main" xmlns="" w="9525">
+                  <a14:hiddenLine xmlns="" xmlns:a14="http://schemas.microsoft.com/office/drawing/2010/main" w="9525">
                     <a:solidFill>
                       <a:srgbClr val="000000"/>
                     </a:solidFill>
@@ -9942,7 +9946,7 @@
               </a:ln>
               <a:extLst>
                 <a:ext uri="{91240B29-F687-4f45-9708-019B960494DF}">
-                  <a14:hiddenLine xmlns:a14="http://schemas.microsoft.com/office/drawing/2010/main" xmlns="" w="9525">
+                  <a14:hiddenLine xmlns="" xmlns:a14="http://schemas.microsoft.com/office/drawing/2010/main" w="9525">
                     <a:solidFill>
                       <a:srgbClr val="000000"/>
                     </a:solidFill>
@@ -10004,7 +10008,7 @@
               </a:ln>
               <a:extLst>
                 <a:ext uri="{91240B29-F687-4f45-9708-019B960494DF}">
-                  <a14:hiddenLine xmlns:a14="http://schemas.microsoft.com/office/drawing/2010/main" xmlns="" w="9525">
+                  <a14:hiddenLine xmlns="" xmlns:a14="http://schemas.microsoft.com/office/drawing/2010/main" w="9525">
                     <a:solidFill>
                       <a:srgbClr val="000000"/>
                     </a:solidFill>
@@ -10066,7 +10070,7 @@
               </a:ln>
               <a:extLst>
                 <a:ext uri="{91240B29-F687-4f45-9708-019B960494DF}">
-                  <a14:hiddenLine xmlns:a14="http://schemas.microsoft.com/office/drawing/2010/main" xmlns="" w="9525">
+                  <a14:hiddenLine xmlns="" xmlns:a14="http://schemas.microsoft.com/office/drawing/2010/main" w="9525">
                     <a:solidFill>
                       <a:srgbClr val="000000"/>
                     </a:solidFill>
@@ -10156,7 +10160,7 @@
               </a:ln>
               <a:extLst>
                 <a:ext uri="{91240B29-F687-4f45-9708-019B960494DF}">
-                  <a14:hiddenLine xmlns:a14="http://schemas.microsoft.com/office/drawing/2010/main" xmlns="" w="9525">
+                  <a14:hiddenLine xmlns="" xmlns:a14="http://schemas.microsoft.com/office/drawing/2010/main" w="9525">
                     <a:solidFill>
                       <a:srgbClr val="000000"/>
                     </a:solidFill>
@@ -10190,7 +10194,7 @@
               </a:ln>
               <a:extLst>
                 <a:ext uri="{91240B29-F687-4f45-9708-019B960494DF}">
-                  <a14:hiddenLine xmlns:a14="http://schemas.microsoft.com/office/drawing/2010/main" xmlns="" w="9525">
+                  <a14:hiddenLine xmlns="" xmlns:a14="http://schemas.microsoft.com/office/drawing/2010/main" w="9525">
                     <a:solidFill>
                       <a:srgbClr val="000000"/>
                     </a:solidFill>
@@ -10255,7 +10259,7 @@
               </a:ln>
               <a:extLst>
                 <a:ext uri="{91240B29-F687-4f45-9708-019B960494DF}">
-                  <a14:hiddenLine xmlns:a14="http://schemas.microsoft.com/office/drawing/2010/main" xmlns="" w="9525">
+                  <a14:hiddenLine xmlns="" xmlns:a14="http://schemas.microsoft.com/office/drawing/2010/main" w="9525">
                     <a:solidFill>
                       <a:srgbClr val="000000"/>
                     </a:solidFill>
@@ -10345,7 +10349,7 @@
               </a:ln>
               <a:extLst>
                 <a:ext uri="{91240B29-F687-4f45-9708-019B960494DF}">
-                  <a14:hiddenLine xmlns:a14="http://schemas.microsoft.com/office/drawing/2010/main" xmlns="" w="9525">
+                  <a14:hiddenLine xmlns="" xmlns:a14="http://schemas.microsoft.com/office/drawing/2010/main" w="9525">
                     <a:solidFill>
                       <a:srgbClr val="000000"/>
                     </a:solidFill>
@@ -10407,7 +10411,7 @@
               </a:ln>
               <a:extLst>
                 <a:ext uri="{91240B29-F687-4f45-9708-019B960494DF}">
-                  <a14:hiddenLine xmlns:a14="http://schemas.microsoft.com/office/drawing/2010/main" xmlns="" w="9525">
+                  <a14:hiddenLine xmlns="" xmlns:a14="http://schemas.microsoft.com/office/drawing/2010/main" w="9525">
                     <a:solidFill>
                       <a:srgbClr val="000000"/>
                     </a:solidFill>
@@ -10497,7 +10501,7 @@
               </a:ln>
               <a:extLst>
                 <a:ext uri="{91240B29-F687-4f45-9708-019B960494DF}">
-                  <a14:hiddenLine xmlns:a14="http://schemas.microsoft.com/office/drawing/2010/main" xmlns="" w="9525">
+                  <a14:hiddenLine xmlns="" xmlns:a14="http://schemas.microsoft.com/office/drawing/2010/main" w="9525">
                     <a:solidFill>
                       <a:srgbClr val="000000"/>
                     </a:solidFill>
@@ -10562,7 +10566,7 @@
               </a:ln>
               <a:extLst>
                 <a:ext uri="{91240B29-F687-4f45-9708-019B960494DF}">
-                  <a14:hiddenLine xmlns:a14="http://schemas.microsoft.com/office/drawing/2010/main" xmlns="" w="9525">
+                  <a14:hiddenLine xmlns="" xmlns:a14="http://schemas.microsoft.com/office/drawing/2010/main" w="9525">
                     <a:solidFill>
                       <a:srgbClr val="000000"/>
                     </a:solidFill>
@@ -10624,7 +10628,7 @@
               </a:ln>
               <a:extLst>
                 <a:ext uri="{91240B29-F687-4f45-9708-019B960494DF}">
-                  <a14:hiddenLine xmlns:a14="http://schemas.microsoft.com/office/drawing/2010/main" xmlns="" w="9525">
+                  <a14:hiddenLine xmlns="" xmlns:a14="http://schemas.microsoft.com/office/drawing/2010/main" w="9525">
                     <a:solidFill>
                       <a:srgbClr val="000000"/>
                     </a:solidFill>
@@ -10714,7 +10718,7 @@
               </a:ln>
               <a:extLst>
                 <a:ext uri="{91240B29-F687-4f45-9708-019B960494DF}">
-                  <a14:hiddenLine xmlns:a14="http://schemas.microsoft.com/office/drawing/2010/main" xmlns="" w="9525">
+                  <a14:hiddenLine xmlns="" xmlns:a14="http://schemas.microsoft.com/office/drawing/2010/main" w="9525">
                     <a:solidFill>
                       <a:srgbClr val="000000"/>
                     </a:solidFill>
@@ -10804,7 +10808,7 @@
               </a:ln>
               <a:extLst>
                 <a:ext uri="{91240B29-F687-4f45-9708-019B960494DF}">
-                  <a14:hiddenLine xmlns:a14="http://schemas.microsoft.com/office/drawing/2010/main" xmlns="" w="9525">
+                  <a14:hiddenLine xmlns="" xmlns:a14="http://schemas.microsoft.com/office/drawing/2010/main" w="9525">
                     <a:solidFill>
                       <a:srgbClr val="000000"/>
                     </a:solidFill>
@@ -10869,7 +10873,7 @@
               </a:ln>
               <a:extLst>
                 <a:ext uri="{91240B29-F687-4f45-9708-019B960494DF}">
-                  <a14:hiddenLine xmlns:a14="http://schemas.microsoft.com/office/drawing/2010/main" xmlns="" w="9525">
+                  <a14:hiddenLine xmlns="" xmlns:a14="http://schemas.microsoft.com/office/drawing/2010/main" w="9525">
                     <a:solidFill>
                       <a:srgbClr val="000000"/>
                     </a:solidFill>
@@ -10989,7 +10993,7 @@
               </a:ln>
               <a:extLst>
                 <a:ext uri="{91240B29-F687-4f45-9708-019B960494DF}">
-                  <a14:hiddenLine xmlns:a14="http://schemas.microsoft.com/office/drawing/2010/main" xmlns="" w="9525">
+                  <a14:hiddenLine xmlns="" xmlns:a14="http://schemas.microsoft.com/office/drawing/2010/main" w="9525">
                     <a:solidFill>
                       <a:srgbClr val="000000"/>
                     </a:solidFill>
@@ -11087,7 +11091,7 @@
               </a:ln>
               <a:extLst>
                 <a:ext uri="{91240B29-F687-4f45-9708-019B960494DF}">
-                  <a14:hiddenLine xmlns:a14="http://schemas.microsoft.com/office/drawing/2010/main" xmlns="" w="9525">
+                  <a14:hiddenLine xmlns="" xmlns:a14="http://schemas.microsoft.com/office/drawing/2010/main" w="9525">
                     <a:solidFill>
                       <a:srgbClr val="000000"/>
                     </a:solidFill>
@@ -11202,7 +11206,7 @@
               </a:ln>
               <a:extLst>
                 <a:ext uri="{91240B29-F687-4f45-9708-019B960494DF}">
-                  <a14:hiddenLine xmlns:a14="http://schemas.microsoft.com/office/drawing/2010/main" xmlns="" w="9525">
+                  <a14:hiddenLine xmlns="" xmlns:a14="http://schemas.microsoft.com/office/drawing/2010/main" w="9525">
                     <a:solidFill>
                       <a:srgbClr val="000000"/>
                     </a:solidFill>
@@ -11292,7 +11296,7 @@
               </a:ln>
               <a:extLst>
                 <a:ext uri="{91240B29-F687-4f45-9708-019B960494DF}">
-                  <a14:hiddenLine xmlns:a14="http://schemas.microsoft.com/office/drawing/2010/main" xmlns="" w="9525">
+                  <a14:hiddenLine xmlns="" xmlns:a14="http://schemas.microsoft.com/office/drawing/2010/main" w="9525">
                     <a:solidFill>
                       <a:srgbClr val="000000"/>
                     </a:solidFill>
@@ -11357,7 +11361,7 @@
               </a:ln>
               <a:extLst>
                 <a:ext uri="{91240B29-F687-4f45-9708-019B960494DF}">
-                  <a14:hiddenLine xmlns:a14="http://schemas.microsoft.com/office/drawing/2010/main" xmlns="" w="9525">
+                  <a14:hiddenLine xmlns="" xmlns:a14="http://schemas.microsoft.com/office/drawing/2010/main" w="9525">
                     <a:solidFill>
                       <a:srgbClr val="000000"/>
                     </a:solidFill>
@@ -11447,7 +11451,7 @@
               </a:ln>
               <a:extLst>
                 <a:ext uri="{91240B29-F687-4f45-9708-019B960494DF}">
-                  <a14:hiddenLine xmlns:a14="http://schemas.microsoft.com/office/drawing/2010/main" xmlns="" w="9525">
+                  <a14:hiddenLine xmlns="" xmlns:a14="http://schemas.microsoft.com/office/drawing/2010/main" w="9525">
                     <a:solidFill>
                       <a:srgbClr val="000000"/>
                     </a:solidFill>
@@ -11515,7 +11519,7 @@
               </a:ln>
               <a:extLst>
                 <a:ext uri="{91240B29-F687-4f45-9708-019B960494DF}">
-                  <a14:hiddenLine xmlns:a14="http://schemas.microsoft.com/office/drawing/2010/main" xmlns="" w="9525">
+                  <a14:hiddenLine xmlns="" xmlns:a14="http://schemas.microsoft.com/office/drawing/2010/main" w="9525">
                     <a:solidFill>
                       <a:srgbClr val="000000"/>
                     </a:solidFill>
@@ -11605,7 +11609,7 @@
               </a:ln>
               <a:extLst>
                 <a:ext uri="{91240B29-F687-4f45-9708-019B960494DF}">
-                  <a14:hiddenLine xmlns:a14="http://schemas.microsoft.com/office/drawing/2010/main" xmlns="" w="9525">
+                  <a14:hiddenLine xmlns="" xmlns:a14="http://schemas.microsoft.com/office/drawing/2010/main" w="9525">
                     <a:solidFill>
                       <a:srgbClr val="000000"/>
                     </a:solidFill>
@@ -11673,7 +11677,7 @@
               </a:ln>
               <a:extLst>
                 <a:ext uri="{91240B29-F687-4f45-9708-019B960494DF}">
-                  <a14:hiddenLine xmlns:a14="http://schemas.microsoft.com/office/drawing/2010/main" xmlns="" w="9525">
+                  <a14:hiddenLine xmlns="" xmlns:a14="http://schemas.microsoft.com/office/drawing/2010/main" w="9525">
                     <a:solidFill>
                       <a:srgbClr val="000000"/>
                     </a:solidFill>
@@ -11763,7 +11767,7 @@
               </a:ln>
               <a:extLst>
                 <a:ext uri="{91240B29-F687-4f45-9708-019B960494DF}">
-                  <a14:hiddenLine xmlns:a14="http://schemas.microsoft.com/office/drawing/2010/main" xmlns="" w="9525">
+                  <a14:hiddenLine xmlns="" xmlns:a14="http://schemas.microsoft.com/office/drawing/2010/main" w="9525">
                     <a:solidFill>
                       <a:srgbClr val="000000"/>
                     </a:solidFill>
@@ -11797,7 +11801,7 @@
               </a:ln>
               <a:extLst>
                 <a:ext uri="{91240B29-F687-4f45-9708-019B960494DF}">
-                  <a14:hiddenLine xmlns:a14="http://schemas.microsoft.com/office/drawing/2010/main" xmlns="" w="9525">
+                  <a14:hiddenLine xmlns="" xmlns:a14="http://schemas.microsoft.com/office/drawing/2010/main" w="9525">
                     <a:solidFill>
                       <a:srgbClr val="000000"/>
                     </a:solidFill>
@@ -11938,7 +11942,7 @@
             <a:fld id="{48A87A34-81AB-432B-8DAE-1953F412C126}" type="datetimeFigureOut">
               <a:rPr lang="en-US" dirty="0"/>
               <a:pPr/>
-              <a:t>13-Mar-17</a:t>
+              <a:t>15/03/2017</a:t>
             </a:fld>
             <a:endParaRPr lang="en-US" dirty="0"/>
           </a:p>
@@ -12411,6 +12415,148 @@
 </p:sld>
 </file>
 
+<file path=ppt/slides/slide10.xml><?xml version="1.0" encoding="utf-8"?>
+<p:sld xmlns:a="http://schemas.openxmlformats.org/drawingml/2006/main" xmlns:r="http://schemas.openxmlformats.org/officeDocument/2006/relationships" xmlns:p="http://schemas.openxmlformats.org/presentationml/2006/main">
+  <p:cSld>
+    <p:spTree>
+      <p:nvGrpSpPr>
+        <p:cNvPr id="1" name=""/>
+        <p:cNvGrpSpPr/>
+        <p:nvPr/>
+      </p:nvGrpSpPr>
+      <p:grpSpPr>
+        <a:xfrm>
+          <a:off x="0" y="0"/>
+          <a:ext cx="0" cy="0"/>
+          <a:chOff x="0" y="0"/>
+          <a:chExt cx="0" cy="0"/>
+        </a:xfrm>
+      </p:grpSpPr>
+      <p:sp>
+        <p:nvSpPr>
+          <p:cNvPr id="2" name="Title 1"/>
+          <p:cNvSpPr>
+            <a:spLocks noGrp="1"/>
+          </p:cNvSpPr>
+          <p:nvPr>
+            <p:ph type="title"/>
+          </p:nvPr>
+        </p:nvSpPr>
+        <p:spPr/>
+        <p:txBody>
+          <a:bodyPr/>
+          <a:lstStyle/>
+          <a:p>
+            <a:r>
+              <a:rPr lang="en-US" dirty="0"/>
+              <a:t>OPTIONAL FEATURE: CLOUD-BASED LEADERBOARDS</a:t>
+            </a:r>
+          </a:p>
+        </p:txBody>
+      </p:sp>
+      <p:sp>
+        <p:nvSpPr>
+          <p:cNvPr id="3" name="Content Placeholder 2"/>
+          <p:cNvSpPr>
+            <a:spLocks noGrp="1"/>
+          </p:cNvSpPr>
+          <p:nvPr>
+            <p:ph idx="1"/>
+          </p:nvPr>
+        </p:nvSpPr>
+        <p:spPr/>
+        <p:txBody>
+          <a:bodyPr/>
+          <a:lstStyle/>
+          <a:p>
+            <a:endParaRPr lang="en-US"/>
+          </a:p>
+        </p:txBody>
+      </p:sp>
+    </p:spTree>
+    <p:extLst>
+      <p:ext uri="{BB962C8B-B14F-4D97-AF65-F5344CB8AC3E}">
+        <p14:creationId xmlns:p14="http://schemas.microsoft.com/office/powerpoint/2010/main" val="3421208875"/>
+      </p:ext>
+    </p:extLst>
+  </p:cSld>
+  <p:clrMapOvr>
+    <a:masterClrMapping/>
+  </p:clrMapOvr>
+</p:sld>
+</file>
+
+<file path=ppt/slides/slide11.xml><?xml version="1.0" encoding="utf-8"?>
+<p:sld xmlns:a="http://schemas.openxmlformats.org/drawingml/2006/main" xmlns:r="http://schemas.openxmlformats.org/officeDocument/2006/relationships" xmlns:p="http://schemas.openxmlformats.org/presentationml/2006/main">
+  <p:cSld>
+    <p:spTree>
+      <p:nvGrpSpPr>
+        <p:cNvPr id="1" name=""/>
+        <p:cNvGrpSpPr/>
+        <p:nvPr/>
+      </p:nvGrpSpPr>
+      <p:grpSpPr>
+        <a:xfrm>
+          <a:off x="0" y="0"/>
+          <a:ext cx="0" cy="0"/>
+          <a:chOff x="0" y="0"/>
+          <a:chExt cx="0" cy="0"/>
+        </a:xfrm>
+      </p:grpSpPr>
+      <p:sp>
+        <p:nvSpPr>
+          <p:cNvPr id="2" name="Title 1"/>
+          <p:cNvSpPr>
+            <a:spLocks noGrp="1"/>
+          </p:cNvSpPr>
+          <p:nvPr>
+            <p:ph type="ctrTitle"/>
+          </p:nvPr>
+        </p:nvSpPr>
+        <p:spPr/>
+        <p:txBody>
+          <a:bodyPr/>
+          <a:lstStyle/>
+          <a:p>
+            <a:r>
+              <a:rPr lang="en-US" dirty="0"/>
+              <a:t>THANK YOU.</a:t>
+            </a:r>
+          </a:p>
+        </p:txBody>
+      </p:sp>
+      <p:sp>
+        <p:nvSpPr>
+          <p:cNvPr id="3" name="Subtitle 2"/>
+          <p:cNvSpPr>
+            <a:spLocks noGrp="1"/>
+          </p:cNvSpPr>
+          <p:nvPr>
+            <p:ph type="subTitle" idx="1"/>
+          </p:nvPr>
+        </p:nvSpPr>
+        <p:spPr/>
+        <p:txBody>
+          <a:bodyPr/>
+          <a:lstStyle/>
+          <a:p>
+            <a:endParaRPr lang="en-US"/>
+          </a:p>
+        </p:txBody>
+      </p:sp>
+    </p:spTree>
+    <p:extLst>
+      <p:ext uri="{BB962C8B-B14F-4D97-AF65-F5344CB8AC3E}">
+        <p14:creationId xmlns:p14="http://schemas.microsoft.com/office/powerpoint/2010/main" val="1172278888"/>
+      </p:ext>
+    </p:extLst>
+  </p:cSld>
+  <p:clrMapOvr>
+    <a:masterClrMapping/>
+  </p:clrMapOvr>
+</p:sld>
+</file>
+
 <file path=ppt/slides/slide2.xml><?xml version="1.0" encoding="utf-8"?>
 <p:sld xmlns:a="http://schemas.openxmlformats.org/drawingml/2006/main" xmlns:r="http://schemas.openxmlformats.org/officeDocument/2006/relationships" xmlns:p="http://schemas.openxmlformats.org/presentationml/2006/main">
   <p:cSld>
@@ -12445,7 +12591,7 @@
           <a:p>
             <a:r>
               <a:rPr lang="en-US" dirty="0"/>
-              <a:t>Introduction:</a:t>
+              <a:t>What Is SCAR ARCADE?</a:t>
             </a:r>
           </a:p>
         </p:txBody>
@@ -12467,19 +12613,7 @@
           <a:p>
             <a:r>
               <a:rPr lang="en-US" dirty="0"/>
-              <a:t>What is it? In essence a Game Management Application. </a:t>
-            </a:r>
-          </a:p>
-          <a:p>
-            <a:r>
-              <a:rPr lang="en-US" dirty="0"/>
-              <a:t>Why? </a:t>
-            </a:r>
-          </a:p>
-          <a:p>
-            <a:r>
-              <a:rPr lang="en-US" dirty="0"/>
-              <a:t>Today’s presentation: 3 Games</a:t>
+              <a:t>A game arcade, featuring 3 different games:</a:t>
             </a:r>
           </a:p>
           <a:p>
@@ -12552,69 +12686,66 @@
           <a:p>
             <a:r>
               <a:rPr lang="en-US" dirty="0"/>
-              <a:t>INTERFACE:</a:t>
+              <a:t>Why A GAME Arcade?</a:t>
             </a:r>
           </a:p>
         </p:txBody>
       </p:sp>
-      <p:pic>
-        <p:nvPicPr>
-          <p:cNvPr id="11" name="Content Placeholder 10"/>
-          <p:cNvPicPr>
-            <a:picLocks noGrp="1" noChangeAspect="1"/>
-          </p:cNvPicPr>
-          <p:nvPr>
-            <p:ph sz="quarter" idx="4"/>
-          </p:nvPr>
-        </p:nvPicPr>
-        <p:blipFill>
-          <a:blip r:embed="rId2"/>
-          <a:stretch>
-            <a:fillRect/>
-          </a:stretch>
-        </p:blipFill>
-        <p:spPr>
-          <a:xfrm>
-            <a:off x="6193984" y="3073400"/>
-            <a:ext cx="4831644" cy="2717800"/>
-          </a:xfrm>
-        </p:spPr>
-      </p:pic>
       <p:sp>
         <p:nvSpPr>
-          <p:cNvPr id="13" name="Content Placeholder 12"/>
+          <p:cNvPr id="3" name="Content Placeholder 2"/>
           <p:cNvSpPr>
             <a:spLocks noGrp="1"/>
           </p:cNvSpPr>
           <p:nvPr>
-            <p:ph sz="half" idx="2"/>
+            <p:ph idx="1"/>
           </p:nvPr>
         </p:nvSpPr>
         <p:spPr/>
         <p:txBody>
-          <a:bodyPr/>
+          <a:bodyPr>
+            <a:normAutofit lnSpcReduction="10000"/>
+          </a:bodyPr>
           <a:lstStyle/>
           <a:p>
             <a:r>
               <a:rPr lang="en-US" dirty="0"/>
-              <a:t>Grid layout with clickable buttons to run a specific game.</a:t>
+              <a:t>Developing games provides us the opportunity to utilize the skills taught in this course related to mobile application development, including:</a:t>
             </a:r>
           </a:p>
           <a:p>
-            <a:endParaRPr lang="en-US" dirty="0"/>
-          </a:p>
-          <a:p>
-            <a:pPr marL="0" indent="0">
-              <a:buNone/>
-            </a:pPr>
-            <a:endParaRPr lang="en-US" dirty="0"/>
+            <a:pPr lvl="1"/>
+            <a:r>
+              <a:rPr lang="en-US" dirty="0"/>
+              <a:t>Programming with C#</a:t>
+            </a:r>
+          </a:p>
+          <a:p>
+            <a:pPr lvl="1"/>
+            <a:r>
+              <a:rPr lang="en-US" dirty="0"/>
+              <a:t>Event driven programming</a:t>
+            </a:r>
+          </a:p>
+          <a:p>
+            <a:pPr lvl="1"/>
+            <a:r>
+              <a:rPr lang="en-US" dirty="0"/>
+              <a:t>Use of sensors</a:t>
+            </a:r>
+          </a:p>
+          <a:p>
+            <a:r>
+              <a:rPr lang="en-US" dirty="0"/>
+              <a:t>Additionally, game development is a sensible, realistic goal because the foundational knowledge has been provided; it just needs to be expanded upon.</a:t>
+            </a:r>
           </a:p>
         </p:txBody>
       </p:sp>
     </p:spTree>
     <p:extLst>
       <p:ext uri="{BB962C8B-B14F-4D97-AF65-F5344CB8AC3E}">
-        <p14:creationId xmlns:p14="http://schemas.microsoft.com/office/powerpoint/2010/main" val="3721207313"/>
+        <p14:creationId xmlns:p14="http://schemas.microsoft.com/office/powerpoint/2010/main" val="582540877"/>
       </p:ext>
     </p:extLst>
   </p:cSld>
@@ -12648,7 +12779,7 @@
             <a:spLocks noGrp="1"/>
           </p:cNvSpPr>
           <p:nvPr>
-            <p:ph type="ctrTitle"/>
+            <p:ph type="title"/>
           </p:nvPr>
         </p:nvSpPr>
         <p:spPr/>
@@ -12658,19 +12789,19 @@
           <a:p>
             <a:r>
               <a:rPr lang="en-US" dirty="0"/>
-              <a:t>Tower Of Hanoi:</a:t>
+              <a:t>SCAR ARCADE GAME Selection INTERFACE</a:t>
             </a:r>
           </a:p>
         </p:txBody>
       </p:sp>
       <p:sp>
         <p:nvSpPr>
-          <p:cNvPr id="3" name="Subtitle 2"/>
+          <p:cNvPr id="3" name="Text Placeholder 2"/>
           <p:cNvSpPr>
             <a:spLocks noGrp="1"/>
           </p:cNvSpPr>
           <p:nvPr>
-            <p:ph type="subTitle" idx="1"/>
+            <p:ph type="body" idx="1"/>
           </p:nvPr>
         </p:nvSpPr>
         <p:spPr/>
@@ -12678,14 +12809,107 @@
           <a:bodyPr/>
           <a:lstStyle/>
           <a:p>
-            <a:endParaRPr lang="en-US"/>
+            <a:r>
+              <a:rPr lang="en-US" dirty="0"/>
+              <a:t>Game Selection Interface details:</a:t>
+            </a:r>
           </a:p>
         </p:txBody>
       </p:sp>
+      <p:sp>
+        <p:nvSpPr>
+          <p:cNvPr id="13" name="Content Placeholder 12"/>
+          <p:cNvSpPr>
+            <a:spLocks noGrp="1"/>
+          </p:cNvSpPr>
+          <p:nvPr>
+            <p:ph sz="half" idx="2"/>
+          </p:nvPr>
+        </p:nvSpPr>
+        <p:spPr/>
+        <p:txBody>
+          <a:bodyPr>
+            <a:normAutofit fontScale="92500" lnSpcReduction="10000"/>
+          </a:bodyPr>
+          <a:lstStyle/>
+          <a:p>
+            <a:r>
+              <a:rPr lang="en-US" dirty="0"/>
+              <a:t>Starting screen of the application.</a:t>
+            </a:r>
+          </a:p>
+          <a:p>
+            <a:r>
+              <a:rPr lang="en-US" dirty="0"/>
+              <a:t>Grid layout with clickable buttons to run a specific game.</a:t>
+            </a:r>
+          </a:p>
+          <a:p>
+            <a:r>
+              <a:rPr lang="en-US" dirty="0"/>
+              <a:t>Simple, informative, conveys all necessary information whilst cleverly using screen ‘real-estate’.</a:t>
+            </a:r>
+          </a:p>
+          <a:p>
+            <a:endParaRPr lang="en-US" dirty="0"/>
+          </a:p>
+          <a:p>
+            <a:pPr marL="0" indent="0">
+              <a:buNone/>
+            </a:pPr>
+            <a:endParaRPr lang="en-US" dirty="0"/>
+          </a:p>
+        </p:txBody>
+      </p:sp>
+      <p:sp>
+        <p:nvSpPr>
+          <p:cNvPr id="4" name="Text Placeholder 3"/>
+          <p:cNvSpPr>
+            <a:spLocks noGrp="1"/>
+          </p:cNvSpPr>
+          <p:nvPr>
+            <p:ph type="body" sz="quarter" idx="3"/>
+          </p:nvPr>
+        </p:nvSpPr>
+        <p:spPr/>
+        <p:txBody>
+          <a:bodyPr/>
+          <a:lstStyle/>
+          <a:p>
+            <a:r>
+              <a:rPr lang="en-US" dirty="0"/>
+              <a:t>Game Selection Interface. Picture taken by Ryan.</a:t>
+            </a:r>
+          </a:p>
+        </p:txBody>
+      </p:sp>
+      <p:pic>
+        <p:nvPicPr>
+          <p:cNvPr id="11" name="Content Placeholder 10"/>
+          <p:cNvPicPr>
+            <a:picLocks noGrp="1" noChangeAspect="1"/>
+          </p:cNvPicPr>
+          <p:nvPr>
+            <p:ph sz="quarter" idx="4"/>
+          </p:nvPr>
+        </p:nvPicPr>
+        <p:blipFill>
+          <a:blip r:embed="rId2"/>
+          <a:stretch>
+            <a:fillRect/>
+          </a:stretch>
+        </p:blipFill>
+        <p:spPr>
+          <a:xfrm>
+            <a:off x="6193984" y="3073400"/>
+            <a:ext cx="4831644" cy="2717800"/>
+          </a:xfrm>
+        </p:spPr>
+      </p:pic>
     </p:spTree>
     <p:extLst>
       <p:ext uri="{BB962C8B-B14F-4D97-AF65-F5344CB8AC3E}">
-        <p14:creationId xmlns:p14="http://schemas.microsoft.com/office/powerpoint/2010/main" val="993397549"/>
+        <p14:creationId xmlns:p14="http://schemas.microsoft.com/office/powerpoint/2010/main" val="3721207313"/>
       </p:ext>
     </p:extLst>
   </p:cSld>
@@ -12719,7 +12943,7 @@
             <a:spLocks noGrp="1"/>
           </p:cNvSpPr>
           <p:nvPr>
-            <p:ph type="ctrTitle"/>
+            <p:ph type="title"/>
           </p:nvPr>
         </p:nvSpPr>
         <p:spPr/>
@@ -12729,19 +12953,19 @@
           <a:p>
             <a:r>
               <a:rPr lang="en-US" dirty="0"/>
-              <a:t>Memory Test (Deck of Cards)</a:t>
+              <a:t>GAME INTERFACE: GENERIC MENU DESIGN</a:t>
             </a:r>
           </a:p>
         </p:txBody>
       </p:sp>
       <p:sp>
         <p:nvSpPr>
-          <p:cNvPr id="3" name="Subtitle 2"/>
+          <p:cNvPr id="3" name="Text Placeholder 2"/>
           <p:cNvSpPr>
             <a:spLocks noGrp="1"/>
           </p:cNvSpPr>
           <p:nvPr>
-            <p:ph type="subTitle" idx="1"/>
+            <p:ph type="body" idx="1"/>
           </p:nvPr>
         </p:nvSpPr>
         <p:spPr/>
@@ -12749,14 +12973,98 @@
           <a:bodyPr/>
           <a:lstStyle/>
           <a:p>
-            <a:endParaRPr lang="en-US" dirty="0"/>
+            <a:r>
+              <a:rPr lang="en-US" dirty="0"/>
+              <a:t>NOTES:</a:t>
+            </a:r>
           </a:p>
         </p:txBody>
       </p:sp>
+      <p:sp>
+        <p:nvSpPr>
+          <p:cNvPr id="4" name="Content Placeholder 3"/>
+          <p:cNvSpPr>
+            <a:spLocks noGrp="1"/>
+          </p:cNvSpPr>
+          <p:nvPr>
+            <p:ph sz="half" idx="2"/>
+          </p:nvPr>
+        </p:nvSpPr>
+        <p:spPr/>
+        <p:txBody>
+          <a:bodyPr>
+            <a:normAutofit fontScale="92500" lnSpcReduction="20000"/>
+          </a:bodyPr>
+          <a:lstStyle/>
+          <a:p>
+            <a:r>
+              <a:rPr lang="en-US" dirty="0"/>
+              <a:t>Each game uses the same menu layout, providing a consistent look and feel across the application.</a:t>
+            </a:r>
+          </a:p>
+          <a:p>
+            <a:r>
+              <a:rPr lang="en-US" dirty="0"/>
+              <a:t>Aesthetic variations can be used to uniquely identify games (colour scheme, background, game title).</a:t>
+            </a:r>
+          </a:p>
+          <a:p>
+            <a:r>
+              <a:rPr lang="en-US" dirty="0"/>
+              <a:t>Each game will have 5 levels.</a:t>
+            </a:r>
+          </a:p>
+        </p:txBody>
+      </p:sp>
+      <p:sp>
+        <p:nvSpPr>
+          <p:cNvPr id="5" name="Text Placeholder 4"/>
+          <p:cNvSpPr>
+            <a:spLocks noGrp="1"/>
+          </p:cNvSpPr>
+          <p:nvPr>
+            <p:ph type="body" sz="quarter" idx="3"/>
+          </p:nvPr>
+        </p:nvSpPr>
+        <p:spPr/>
+        <p:txBody>
+          <a:bodyPr/>
+          <a:lstStyle/>
+          <a:p>
+            <a:r>
+              <a:rPr lang="en-US" dirty="0"/>
+              <a:t>DESIGN CREATED BY CHARLES</a:t>
+            </a:r>
+          </a:p>
+        </p:txBody>
+      </p:sp>
+      <p:pic>
+        <p:nvPicPr>
+          <p:cNvPr id="10" name="Content Placeholder 9"/>
+          <p:cNvPicPr>
+            <a:picLocks noGrp="1" noChangeAspect="1"/>
+          </p:cNvPicPr>
+          <p:nvPr>
+            <p:ph sz="quarter" idx="4"/>
+          </p:nvPr>
+        </p:nvPicPr>
+        <p:blipFill>
+          <a:blip r:embed="rId2"/>
+          <a:stretch>
+            <a:fillRect/>
+          </a:stretch>
+        </p:blipFill>
+        <p:spPr>
+          <a:xfrm>
+            <a:off x="6193984" y="3073400"/>
+            <a:ext cx="4831644" cy="2717800"/>
+          </a:xfrm>
+        </p:spPr>
+      </p:pic>
     </p:spTree>
     <p:extLst>
       <p:ext uri="{BB962C8B-B14F-4D97-AF65-F5344CB8AC3E}">
-        <p14:creationId xmlns:p14="http://schemas.microsoft.com/office/powerpoint/2010/main" val="581551407"/>
+        <p14:creationId xmlns:p14="http://schemas.microsoft.com/office/powerpoint/2010/main" val="2516705295"/>
       </p:ext>
     </p:extLst>
   </p:cSld>
@@ -12790,7 +13098,7 @@
             <a:spLocks noGrp="1"/>
           </p:cNvSpPr>
           <p:nvPr>
-            <p:ph type="ctrTitle"/>
+            <p:ph type="title"/>
           </p:nvPr>
         </p:nvSpPr>
         <p:spPr/>
@@ -12800,19 +13108,19 @@
           <a:p>
             <a:r>
               <a:rPr lang="en-US" dirty="0"/>
-              <a:t>Ball Maze (Gyroscope)</a:t>
+              <a:t>LEADERBOARD DESIGN</a:t>
             </a:r>
           </a:p>
         </p:txBody>
       </p:sp>
       <p:sp>
         <p:nvSpPr>
-          <p:cNvPr id="3" name="Subtitle 2"/>
+          <p:cNvPr id="3" name="Content Placeholder 2"/>
           <p:cNvSpPr>
             <a:spLocks noGrp="1"/>
           </p:cNvSpPr>
           <p:nvPr>
-            <p:ph type="subTitle" idx="1"/>
+            <p:ph idx="1"/>
           </p:nvPr>
         </p:nvSpPr>
         <p:spPr/>
@@ -12820,14 +13128,14 @@
           <a:bodyPr/>
           <a:lstStyle/>
           <a:p>
-            <a:endParaRPr lang="en-US" dirty="0"/>
+            <a:endParaRPr lang="en-US"/>
           </a:p>
         </p:txBody>
       </p:sp>
     </p:spTree>
     <p:extLst>
       <p:ext uri="{BB962C8B-B14F-4D97-AF65-F5344CB8AC3E}">
-        <p14:creationId xmlns:p14="http://schemas.microsoft.com/office/powerpoint/2010/main" val="3153339232"/>
+        <p14:creationId xmlns:p14="http://schemas.microsoft.com/office/powerpoint/2010/main" val="3743684645"/>
       </p:ext>
     </p:extLst>
   </p:cSld>
@@ -12871,7 +13179,7 @@
           <a:p>
             <a:r>
               <a:rPr lang="en-US" dirty="0"/>
-              <a:t>THANK YOU.</a:t>
+              <a:t>Tower Of Hanoi:</a:t>
             </a:r>
           </a:p>
         </p:txBody>
@@ -12898,7 +13206,149 @@
     </p:spTree>
     <p:extLst>
       <p:ext uri="{BB962C8B-B14F-4D97-AF65-F5344CB8AC3E}">
-        <p14:creationId xmlns:p14="http://schemas.microsoft.com/office/powerpoint/2010/main" val="1172278888"/>
+        <p14:creationId xmlns:p14="http://schemas.microsoft.com/office/powerpoint/2010/main" val="993397549"/>
+      </p:ext>
+    </p:extLst>
+  </p:cSld>
+  <p:clrMapOvr>
+    <a:masterClrMapping/>
+  </p:clrMapOvr>
+</p:sld>
+</file>
+
+<file path=ppt/slides/slide8.xml><?xml version="1.0" encoding="utf-8"?>
+<p:sld xmlns:a="http://schemas.openxmlformats.org/drawingml/2006/main" xmlns:r="http://schemas.openxmlformats.org/officeDocument/2006/relationships" xmlns:p="http://schemas.openxmlformats.org/presentationml/2006/main">
+  <p:cSld>
+    <p:spTree>
+      <p:nvGrpSpPr>
+        <p:cNvPr id="1" name=""/>
+        <p:cNvGrpSpPr/>
+        <p:nvPr/>
+      </p:nvGrpSpPr>
+      <p:grpSpPr>
+        <a:xfrm>
+          <a:off x="0" y="0"/>
+          <a:ext cx="0" cy="0"/>
+          <a:chOff x="0" y="0"/>
+          <a:chExt cx="0" cy="0"/>
+        </a:xfrm>
+      </p:grpSpPr>
+      <p:sp>
+        <p:nvSpPr>
+          <p:cNvPr id="2" name="Title 1"/>
+          <p:cNvSpPr>
+            <a:spLocks noGrp="1"/>
+          </p:cNvSpPr>
+          <p:nvPr>
+            <p:ph type="ctrTitle"/>
+          </p:nvPr>
+        </p:nvSpPr>
+        <p:spPr/>
+        <p:txBody>
+          <a:bodyPr/>
+          <a:lstStyle/>
+          <a:p>
+            <a:r>
+              <a:rPr lang="en-US" dirty="0"/>
+              <a:t>Memory Test (Deck of Cards)</a:t>
+            </a:r>
+          </a:p>
+        </p:txBody>
+      </p:sp>
+      <p:sp>
+        <p:nvSpPr>
+          <p:cNvPr id="3" name="Subtitle 2"/>
+          <p:cNvSpPr>
+            <a:spLocks noGrp="1"/>
+          </p:cNvSpPr>
+          <p:nvPr>
+            <p:ph type="subTitle" idx="1"/>
+          </p:nvPr>
+        </p:nvSpPr>
+        <p:spPr/>
+        <p:txBody>
+          <a:bodyPr/>
+          <a:lstStyle/>
+          <a:p>
+            <a:endParaRPr lang="en-US" dirty="0"/>
+          </a:p>
+        </p:txBody>
+      </p:sp>
+    </p:spTree>
+    <p:extLst>
+      <p:ext uri="{BB962C8B-B14F-4D97-AF65-F5344CB8AC3E}">
+        <p14:creationId xmlns:p14="http://schemas.microsoft.com/office/powerpoint/2010/main" val="581551407"/>
+      </p:ext>
+    </p:extLst>
+  </p:cSld>
+  <p:clrMapOvr>
+    <a:masterClrMapping/>
+  </p:clrMapOvr>
+</p:sld>
+</file>
+
+<file path=ppt/slides/slide9.xml><?xml version="1.0" encoding="utf-8"?>
+<p:sld xmlns:a="http://schemas.openxmlformats.org/drawingml/2006/main" xmlns:r="http://schemas.openxmlformats.org/officeDocument/2006/relationships" xmlns:p="http://schemas.openxmlformats.org/presentationml/2006/main">
+  <p:cSld>
+    <p:spTree>
+      <p:nvGrpSpPr>
+        <p:cNvPr id="1" name=""/>
+        <p:cNvGrpSpPr/>
+        <p:nvPr/>
+      </p:nvGrpSpPr>
+      <p:grpSpPr>
+        <a:xfrm>
+          <a:off x="0" y="0"/>
+          <a:ext cx="0" cy="0"/>
+          <a:chOff x="0" y="0"/>
+          <a:chExt cx="0" cy="0"/>
+        </a:xfrm>
+      </p:grpSpPr>
+      <p:sp>
+        <p:nvSpPr>
+          <p:cNvPr id="2" name="Title 1"/>
+          <p:cNvSpPr>
+            <a:spLocks noGrp="1"/>
+          </p:cNvSpPr>
+          <p:nvPr>
+            <p:ph type="ctrTitle"/>
+          </p:nvPr>
+        </p:nvSpPr>
+        <p:spPr/>
+        <p:txBody>
+          <a:bodyPr/>
+          <a:lstStyle/>
+          <a:p>
+            <a:r>
+              <a:rPr lang="en-US" dirty="0"/>
+              <a:t>Ball Maze (Gyroscope)</a:t>
+            </a:r>
+          </a:p>
+        </p:txBody>
+      </p:sp>
+      <p:sp>
+        <p:nvSpPr>
+          <p:cNvPr id="3" name="Subtitle 2"/>
+          <p:cNvSpPr>
+            <a:spLocks noGrp="1"/>
+          </p:cNvSpPr>
+          <p:nvPr>
+            <p:ph type="subTitle" idx="1"/>
+          </p:nvPr>
+        </p:nvSpPr>
+        <p:spPr/>
+        <p:txBody>
+          <a:bodyPr/>
+          <a:lstStyle/>
+          <a:p>
+            <a:endParaRPr lang="en-US" dirty="0"/>
+          </a:p>
+        </p:txBody>
+      </p:sp>
+    </p:spTree>
+    <p:extLst>
+      <p:ext uri="{BB962C8B-B14F-4D97-AF65-F5344CB8AC3E}">
+        <p14:creationId xmlns:p14="http://schemas.microsoft.com/office/powerpoint/2010/main" val="3153339232"/>
       </p:ext>
     </p:extLst>
   </p:cSld>

</xml_diff>

<commit_message>
Added the tower of hanoi slide
</commit_message>
<xml_diff>
--- a/SCaRArcade.pptx
+++ b/SCaRArcade.pptx
@@ -12,10 +12,11 @@
     <p:sldId id="268" r:id="rId6"/>
     <p:sldId id="269" r:id="rId7"/>
     <p:sldId id="271" r:id="rId8"/>
-    <p:sldId id="261" r:id="rId9"/>
-    <p:sldId id="262" r:id="rId10"/>
-    <p:sldId id="270" r:id="rId11"/>
-    <p:sldId id="266" r:id="rId12"/>
+    <p:sldId id="272" r:id="rId9"/>
+    <p:sldId id="261" r:id="rId10"/>
+    <p:sldId id="262" r:id="rId11"/>
+    <p:sldId id="270" r:id="rId12"/>
+    <p:sldId id="266" r:id="rId13"/>
   </p:sldIdLst>
   <p:sldSz cx="12192000" cy="6858000"/>
   <p:notesSz cx="6858000" cy="9144000"/>
@@ -164,7 +165,7 @@
           </a:lstStyle>
           <a:p>
             <a:r>
-              <a:rPr lang="en-US" smtClean="0"/>
+              <a:rPr lang="en-US"/>
               <a:t>Click to edit Master title style</a:t>
             </a:r>
             <a:endParaRPr lang="en-US" dirty="0"/>
@@ -284,7 +285,7 @@
           </a:lstStyle>
           <a:p>
             <a:r>
-              <a:rPr lang="en-US" smtClean="0"/>
+              <a:rPr lang="en-US"/>
               <a:t>Click to edit Master subtitle style</a:t>
             </a:r>
             <a:endParaRPr lang="en-US" dirty="0"/>
@@ -308,7 +309,7 @@
           <a:p>
             <a:fld id="{48A87A34-81AB-432B-8DAE-1953F412C126}" type="datetimeFigureOut">
               <a:rPr lang="en-US" smtClean="0"/>
-              <a:t>3/20/2017</a:t>
+              <a:t>20-Mar-17</a:t>
             </a:fld>
             <a:endParaRPr lang="en-US" dirty="0"/>
           </a:p>
@@ -413,7 +414,7 @@
           </a:lstStyle>
           <a:p>
             <a:r>
-              <a:rPr lang="en-US" smtClean="0"/>
+              <a:rPr lang="en-US"/>
               <a:t>Click to edit Master title style</a:t>
             </a:r>
             <a:endParaRPr lang="en-US" dirty="0"/>
@@ -492,7 +493,7 @@
           </a:lstStyle>
           <a:p>
             <a:r>
-              <a:rPr lang="en-US" smtClean="0"/>
+              <a:rPr lang="en-US"/>
               <a:t>Click icon to add picture</a:t>
             </a:r>
             <a:endParaRPr lang="en-US" dirty="0"/>
@@ -560,7 +561,7 @@
           <a:p>
             <a:pPr lvl="0"/>
             <a:r>
-              <a:rPr lang="en-US" smtClean="0"/>
+              <a:rPr lang="en-US"/>
               <a:t>Edit Master text styles</a:t>
             </a:r>
           </a:p>
@@ -583,7 +584,7 @@
           <a:p>
             <a:fld id="{48A87A34-81AB-432B-8DAE-1953F412C126}" type="datetimeFigureOut">
               <a:rPr lang="en-US" smtClean="0"/>
-              <a:t>3/20/2017</a:t>
+              <a:t>20-Mar-17</a:t>
             </a:fld>
             <a:endParaRPr lang="en-US" dirty="0"/>
           </a:p>
@@ -686,7 +687,7 @@
           </a:lstStyle>
           <a:p>
             <a:r>
-              <a:rPr lang="en-US" smtClean="0"/>
+              <a:rPr lang="en-US"/>
               <a:t>Click to edit Master title style</a:t>
             </a:r>
             <a:endParaRPr lang="en-US" dirty="0"/>
@@ -754,7 +755,7 @@
           <a:p>
             <a:pPr lvl="0"/>
             <a:r>
-              <a:rPr lang="en-US" smtClean="0"/>
+              <a:rPr lang="en-US"/>
               <a:t>Edit Master text styles</a:t>
             </a:r>
           </a:p>
@@ -777,7 +778,7 @@
           <a:p>
             <a:fld id="{48A87A34-81AB-432B-8DAE-1953F412C126}" type="datetimeFigureOut">
               <a:rPr lang="en-US" smtClean="0"/>
-              <a:t>3/20/2017</a:t>
+              <a:t>20-Mar-17</a:t>
             </a:fld>
             <a:endParaRPr lang="en-US" dirty="0"/>
           </a:p>
@@ -880,7 +881,7 @@
           </a:lstStyle>
           <a:p>
             <a:r>
-              <a:rPr lang="en-US" smtClean="0"/>
+              <a:rPr lang="en-US"/>
               <a:t>Click to edit Master title style</a:t>
             </a:r>
             <a:endParaRPr lang="en-US" dirty="0"/>
@@ -960,7 +961,7 @@
               <a:buNone/>
             </a:pPr>
             <a:r>
-              <a:rPr lang="en-US" smtClean="0"/>
+              <a:rPr lang="en-US"/>
               <a:t>Edit Master text styles</a:t>
             </a:r>
           </a:p>
@@ -1027,7 +1028,7 @@
           <a:p>
             <a:pPr lvl="0"/>
             <a:r>
-              <a:rPr lang="en-US" smtClean="0"/>
+              <a:rPr lang="en-US"/>
               <a:t>Edit Master text styles</a:t>
             </a:r>
           </a:p>
@@ -1050,7 +1051,7 @@
           <a:p>
             <a:fld id="{48A87A34-81AB-432B-8DAE-1953F412C126}" type="datetimeFigureOut">
               <a:rPr lang="en-US" smtClean="0"/>
-              <a:t>3/20/2017</a:t>
+              <a:t>20-Mar-17</a:t>
             </a:fld>
             <a:endParaRPr lang="en-US" dirty="0"/>
           </a:p>
@@ -1247,7 +1248,7 @@
           </a:lstStyle>
           <a:p>
             <a:r>
-              <a:rPr lang="en-US" smtClean="0"/>
+              <a:rPr lang="en-US"/>
               <a:t>Click to edit Master title style</a:t>
             </a:r>
             <a:endParaRPr lang="en-US" dirty="0"/>
@@ -1368,7 +1369,7 @@
           <a:p>
             <a:pPr lvl="0"/>
             <a:r>
-              <a:rPr lang="en-US" smtClean="0"/>
+              <a:rPr lang="en-US"/>
               <a:t>Edit Master text styles</a:t>
             </a:r>
           </a:p>
@@ -1391,7 +1392,7 @@
           <a:p>
             <a:fld id="{48A87A34-81AB-432B-8DAE-1953F412C126}" type="datetimeFigureOut">
               <a:rPr lang="en-US" smtClean="0"/>
-              <a:t>3/20/2017</a:t>
+              <a:t>20-Mar-17</a:t>
             </a:fld>
             <a:endParaRPr lang="en-US" dirty="0"/>
           </a:p>
@@ -1489,7 +1490,7 @@
           </a:lstStyle>
           <a:p>
             <a:r>
-              <a:rPr lang="en-US" smtClean="0"/>
+              <a:rPr lang="en-US"/>
               <a:t>Click to edit Master title style</a:t>
             </a:r>
             <a:endParaRPr lang="en-US" dirty="0"/>
@@ -1564,7 +1565,7 @@
           <a:p>
             <a:pPr lvl="0"/>
             <a:r>
-              <a:rPr lang="en-US" smtClean="0"/>
+              <a:rPr lang="en-US"/>
               <a:t>Edit Master text styles</a:t>
             </a:r>
           </a:p>
@@ -1631,7 +1632,7 @@
           <a:p>
             <a:pPr lvl="0"/>
             <a:r>
-              <a:rPr lang="en-US" smtClean="0"/>
+              <a:rPr lang="en-US"/>
               <a:t>Edit Master text styles</a:t>
             </a:r>
           </a:p>
@@ -1705,7 +1706,7 @@
           <a:p>
             <a:pPr lvl="0"/>
             <a:r>
-              <a:rPr lang="en-US" smtClean="0"/>
+              <a:rPr lang="en-US"/>
               <a:t>Edit Master text styles</a:t>
             </a:r>
           </a:p>
@@ -1772,7 +1773,7 @@
           <a:p>
             <a:pPr lvl="0"/>
             <a:r>
-              <a:rPr lang="en-US" smtClean="0"/>
+              <a:rPr lang="en-US"/>
               <a:t>Edit Master text styles</a:t>
             </a:r>
           </a:p>
@@ -1846,7 +1847,7 @@
           <a:p>
             <a:pPr lvl="0"/>
             <a:r>
-              <a:rPr lang="en-US" smtClean="0"/>
+              <a:rPr lang="en-US"/>
               <a:t>Edit Master text styles</a:t>
             </a:r>
           </a:p>
@@ -1913,7 +1914,7 @@
           <a:p>
             <a:pPr lvl="0"/>
             <a:r>
-              <a:rPr lang="en-US" smtClean="0"/>
+              <a:rPr lang="en-US"/>
               <a:t>Edit Master text styles</a:t>
             </a:r>
           </a:p>
@@ -2014,7 +2015,7 @@
           <a:p>
             <a:fld id="{48A87A34-81AB-432B-8DAE-1953F412C126}" type="datetimeFigureOut">
               <a:rPr lang="en-US" smtClean="0"/>
-              <a:t>3/20/2017</a:t>
+              <a:t>20-Mar-17</a:t>
             </a:fld>
             <a:endParaRPr lang="en-US" dirty="0"/>
           </a:p>
@@ -2112,7 +2113,7 @@
           </a:lstStyle>
           <a:p>
             <a:r>
-              <a:rPr lang="en-US" smtClean="0"/>
+              <a:rPr lang="en-US"/>
               <a:t>Click to edit Master title style</a:t>
             </a:r>
             <a:endParaRPr lang="en-US" dirty="0"/>
@@ -2187,7 +2188,7 @@
           <a:p>
             <a:pPr lvl="0"/>
             <a:r>
-              <a:rPr lang="en-US" smtClean="0"/>
+              <a:rPr lang="en-US"/>
               <a:t>Edit Master text styles</a:t>
             </a:r>
           </a:p>
@@ -2265,7 +2266,7 @@
           </a:lstStyle>
           <a:p>
             <a:r>
-              <a:rPr lang="en-US" smtClean="0"/>
+              <a:rPr lang="en-US"/>
               <a:t>Click icon to add picture</a:t>
             </a:r>
             <a:endParaRPr lang="en-US" dirty="0"/>
@@ -2333,7 +2334,7 @@
           <a:p>
             <a:pPr lvl="0"/>
             <a:r>
-              <a:rPr lang="en-US" smtClean="0"/>
+              <a:rPr lang="en-US"/>
               <a:t>Edit Master text styles</a:t>
             </a:r>
           </a:p>
@@ -2407,7 +2408,7 @@
           <a:p>
             <a:pPr lvl="0"/>
             <a:r>
-              <a:rPr lang="en-US" smtClean="0"/>
+              <a:rPr lang="en-US"/>
               <a:t>Edit Master text styles</a:t>
             </a:r>
           </a:p>
@@ -2485,7 +2486,7 @@
           </a:lstStyle>
           <a:p>
             <a:r>
-              <a:rPr lang="en-US" smtClean="0"/>
+              <a:rPr lang="en-US"/>
               <a:t>Click icon to add picture</a:t>
             </a:r>
             <a:endParaRPr lang="en-US" dirty="0"/>
@@ -2553,7 +2554,7 @@
           <a:p>
             <a:pPr lvl="0"/>
             <a:r>
-              <a:rPr lang="en-US" smtClean="0"/>
+              <a:rPr lang="en-US"/>
               <a:t>Edit Master text styles</a:t>
             </a:r>
           </a:p>
@@ -2627,7 +2628,7 @@
           <a:p>
             <a:pPr lvl="0"/>
             <a:r>
-              <a:rPr lang="en-US" smtClean="0"/>
+              <a:rPr lang="en-US"/>
               <a:t>Edit Master text styles</a:t>
             </a:r>
           </a:p>
@@ -2705,7 +2706,7 @@
           </a:lstStyle>
           <a:p>
             <a:r>
-              <a:rPr lang="en-US" smtClean="0"/>
+              <a:rPr lang="en-US"/>
               <a:t>Click icon to add picture</a:t>
             </a:r>
             <a:endParaRPr lang="en-US" dirty="0"/>
@@ -2773,7 +2774,7 @@
           <a:p>
             <a:pPr lvl="0"/>
             <a:r>
-              <a:rPr lang="en-US" smtClean="0"/>
+              <a:rPr lang="en-US"/>
               <a:t>Edit Master text styles</a:t>
             </a:r>
           </a:p>
@@ -2874,7 +2875,7 @@
           <a:p>
             <a:fld id="{48A87A34-81AB-432B-8DAE-1953F412C126}" type="datetimeFigureOut">
               <a:rPr lang="en-US" smtClean="0"/>
-              <a:t>3/20/2017</a:t>
+              <a:t>20-Mar-17</a:t>
             </a:fld>
             <a:endParaRPr lang="en-US" dirty="0"/>
           </a:p>
@@ -2968,7 +2969,7 @@
           <a:lstStyle/>
           <a:p>
             <a:r>
-              <a:rPr lang="en-US" smtClean="0"/>
+              <a:rPr lang="en-US"/>
               <a:t>Click to edit Master title style</a:t>
             </a:r>
             <a:endParaRPr lang="en-US" dirty="0"/>
@@ -2992,35 +2993,35 @@
           <a:p>
             <a:pPr lvl="0"/>
             <a:r>
-              <a:rPr lang="en-US" smtClean="0"/>
+              <a:rPr lang="en-US"/>
               <a:t>Edit Master text styles</a:t>
             </a:r>
           </a:p>
           <a:p>
             <a:pPr lvl="1"/>
             <a:r>
-              <a:rPr lang="en-US" smtClean="0"/>
+              <a:rPr lang="en-US"/>
               <a:t>Second level</a:t>
             </a:r>
           </a:p>
           <a:p>
             <a:pPr lvl="2"/>
             <a:r>
-              <a:rPr lang="en-US" smtClean="0"/>
+              <a:rPr lang="en-US"/>
               <a:t>Third level</a:t>
             </a:r>
           </a:p>
           <a:p>
             <a:pPr lvl="3"/>
             <a:r>
-              <a:rPr lang="en-US" smtClean="0"/>
+              <a:rPr lang="en-US"/>
               <a:t>Fourth level</a:t>
             </a:r>
           </a:p>
           <a:p>
             <a:pPr lvl="4"/>
             <a:r>
-              <a:rPr lang="en-US" smtClean="0"/>
+              <a:rPr lang="en-US"/>
               <a:t>Fifth level</a:t>
             </a:r>
             <a:endParaRPr lang="en-US" dirty="0"/>
@@ -3044,7 +3045,7 @@
           <a:p>
             <a:fld id="{48A87A34-81AB-432B-8DAE-1953F412C126}" type="datetimeFigureOut">
               <a:rPr lang="en-US" smtClean="0"/>
-              <a:t>3/20/2017</a:t>
+              <a:t>20-Mar-17</a:t>
             </a:fld>
             <a:endParaRPr lang="en-US" dirty="0"/>
           </a:p>
@@ -3143,7 +3144,7 @@
           <a:lstStyle/>
           <a:p>
             <a:r>
-              <a:rPr lang="en-US" smtClean="0"/>
+              <a:rPr lang="en-US"/>
               <a:t>Click to edit Master title style</a:t>
             </a:r>
             <a:endParaRPr lang="en-US" dirty="0"/>
@@ -3172,35 +3173,35 @@
           <a:p>
             <a:pPr lvl="0"/>
             <a:r>
-              <a:rPr lang="en-US" smtClean="0"/>
+              <a:rPr lang="en-US"/>
               <a:t>Edit Master text styles</a:t>
             </a:r>
           </a:p>
           <a:p>
             <a:pPr lvl="1"/>
             <a:r>
-              <a:rPr lang="en-US" smtClean="0"/>
+              <a:rPr lang="en-US"/>
               <a:t>Second level</a:t>
             </a:r>
           </a:p>
           <a:p>
             <a:pPr lvl="2"/>
             <a:r>
-              <a:rPr lang="en-US" smtClean="0"/>
+              <a:rPr lang="en-US"/>
               <a:t>Third level</a:t>
             </a:r>
           </a:p>
           <a:p>
             <a:pPr lvl="3"/>
             <a:r>
-              <a:rPr lang="en-US" smtClean="0"/>
+              <a:rPr lang="en-US"/>
               <a:t>Fourth level</a:t>
             </a:r>
           </a:p>
           <a:p>
             <a:pPr lvl="4"/>
             <a:r>
-              <a:rPr lang="en-US" smtClean="0"/>
+              <a:rPr lang="en-US"/>
               <a:t>Fifth level</a:t>
             </a:r>
             <a:endParaRPr lang="en-US" dirty="0"/>
@@ -3224,7 +3225,7 @@
           <a:p>
             <a:fld id="{48A87A34-81AB-432B-8DAE-1953F412C126}" type="datetimeFigureOut">
               <a:rPr lang="en-US" smtClean="0"/>
-              <a:t>3/20/2017</a:t>
+              <a:t>20-Mar-17</a:t>
             </a:fld>
             <a:endParaRPr lang="en-US" dirty="0"/>
           </a:p>
@@ -3318,7 +3319,7 @@
           <a:lstStyle/>
           <a:p>
             <a:r>
-              <a:rPr lang="en-US" smtClean="0"/>
+              <a:rPr lang="en-US"/>
               <a:t>Click to edit Master title style</a:t>
             </a:r>
             <a:endParaRPr lang="en-US" dirty="0"/>
@@ -3342,35 +3343,35 @@
           <a:p>
             <a:pPr lvl="0"/>
             <a:r>
-              <a:rPr lang="en-US" smtClean="0"/>
+              <a:rPr lang="en-US"/>
               <a:t>Edit Master text styles</a:t>
             </a:r>
           </a:p>
           <a:p>
             <a:pPr lvl="1"/>
             <a:r>
-              <a:rPr lang="en-US" smtClean="0"/>
+              <a:rPr lang="en-US"/>
               <a:t>Second level</a:t>
             </a:r>
           </a:p>
           <a:p>
             <a:pPr lvl="2"/>
             <a:r>
-              <a:rPr lang="en-US" smtClean="0"/>
+              <a:rPr lang="en-US"/>
               <a:t>Third level</a:t>
             </a:r>
           </a:p>
           <a:p>
             <a:pPr lvl="3"/>
             <a:r>
-              <a:rPr lang="en-US" smtClean="0"/>
+              <a:rPr lang="en-US"/>
               <a:t>Fourth level</a:t>
             </a:r>
           </a:p>
           <a:p>
             <a:pPr lvl="4"/>
             <a:r>
-              <a:rPr lang="en-US" smtClean="0"/>
+              <a:rPr lang="en-US"/>
               <a:t>Fifth level</a:t>
             </a:r>
             <a:endParaRPr lang="en-US" dirty="0"/>
@@ -3394,7 +3395,7 @@
           <a:p>
             <a:fld id="{48A87A34-81AB-432B-8DAE-1953F412C126}" type="datetimeFigureOut">
               <a:rPr lang="en-US" smtClean="0"/>
-              <a:t>3/20/2017</a:t>
+              <a:t>20-Mar-17</a:t>
             </a:fld>
             <a:endParaRPr lang="en-US" dirty="0"/>
           </a:p>
@@ -3497,7 +3498,7 @@
           </a:lstStyle>
           <a:p>
             <a:r>
-              <a:rPr lang="en-US" smtClean="0"/>
+              <a:rPr lang="en-US"/>
               <a:t>Click to edit Master title style</a:t>
             </a:r>
             <a:endParaRPr lang="en-US" dirty="0"/>
@@ -3618,7 +3619,7 @@
           <a:p>
             <a:pPr lvl="0"/>
             <a:r>
-              <a:rPr lang="en-US" smtClean="0"/>
+              <a:rPr lang="en-US"/>
               <a:t>Edit Master text styles</a:t>
             </a:r>
           </a:p>
@@ -3641,7 +3642,7 @@
           <a:p>
             <a:fld id="{48A87A34-81AB-432B-8DAE-1953F412C126}" type="datetimeFigureOut">
               <a:rPr lang="en-US" smtClean="0"/>
-              <a:t>3/20/2017</a:t>
+              <a:t>20-Mar-17</a:t>
             </a:fld>
             <a:endParaRPr lang="en-US" dirty="0"/>
           </a:p>
@@ -3735,7 +3736,7 @@
           <a:lstStyle/>
           <a:p>
             <a:r>
-              <a:rPr lang="en-US" smtClean="0"/>
+              <a:rPr lang="en-US"/>
               <a:t>Click to edit Master title style</a:t>
             </a:r>
             <a:endParaRPr lang="en-US" dirty="0"/>
@@ -3794,35 +3795,35 @@
           <a:p>
             <a:pPr lvl="0"/>
             <a:r>
-              <a:rPr lang="en-US" smtClean="0"/>
+              <a:rPr lang="en-US"/>
               <a:t>Edit Master text styles</a:t>
             </a:r>
           </a:p>
           <a:p>
             <a:pPr lvl="1"/>
             <a:r>
-              <a:rPr lang="en-US" smtClean="0"/>
+              <a:rPr lang="en-US"/>
               <a:t>Second level</a:t>
             </a:r>
           </a:p>
           <a:p>
             <a:pPr lvl="2"/>
             <a:r>
-              <a:rPr lang="en-US" smtClean="0"/>
+              <a:rPr lang="en-US"/>
               <a:t>Third level</a:t>
             </a:r>
           </a:p>
           <a:p>
             <a:pPr lvl="3"/>
             <a:r>
-              <a:rPr lang="en-US" smtClean="0"/>
+              <a:rPr lang="en-US"/>
               <a:t>Fourth level</a:t>
             </a:r>
           </a:p>
           <a:p>
             <a:pPr lvl="4"/>
             <a:r>
-              <a:rPr lang="en-US" smtClean="0"/>
+              <a:rPr lang="en-US"/>
               <a:t>Fifth level</a:t>
             </a:r>
             <a:endParaRPr lang="en-US" dirty="0"/>
@@ -3881,35 +3882,35 @@
           <a:p>
             <a:pPr lvl="0"/>
             <a:r>
-              <a:rPr lang="en-US" smtClean="0"/>
+              <a:rPr lang="en-US"/>
               <a:t>Edit Master text styles</a:t>
             </a:r>
           </a:p>
           <a:p>
             <a:pPr lvl="1"/>
             <a:r>
-              <a:rPr lang="en-US" smtClean="0"/>
+              <a:rPr lang="en-US"/>
               <a:t>Second level</a:t>
             </a:r>
           </a:p>
           <a:p>
             <a:pPr lvl="2"/>
             <a:r>
-              <a:rPr lang="en-US" smtClean="0"/>
+              <a:rPr lang="en-US"/>
               <a:t>Third level</a:t>
             </a:r>
           </a:p>
           <a:p>
             <a:pPr lvl="3"/>
             <a:r>
-              <a:rPr lang="en-US" smtClean="0"/>
+              <a:rPr lang="en-US"/>
               <a:t>Fourth level</a:t>
             </a:r>
           </a:p>
           <a:p>
             <a:pPr lvl="4"/>
             <a:r>
-              <a:rPr lang="en-US" smtClean="0"/>
+              <a:rPr lang="en-US"/>
               <a:t>Fifth level</a:t>
             </a:r>
             <a:endParaRPr lang="en-US" dirty="0"/>
@@ -3933,7 +3934,7 @@
           <a:p>
             <a:fld id="{48A87A34-81AB-432B-8DAE-1953F412C126}" type="datetimeFigureOut">
               <a:rPr lang="en-US" smtClean="0"/>
-              <a:t>3/20/2017</a:t>
+              <a:t>20-Mar-17</a:t>
             </a:fld>
             <a:endParaRPr lang="en-US" dirty="0"/>
           </a:p>
@@ -4031,7 +4032,7 @@
           </a:lstStyle>
           <a:p>
             <a:r>
-              <a:rPr lang="en-US" smtClean="0"/>
+              <a:rPr lang="en-US"/>
               <a:t>Click to edit Master title style</a:t>
             </a:r>
             <a:endParaRPr lang="en-US" dirty="0"/>
@@ -4106,7 +4107,7 @@
           <a:p>
             <a:pPr lvl="0"/>
             <a:r>
-              <a:rPr lang="en-US" smtClean="0"/>
+              <a:rPr lang="en-US"/>
               <a:t>Edit Master text styles</a:t>
             </a:r>
           </a:p>
@@ -4164,35 +4165,35 @@
           <a:p>
             <a:pPr lvl="0"/>
             <a:r>
-              <a:rPr lang="en-US" smtClean="0"/>
+              <a:rPr lang="en-US"/>
               <a:t>Edit Master text styles</a:t>
             </a:r>
           </a:p>
           <a:p>
             <a:pPr lvl="1"/>
             <a:r>
-              <a:rPr lang="en-US" smtClean="0"/>
+              <a:rPr lang="en-US"/>
               <a:t>Second level</a:t>
             </a:r>
           </a:p>
           <a:p>
             <a:pPr lvl="2"/>
             <a:r>
-              <a:rPr lang="en-US" smtClean="0"/>
+              <a:rPr lang="en-US"/>
               <a:t>Third level</a:t>
             </a:r>
           </a:p>
           <a:p>
             <a:pPr lvl="3"/>
             <a:r>
-              <a:rPr lang="en-US" smtClean="0"/>
+              <a:rPr lang="en-US"/>
               <a:t>Fourth level</a:t>
             </a:r>
           </a:p>
           <a:p>
             <a:pPr lvl="4"/>
             <a:r>
-              <a:rPr lang="en-US" smtClean="0"/>
+              <a:rPr lang="en-US"/>
               <a:t>Fifth level</a:t>
             </a:r>
             <a:endParaRPr lang="en-US" dirty="0"/>
@@ -4267,7 +4268,7 @@
           <a:p>
             <a:pPr lvl="0"/>
             <a:r>
-              <a:rPr lang="en-US" smtClean="0"/>
+              <a:rPr lang="en-US"/>
               <a:t>Edit Master text styles</a:t>
             </a:r>
           </a:p>
@@ -4325,35 +4326,35 @@
           <a:p>
             <a:pPr lvl="0"/>
             <a:r>
-              <a:rPr lang="en-US" smtClean="0"/>
+              <a:rPr lang="en-US"/>
               <a:t>Edit Master text styles</a:t>
             </a:r>
           </a:p>
           <a:p>
             <a:pPr lvl="1"/>
             <a:r>
-              <a:rPr lang="en-US" smtClean="0"/>
+              <a:rPr lang="en-US"/>
               <a:t>Second level</a:t>
             </a:r>
           </a:p>
           <a:p>
             <a:pPr lvl="2"/>
             <a:r>
-              <a:rPr lang="en-US" smtClean="0"/>
+              <a:rPr lang="en-US"/>
               <a:t>Third level</a:t>
             </a:r>
           </a:p>
           <a:p>
             <a:pPr lvl="3"/>
             <a:r>
-              <a:rPr lang="en-US" smtClean="0"/>
+              <a:rPr lang="en-US"/>
               <a:t>Fourth level</a:t>
             </a:r>
           </a:p>
           <a:p>
             <a:pPr lvl="4"/>
             <a:r>
-              <a:rPr lang="en-US" smtClean="0"/>
+              <a:rPr lang="en-US"/>
               <a:t>Fifth level</a:t>
             </a:r>
             <a:endParaRPr lang="en-US" dirty="0"/>
@@ -4377,7 +4378,7 @@
           <a:p>
             <a:fld id="{48A87A34-81AB-432B-8DAE-1953F412C126}" type="datetimeFigureOut">
               <a:rPr lang="en-US" smtClean="0"/>
-              <a:t>3/20/2017</a:t>
+              <a:t>20-Mar-17</a:t>
             </a:fld>
             <a:endParaRPr lang="en-US" dirty="0"/>
           </a:p>
@@ -4471,7 +4472,7 @@
           <a:lstStyle/>
           <a:p>
             <a:r>
-              <a:rPr lang="en-US" smtClean="0"/>
+              <a:rPr lang="en-US"/>
               <a:t>Click to edit Master title style</a:t>
             </a:r>
             <a:endParaRPr lang="en-US" dirty="0"/>
@@ -4495,7 +4496,7 @@
           <a:p>
             <a:fld id="{48A87A34-81AB-432B-8DAE-1953F412C126}" type="datetimeFigureOut">
               <a:rPr lang="en-US" smtClean="0"/>
-              <a:t>3/20/2017</a:t>
+              <a:t>20-Mar-17</a:t>
             </a:fld>
             <a:endParaRPr lang="en-US" dirty="0"/>
           </a:p>
@@ -4590,7 +4591,7 @@
           <a:p>
             <a:fld id="{48A87A34-81AB-432B-8DAE-1953F412C126}" type="datetimeFigureOut">
               <a:rPr lang="en-US" smtClean="0"/>
-              <a:t>3/20/2017</a:t>
+              <a:t>20-Mar-17</a:t>
             </a:fld>
             <a:endParaRPr lang="en-US" dirty="0"/>
           </a:p>
@@ -4693,7 +4694,7 @@
           </a:lstStyle>
           <a:p>
             <a:r>
-              <a:rPr lang="en-US" smtClean="0"/>
+              <a:rPr lang="en-US"/>
               <a:t>Click to edit Master title style</a:t>
             </a:r>
             <a:endParaRPr lang="en-US" dirty="0"/>
@@ -4752,35 +4753,35 @@
           <a:p>
             <a:pPr lvl="0"/>
             <a:r>
-              <a:rPr lang="en-US" smtClean="0"/>
+              <a:rPr lang="en-US"/>
               <a:t>Edit Master text styles</a:t>
             </a:r>
           </a:p>
           <a:p>
             <a:pPr lvl="1"/>
             <a:r>
-              <a:rPr lang="en-US" smtClean="0"/>
+              <a:rPr lang="en-US"/>
               <a:t>Second level</a:t>
             </a:r>
           </a:p>
           <a:p>
             <a:pPr lvl="2"/>
             <a:r>
-              <a:rPr lang="en-US" smtClean="0"/>
+              <a:rPr lang="en-US"/>
               <a:t>Third level</a:t>
             </a:r>
           </a:p>
           <a:p>
             <a:pPr lvl="3"/>
             <a:r>
-              <a:rPr lang="en-US" smtClean="0"/>
+              <a:rPr lang="en-US"/>
               <a:t>Fourth level</a:t>
             </a:r>
           </a:p>
           <a:p>
             <a:pPr lvl="4"/>
             <a:r>
-              <a:rPr lang="en-US" smtClean="0"/>
+              <a:rPr lang="en-US"/>
               <a:t>Fifth level</a:t>
             </a:r>
             <a:endParaRPr lang="en-US" dirty="0"/>
@@ -4846,7 +4847,7 @@
           <a:p>
             <a:pPr lvl="0"/>
             <a:r>
-              <a:rPr lang="en-US" smtClean="0"/>
+              <a:rPr lang="en-US"/>
               <a:t>Edit Master text styles</a:t>
             </a:r>
           </a:p>
@@ -4869,7 +4870,7 @@
           <a:p>
             <a:fld id="{48A87A34-81AB-432B-8DAE-1953F412C126}" type="datetimeFigureOut">
               <a:rPr lang="en-US" smtClean="0"/>
-              <a:t>3/20/2017</a:t>
+              <a:t>20-Mar-17</a:t>
             </a:fld>
             <a:endParaRPr lang="en-US" dirty="0"/>
           </a:p>
@@ -4974,7 +4975,7 @@
           </a:lstStyle>
           <a:p>
             <a:r>
-              <a:rPr lang="en-US" smtClean="0"/>
+              <a:rPr lang="en-US"/>
               <a:t>Click to edit Master title style</a:t>
             </a:r>
             <a:endParaRPr lang="en-US" dirty="0"/>
@@ -5053,7 +5054,7 @@
           </a:lstStyle>
           <a:p>
             <a:r>
-              <a:rPr lang="en-US" smtClean="0"/>
+              <a:rPr lang="en-US"/>
               <a:t>Click icon to add picture</a:t>
             </a:r>
             <a:endParaRPr lang="en-US" dirty="0"/>
@@ -5121,7 +5122,7 @@
           <a:p>
             <a:pPr lvl="0"/>
             <a:r>
-              <a:rPr lang="en-US" smtClean="0"/>
+              <a:rPr lang="en-US"/>
               <a:t>Edit Master text styles</a:t>
             </a:r>
           </a:p>
@@ -5144,7 +5145,7 @@
           <a:p>
             <a:fld id="{48A87A34-81AB-432B-8DAE-1953F412C126}" type="datetimeFigureOut">
               <a:rPr lang="en-US" smtClean="0"/>
-              <a:t>3/20/2017</a:t>
+              <a:t>20-Mar-17</a:t>
             </a:fld>
             <a:endParaRPr lang="en-US" dirty="0"/>
           </a:p>
@@ -5468,7 +5469,7 @@
           <a:lstStyle/>
           <a:p>
             <a:r>
-              <a:rPr lang="en-US" smtClean="0"/>
+              <a:rPr lang="en-US"/>
               <a:t>Click to edit Master title style</a:t>
             </a:r>
             <a:endParaRPr lang="en-US" dirty="0"/>
@@ -5502,35 +5503,35 @@
           <a:p>
             <a:pPr lvl="0"/>
             <a:r>
-              <a:rPr lang="en-US" smtClean="0"/>
+              <a:rPr lang="en-US"/>
               <a:t>Edit Master text styles</a:t>
             </a:r>
           </a:p>
           <a:p>
             <a:pPr lvl="1"/>
             <a:r>
-              <a:rPr lang="en-US" smtClean="0"/>
+              <a:rPr lang="en-US"/>
               <a:t>Second level</a:t>
             </a:r>
           </a:p>
           <a:p>
             <a:pPr lvl="2"/>
             <a:r>
-              <a:rPr lang="en-US" smtClean="0"/>
+              <a:rPr lang="en-US"/>
               <a:t>Third level</a:t>
             </a:r>
           </a:p>
           <a:p>
             <a:pPr lvl="3"/>
             <a:r>
-              <a:rPr lang="en-US" smtClean="0"/>
+              <a:rPr lang="en-US"/>
               <a:t>Fourth level</a:t>
             </a:r>
           </a:p>
           <a:p>
             <a:pPr lvl="4"/>
             <a:r>
-              <a:rPr lang="en-US" smtClean="0"/>
+              <a:rPr lang="en-US"/>
               <a:t>Fifth level</a:t>
             </a:r>
             <a:endParaRPr lang="en-US" dirty="0"/>
@@ -5574,7 +5575,7 @@
             <a:fld id="{48A87A34-81AB-432B-8DAE-1953F412C126}" type="datetimeFigureOut">
               <a:rPr lang="en-US" smtClean="0"/>
               <a:pPr/>
-              <a:t>3/20/2017</a:t>
+              <a:t>20-Mar-17</a:t>
             </a:fld>
             <a:endParaRPr lang="en-US" dirty="0"/>
           </a:p>
@@ -6119,18 +6120,9 @@
           <a:lstStyle/>
           <a:p>
             <a:r>
-              <a:rPr lang="en-US" dirty="0" smtClean="0"/>
-              <a:t>S.C.a.R. </a:t>
-            </a:r>
-            <a:r>
-              <a:rPr lang="en-US" dirty="0" smtClean="0"/>
-              <a:t>a</a:t>
-            </a:r>
-            <a:r>
-              <a:rPr lang="en-US" dirty="0" smtClean="0"/>
-              <a:t>rcade</a:t>
-            </a:r>
-            <a:endParaRPr lang="en-US" dirty="0"/>
+              <a:rPr lang="en-US" dirty="0"/>
+              <a:t>S.C.a.R. arcade</a:t>
+            </a:r>
           </a:p>
         </p:txBody>
       </p:sp>
@@ -6193,101 +6185,47 @@
             <a:spLocks noGrp="1"/>
           </p:cNvSpPr>
           <p:nvPr>
-            <p:ph type="title"/>
-          </p:nvPr>
-        </p:nvSpPr>
-        <p:spPr>
-          <a:xfrm>
-            <a:off x="646111" y="452718"/>
-            <a:ext cx="9404723" cy="600227"/>
-          </a:xfrm>
-        </p:spPr>
-        <p:txBody>
-          <a:bodyPr/>
-          <a:lstStyle/>
-          <a:p>
-            <a:r>
-              <a:rPr lang="en-US" sz="2800" dirty="0" smtClean="0"/>
-              <a:t>Optional Features</a:t>
-            </a:r>
-            <a:endParaRPr lang="en-US" sz="2800" dirty="0"/>
-          </a:p>
-        </p:txBody>
-      </p:sp>
-      <p:sp>
-        <p:nvSpPr>
-          <p:cNvPr id="3" name="Content Placeholder 2"/>
-          <p:cNvSpPr>
-            <a:spLocks noGrp="1"/>
-          </p:cNvSpPr>
-          <p:nvPr>
-            <p:ph idx="1"/>
-          </p:nvPr>
-        </p:nvSpPr>
-        <p:spPr>
-          <a:xfrm>
-            <a:off x="646111" y="1052945"/>
-            <a:ext cx="10178907" cy="4987637"/>
-          </a:xfrm>
-        </p:spPr>
-        <p:txBody>
-          <a:bodyPr/>
-          <a:lstStyle/>
-          <a:p>
-            <a:r>
-              <a:rPr lang="en-US" dirty="0" smtClean="0"/>
-              <a:t>Adjustable games library</a:t>
-            </a:r>
-          </a:p>
-          <a:p>
-            <a:pPr lvl="1"/>
-            <a:r>
-              <a:rPr lang="en-US" dirty="0" smtClean="0"/>
-              <a:t>Add/Remove games</a:t>
-            </a:r>
-          </a:p>
-          <a:p>
-            <a:pPr lvl="1"/>
-            <a:r>
-              <a:rPr lang="en-US" dirty="0" smtClean="0"/>
-              <a:t>Additional games available through cloud</a:t>
-            </a:r>
-            <a:endParaRPr lang="en-US" dirty="0" smtClean="0"/>
-          </a:p>
-          <a:p>
-            <a:r>
-              <a:rPr lang="en-US" dirty="0" smtClean="0"/>
-              <a:t>Cloud-based Leaderboard</a:t>
-            </a:r>
-          </a:p>
-          <a:p>
-            <a:pPr lvl="1"/>
-            <a:r>
-              <a:rPr lang="en-US" dirty="0" smtClean="0"/>
-              <a:t>Track country data (Google maps API?)</a:t>
-            </a:r>
-          </a:p>
-          <a:p>
-            <a:pPr lvl="1"/>
-            <a:r>
-              <a:rPr lang="en-US" dirty="0" smtClean="0"/>
-              <a:t>Single database stored on cloud (top 100)</a:t>
-            </a:r>
-          </a:p>
-          <a:p>
-            <a:pPr lvl="1"/>
-            <a:endParaRPr lang="en-US" dirty="0" smtClean="0"/>
-          </a:p>
-          <a:p>
-            <a:pPr lvl="1"/>
-            <a:endParaRPr lang="en-US" dirty="0"/>
+            <p:ph type="ctrTitle"/>
+          </p:nvPr>
+        </p:nvSpPr>
+        <p:spPr/>
+        <p:txBody>
+          <a:bodyPr/>
+          <a:lstStyle/>
+          <a:p>
+            <a:r>
+              <a:rPr lang="en-US" dirty="0"/>
+              <a:t>Memory Test (Deck of Cards)</a:t>
+            </a:r>
+          </a:p>
+        </p:txBody>
+      </p:sp>
+      <p:sp>
+        <p:nvSpPr>
+          <p:cNvPr id="3" name="Subtitle 2"/>
+          <p:cNvSpPr>
+            <a:spLocks noGrp="1"/>
+          </p:cNvSpPr>
+          <p:nvPr>
+            <p:ph type="subTitle" idx="1"/>
+          </p:nvPr>
+        </p:nvSpPr>
+        <p:spPr/>
+        <p:txBody>
+          <a:bodyPr/>
+          <a:lstStyle/>
+          <a:p>
+            <a:r>
+              <a:rPr lang="en-US" dirty="0"/>
+              <a:t>PRESENTED BY Saxon:</a:t>
+            </a:r>
           </a:p>
         </p:txBody>
       </p:sp>
     </p:spTree>
     <p:extLst>
       <p:ext uri="{BB962C8B-B14F-4D97-AF65-F5344CB8AC3E}">
-        <p14:creationId xmlns:p14="http://schemas.microsoft.com/office/powerpoint/2010/main" val="3421208875"/>
+        <p14:creationId xmlns:p14="http://schemas.microsoft.com/office/powerpoint/2010/main" val="581551407"/>
       </p:ext>
     </p:extLst>
   </p:cSld>
@@ -6321,6 +6259,132 @@
             <a:spLocks noGrp="1"/>
           </p:cNvSpPr>
           <p:nvPr>
+            <p:ph type="title"/>
+          </p:nvPr>
+        </p:nvSpPr>
+        <p:spPr>
+          <a:xfrm>
+            <a:off x="646111" y="452718"/>
+            <a:ext cx="9404723" cy="600227"/>
+          </a:xfrm>
+        </p:spPr>
+        <p:txBody>
+          <a:bodyPr/>
+          <a:lstStyle/>
+          <a:p>
+            <a:r>
+              <a:rPr lang="en-US" sz="2800" dirty="0"/>
+              <a:t>Optional Features</a:t>
+            </a:r>
+          </a:p>
+        </p:txBody>
+      </p:sp>
+      <p:sp>
+        <p:nvSpPr>
+          <p:cNvPr id="3" name="Content Placeholder 2"/>
+          <p:cNvSpPr>
+            <a:spLocks noGrp="1"/>
+          </p:cNvSpPr>
+          <p:nvPr>
+            <p:ph idx="1"/>
+          </p:nvPr>
+        </p:nvSpPr>
+        <p:spPr>
+          <a:xfrm>
+            <a:off x="646111" y="1052945"/>
+            <a:ext cx="10178907" cy="4987637"/>
+          </a:xfrm>
+        </p:spPr>
+        <p:txBody>
+          <a:bodyPr/>
+          <a:lstStyle/>
+          <a:p>
+            <a:r>
+              <a:rPr lang="en-US" dirty="0"/>
+              <a:t>Adjustable games library</a:t>
+            </a:r>
+          </a:p>
+          <a:p>
+            <a:pPr lvl="1"/>
+            <a:r>
+              <a:rPr lang="en-US" dirty="0"/>
+              <a:t>Add/Remove games</a:t>
+            </a:r>
+          </a:p>
+          <a:p>
+            <a:pPr lvl="1"/>
+            <a:r>
+              <a:rPr lang="en-US" dirty="0"/>
+              <a:t>Additional games available through cloud</a:t>
+            </a:r>
+          </a:p>
+          <a:p>
+            <a:r>
+              <a:rPr lang="en-US" dirty="0"/>
+              <a:t>Cloud-based Leaderboard</a:t>
+            </a:r>
+          </a:p>
+          <a:p>
+            <a:pPr lvl="1"/>
+            <a:r>
+              <a:rPr lang="en-US" dirty="0"/>
+              <a:t>Track country data (Google maps API?)</a:t>
+            </a:r>
+          </a:p>
+          <a:p>
+            <a:pPr lvl="1"/>
+            <a:r>
+              <a:rPr lang="en-US" dirty="0"/>
+              <a:t>Single database stored on cloud (top 100)</a:t>
+            </a:r>
+          </a:p>
+          <a:p>
+            <a:pPr lvl="1"/>
+            <a:endParaRPr lang="en-US" dirty="0"/>
+          </a:p>
+          <a:p>
+            <a:pPr lvl="1"/>
+            <a:endParaRPr lang="en-US" dirty="0"/>
+          </a:p>
+        </p:txBody>
+      </p:sp>
+    </p:spTree>
+    <p:extLst>
+      <p:ext uri="{BB962C8B-B14F-4D97-AF65-F5344CB8AC3E}">
+        <p14:creationId xmlns:p14="http://schemas.microsoft.com/office/powerpoint/2010/main" val="3421208875"/>
+      </p:ext>
+    </p:extLst>
+  </p:cSld>
+  <p:clrMapOvr>
+    <a:masterClrMapping/>
+  </p:clrMapOvr>
+</p:sld>
+</file>
+
+<file path=ppt/slides/slide12.xml><?xml version="1.0" encoding="utf-8"?>
+<p:sld xmlns:a="http://schemas.openxmlformats.org/drawingml/2006/main" xmlns:r="http://schemas.openxmlformats.org/officeDocument/2006/relationships" xmlns:p="http://schemas.openxmlformats.org/presentationml/2006/main">
+  <p:cSld>
+    <p:spTree>
+      <p:nvGrpSpPr>
+        <p:cNvPr id="1" name=""/>
+        <p:cNvGrpSpPr/>
+        <p:nvPr/>
+      </p:nvGrpSpPr>
+      <p:grpSpPr>
+        <a:xfrm>
+          <a:off x="0" y="0"/>
+          <a:ext cx="0" cy="0"/>
+          <a:chOff x="0" y="0"/>
+          <a:chExt cx="0" cy="0"/>
+        </a:xfrm>
+      </p:grpSpPr>
+      <p:sp>
+        <p:nvSpPr>
+          <p:cNvPr id="2" name="Title 1"/>
+          <p:cNvSpPr>
+            <a:spLocks noGrp="1"/>
+          </p:cNvSpPr>
+          <p:nvPr>
             <p:ph type="ctrTitle"/>
           </p:nvPr>
         </p:nvSpPr>
@@ -6330,11 +6394,11 @@
           <a:lstStyle/>
           <a:p>
             <a:r>
-              <a:rPr lang="en-US" dirty="0" smtClean="0"/>
+              <a:rPr lang="en-US" dirty="0"/>
               <a:t>Thank you. </a:t>
             </a:r>
             <a:r>
-              <a:rPr lang="en-US" dirty="0" smtClean="0">
+              <a:rPr lang="en-US" dirty="0">
                 <a:sym typeface="Wingdings" panose="05000000000000000000" pitchFamily="2" charset="2"/>
               </a:rPr>
               <a:t> </a:t>
@@ -6409,13 +6473,8 @@
           <a:p>
             <a:r>
               <a:rPr lang="en-US" dirty="0"/>
-              <a:t>What </a:t>
-            </a:r>
-            <a:r>
-              <a:rPr lang="en-US" dirty="0" smtClean="0"/>
-              <a:t>is S.C.a.R. arcade?</a:t>
-            </a:r>
-            <a:endParaRPr lang="en-US" dirty="0"/>
+              <a:t>What is S.C.a.R. arcade?</a:t>
+            </a:r>
           </a:p>
         </p:txBody>
       </p:sp>
@@ -6436,23 +6495,7 @@
           <a:p>
             <a:r>
               <a:rPr lang="en-US" dirty="0"/>
-              <a:t>A game arcade</a:t>
-            </a:r>
-            <a:r>
-              <a:rPr lang="en-US" dirty="0" smtClean="0"/>
-              <a:t>, initially </a:t>
-            </a:r>
-            <a:r>
-              <a:rPr lang="en-US" dirty="0"/>
-              <a:t>featuring </a:t>
-            </a:r>
-            <a:r>
-              <a:rPr lang="en-US" dirty="0" smtClean="0"/>
-              <a:t>2 </a:t>
-            </a:r>
-            <a:r>
-              <a:rPr lang="en-US" dirty="0"/>
-              <a:t>different games:</a:t>
+              <a:t>A game arcade, initially featuring 2 different games:</a:t>
             </a:r>
           </a:p>
           <a:p>
@@ -6466,50 +6509,42 @@
             <a:pPr lvl="1"/>
             <a:r>
               <a:rPr lang="en-US" dirty="0"/>
-              <a:t>Memory test (Deck of cards</a:t>
-            </a:r>
-            <a:r>
-              <a:rPr lang="en-US" dirty="0" smtClean="0"/>
-              <a:t>).</a:t>
-            </a:r>
-            <a:endParaRPr lang="en-US" dirty="0"/>
-          </a:p>
-          <a:p>
-            <a:r>
-              <a:rPr lang="en-US" dirty="0" smtClean="0"/>
+              <a:t>Memory test (Deck of cards).</a:t>
+            </a:r>
+          </a:p>
+          <a:p>
+            <a:r>
+              <a:rPr lang="en-US" dirty="0"/>
               <a:t>Possible stretch goals:</a:t>
             </a:r>
-            <a:endParaRPr lang="en-US" dirty="0" smtClean="0"/>
           </a:p>
           <a:p>
             <a:pPr lvl="1"/>
             <a:r>
-              <a:rPr lang="en-US" dirty="0" smtClean="0"/>
+              <a:rPr lang="en-US" dirty="0"/>
               <a:t>Features cloud-integrated leaderboards.</a:t>
             </a:r>
           </a:p>
           <a:p>
             <a:pPr lvl="1"/>
             <a:r>
-              <a:rPr lang="en-US" dirty="0" smtClean="0"/>
+              <a:rPr lang="en-US" dirty="0"/>
               <a:t>Adjustable games library.</a:t>
             </a:r>
-            <a:endParaRPr lang="en-US" dirty="0"/>
           </a:p>
           <a:p>
             <a:pPr lvl="1"/>
             <a:r>
-              <a:rPr lang="en-US" dirty="0" smtClean="0"/>
+              <a:rPr lang="en-US" dirty="0"/>
               <a:t>Discussed towards end of presentation.</a:t>
             </a:r>
           </a:p>
           <a:p>
             <a:pPr lvl="1"/>
             <a:r>
-              <a:rPr lang="en-US" dirty="0" smtClean="0"/>
+              <a:rPr lang="en-US" dirty="0"/>
               <a:t>Possible third game implemented (Gyroscope ball maze).</a:t>
             </a:r>
-            <a:endParaRPr lang="en-US" dirty="0" smtClean="0"/>
           </a:p>
         </p:txBody>
       </p:sp>
@@ -6560,17 +6595,8 @@
           <a:p>
             <a:r>
               <a:rPr lang="en-US" dirty="0"/>
-              <a:t>Why </a:t>
-            </a:r>
-            <a:r>
-              <a:rPr lang="en-US" dirty="0"/>
-              <a:t>a</a:t>
-            </a:r>
-            <a:r>
-              <a:rPr lang="en-US" dirty="0" smtClean="0"/>
-              <a:t> game arcade?</a:t>
-            </a:r>
-            <a:endParaRPr lang="en-US" dirty="0"/>
+              <a:t>Why a game arcade?</a:t>
+            </a:r>
           </a:p>
         </p:txBody>
       </p:sp>
@@ -6614,20 +6640,15 @@
             <a:pPr lvl="1"/>
             <a:r>
               <a:rPr lang="en-US" dirty="0"/>
-              <a:t>Use of </a:t>
-            </a:r>
-            <a:r>
-              <a:rPr lang="en-US" dirty="0" smtClean="0"/>
-              <a:t>sensors</a:t>
+              <a:t>Use of sensors</a:t>
             </a:r>
           </a:p>
           <a:p>
             <a:pPr lvl="1"/>
             <a:r>
-              <a:rPr lang="en-US" dirty="0" smtClean="0"/>
+              <a:rPr lang="en-US" dirty="0"/>
               <a:t>Utilizing cloud services</a:t>
             </a:r>
-            <a:endParaRPr lang="en-US" dirty="0"/>
           </a:p>
           <a:p>
             <a:r>
@@ -6683,10 +6704,9 @@
           <a:lstStyle/>
           <a:p>
             <a:r>
-              <a:rPr lang="en-US" dirty="0" smtClean="0"/>
+              <a:rPr lang="en-US" dirty="0"/>
               <a:t>Game selection interface</a:t>
             </a:r>
-            <a:endParaRPr lang="en-US" dirty="0"/>
           </a:p>
         </p:txBody>
       </p:sp>
@@ -6711,10 +6731,9 @@
           <a:lstStyle/>
           <a:p>
             <a:r>
-              <a:rPr lang="en-US" dirty="0" smtClean="0"/>
+              <a:rPr lang="en-US" dirty="0"/>
               <a:t>Notes:</a:t>
             </a:r>
-            <a:endParaRPr lang="en-US" dirty="0"/>
           </a:p>
         </p:txBody>
       </p:sp>
@@ -6741,45 +6760,20 @@
           <a:lstStyle/>
           <a:p>
             <a:r>
-              <a:rPr lang="en-US" dirty="0" smtClean="0"/>
-              <a:t>This </a:t>
-            </a:r>
-            <a:r>
-              <a:rPr lang="en-US" dirty="0" smtClean="0"/>
-              <a:t>is the </a:t>
-            </a:r>
-            <a:r>
-              <a:rPr lang="en-US" dirty="0" smtClean="0"/>
-              <a:t>screen that users are presented with upon starting the application.</a:t>
-            </a:r>
-            <a:endParaRPr lang="en-US" dirty="0"/>
-          </a:p>
-          <a:p>
-            <a:r>
               <a:rPr lang="en-US" dirty="0"/>
-              <a:t>Grid layout with </a:t>
-            </a:r>
-            <a:r>
-              <a:rPr lang="en-US" dirty="0" smtClean="0"/>
-              <a:t>selectable buttons </a:t>
-            </a:r>
+              <a:t>This is the screen that users are presented with upon starting the application.</a:t>
+            </a:r>
+          </a:p>
+          <a:p>
             <a:r>
               <a:rPr lang="en-US" dirty="0"/>
-              <a:t>to run a specific game.</a:t>
+              <a:t>Grid layout with selectable buttons to run a specific game.</a:t>
             </a:r>
           </a:p>
           <a:p>
             <a:r>
               <a:rPr lang="en-US" dirty="0"/>
-              <a:t>Simple, informative, conveys all necessary information </a:t>
-            </a:r>
-            <a:r>
-              <a:rPr lang="en-US" dirty="0" smtClean="0"/>
-              <a:t>while efficiently using screen </a:t>
-            </a:r>
-            <a:r>
-              <a:rPr lang="en-US" dirty="0"/>
-              <a:t>‘real-estate’.</a:t>
+              <a:t>Simple, informative, conveys all necessary information while efficiently using screen ‘real-estate’.</a:t>
             </a:r>
           </a:p>
           <a:p>
@@ -6814,10 +6808,9 @@
           <a:lstStyle/>
           <a:p>
             <a:r>
-              <a:rPr lang="en-US" sz="1400" dirty="0" smtClean="0"/>
+              <a:rPr lang="en-US" sz="1400" dirty="0"/>
               <a:t>Figure 1: Game selection interface v.1 (Ryan)</a:t>
             </a:r>
-            <a:endParaRPr lang="en-US" sz="1400" dirty="0"/>
           </a:p>
         </p:txBody>
       </p:sp>
@@ -6890,10 +6883,9 @@
           <a:lstStyle/>
           <a:p>
             <a:r>
-              <a:rPr lang="en-US" sz="4400" dirty="0" smtClean="0"/>
+              <a:rPr lang="en-US" sz="4400" dirty="0"/>
               <a:t>Generic game menu interface</a:t>
             </a:r>
-            <a:endParaRPr lang="en-US" sz="4400" dirty="0"/>
           </a:p>
         </p:txBody>
       </p:sp>
@@ -6948,61 +6940,40 @@
           <a:p>
             <a:r>
               <a:rPr lang="en-US" dirty="0"/>
-              <a:t>Each game uses the same </a:t>
-            </a:r>
-            <a:r>
-              <a:rPr lang="en-US" dirty="0" smtClean="0"/>
-              <a:t>menu interface, </a:t>
-            </a:r>
+              <a:t>Each game uses the same menu interface, providing a consistent look and feel across the application.</a:t>
+            </a:r>
+          </a:p>
+          <a:p>
             <a:r>
               <a:rPr lang="en-US" dirty="0"/>
-              <a:t>providing a consistent look and feel across the application.</a:t>
+              <a:t>Aesthetic variations can be applied to uniquely identify games (colour scheme, background, game title).</a:t>
             </a:r>
           </a:p>
           <a:p>
             <a:r>
               <a:rPr lang="en-US" dirty="0"/>
-              <a:t>Aesthetic variations can be </a:t>
-            </a:r>
-            <a:r>
-              <a:rPr lang="en-US" dirty="0" smtClean="0"/>
-              <a:t>applied to </a:t>
-            </a:r>
+              <a:t>Each game will have 5 levels.</a:t>
+            </a:r>
+          </a:p>
+          <a:p>
             <a:r>
               <a:rPr lang="en-US" dirty="0"/>
-              <a:t>uniquely identify games (colour scheme, background, game title).</a:t>
-            </a:r>
-          </a:p>
-          <a:p>
+              <a:t>Level 5 will have an exponentially high difficulty. </a:t>
+            </a:r>
+          </a:p>
+          <a:p>
+            <a:pPr lvl="1"/>
             <a:r>
               <a:rPr lang="en-US" dirty="0"/>
-              <a:t>Each game will have 5 levels</a:t>
-            </a:r>
-            <a:r>
-              <a:rPr lang="en-US" dirty="0" smtClean="0"/>
-              <a:t>.</a:t>
-            </a:r>
-          </a:p>
-          <a:p>
-            <a:r>
-              <a:rPr lang="en-US" dirty="0" smtClean="0"/>
-              <a:t>Level 5 will have an exponentially high difficulty. </a:t>
+              <a:t>Memory test: hint will disabled, number of cards will increase, and cards will re-shuffle upon fail.</a:t>
             </a:r>
           </a:p>
           <a:p>
             <a:pPr lvl="1"/>
             <a:r>
-              <a:rPr lang="en-US" dirty="0" smtClean="0"/>
-              <a:t>Memory test: hint will disabled, number of cards will increase, and cards will re-shuffle upon fail.</a:t>
-            </a:r>
-          </a:p>
-          <a:p>
-            <a:pPr lvl="1"/>
-            <a:r>
-              <a:rPr lang="en-US" dirty="0" smtClean="0"/>
-              <a:t>Tower of Hanoi: Number of disk will increase to 8, implemented timer. </a:t>
-            </a:r>
-            <a:endParaRPr lang="en-US" dirty="0" smtClean="0"/>
+              <a:rPr lang="en-US" dirty="0"/>
+              <a:t>Tower of Hanoi: Number of disk will increase to 8. </a:t>
+            </a:r>
           </a:p>
         </p:txBody>
       </p:sp>
@@ -7028,17 +6999,16 @@
           <a:p>
             <a:pPr algn="r"/>
             <a:r>
-              <a:rPr lang="en-US" sz="1600" dirty="0" smtClean="0"/>
+              <a:rPr lang="en-US" sz="1600" dirty="0"/>
               <a:t>Figure 2: Menu Interface</a:t>
             </a:r>
           </a:p>
           <a:p>
             <a:pPr algn="r"/>
             <a:r>
-              <a:rPr lang="en-US" sz="1600" dirty="0" smtClean="0"/>
+              <a:rPr lang="en-US" sz="1600" dirty="0"/>
               <a:t>(Charles)</a:t>
             </a:r>
-            <a:endParaRPr lang="en-US" sz="1600" dirty="0"/>
           </a:p>
         </p:txBody>
       </p:sp>
@@ -7110,10 +7080,9 @@
           <a:lstStyle/>
           <a:p>
             <a:r>
-              <a:rPr lang="en-US" dirty="0" smtClean="0"/>
+              <a:rPr lang="en-US" dirty="0"/>
               <a:t>Leaderboard Interface</a:t>
             </a:r>
-            <a:endParaRPr lang="en-US" dirty="0"/>
           </a:p>
         </p:txBody>
       </p:sp>
@@ -7133,7 +7102,7 @@
           <a:lstStyle/>
           <a:p>
             <a:r>
-              <a:rPr lang="en-US" dirty="0" smtClean="0"/>
+              <a:rPr lang="en-US" dirty="0"/>
               <a:t>Notes:</a:t>
             </a:r>
             <a:endParaRPr lang="en-AU" dirty="0"/>
@@ -7161,37 +7130,37 @@
           <a:lstStyle/>
           <a:p>
             <a:r>
-              <a:rPr lang="en-US" dirty="0" smtClean="0"/>
+              <a:rPr lang="en-US" dirty="0"/>
               <a:t>Generic leaderboard interface shared across games.</a:t>
             </a:r>
           </a:p>
           <a:p>
             <a:r>
-              <a:rPr lang="en-US" dirty="0" smtClean="0"/>
+              <a:rPr lang="en-US" dirty="0"/>
               <a:t>Game title colour scheme vary across games.</a:t>
             </a:r>
           </a:p>
           <a:p>
             <a:r>
-              <a:rPr lang="en-US" dirty="0" smtClean="0"/>
+              <a:rPr lang="en-US" dirty="0"/>
               <a:t>Leaderboard is a scrollable list view updated from local database in the application.</a:t>
             </a:r>
           </a:p>
           <a:p>
             <a:r>
-              <a:rPr lang="en-US" dirty="0" smtClean="0"/>
+              <a:rPr lang="en-US" dirty="0"/>
               <a:t>Shows top 100 players.</a:t>
             </a:r>
           </a:p>
           <a:p>
             <a:r>
-              <a:rPr lang="en-US" dirty="0" smtClean="0"/>
+              <a:rPr lang="en-US" dirty="0"/>
               <a:t>Score from previous game is highlighted in leaderboard.</a:t>
             </a:r>
           </a:p>
           <a:p>
             <a:r>
-              <a:rPr lang="en-US" dirty="0" smtClean="0"/>
+              <a:rPr lang="en-US" dirty="0"/>
               <a:t>Scores with matching name are highlighted in bold.</a:t>
             </a:r>
             <a:endParaRPr lang="en-AU" dirty="0"/>
@@ -7219,14 +7188,14 @@
           <a:lstStyle/>
           <a:p>
             <a:r>
-              <a:rPr lang="en-US" sz="1600" dirty="0" smtClean="0"/>
+              <a:rPr lang="en-US" sz="1600" dirty="0"/>
               <a:t>Figure</a:t>
             </a:r>
             <a:r>
-              <a:rPr lang="en-AU" sz="1600" dirty="0" smtClean="0"/>
+              <a:rPr lang="en-AU" sz="1600" dirty="0"/>
               <a:t> 3: Leaderboard Interface</a:t>
             </a:r>
-            <a:endParaRPr lang="en-US" sz="1600" dirty="0" smtClean="0"/>
+            <a:endParaRPr lang="en-US" sz="1600" dirty="0"/>
           </a:p>
         </p:txBody>
       </p:sp>
@@ -7305,7 +7274,7 @@
           <a:lstStyle/>
           <a:p>
             <a:r>
-              <a:rPr lang="en-US" dirty="0" smtClean="0"/>
+              <a:rPr lang="en-US" dirty="0"/>
               <a:t>Development Plan:</a:t>
             </a:r>
             <a:endParaRPr lang="en-AU" dirty="0"/>
@@ -7373,7 +7342,7 @@
             <a:spLocks noGrp="1"/>
           </p:cNvSpPr>
           <p:nvPr>
-            <p:ph type="ctrTitle"/>
+            <p:ph type="title"/>
           </p:nvPr>
         </p:nvSpPr>
         <p:spPr/>
@@ -7383,46 +7352,146 @@
           <a:p>
             <a:r>
               <a:rPr lang="en-US" dirty="0"/>
-              <a:t>Tower </a:t>
-            </a:r>
-            <a:r>
-              <a:rPr lang="en-US" dirty="0" smtClean="0"/>
-              <a:t>of Hanoi</a:t>
-            </a:r>
+              <a:t>Tower of Hanoi interface:</a:t>
+            </a:r>
+          </a:p>
+        </p:txBody>
+      </p:sp>
+      <p:sp>
+        <p:nvSpPr>
+          <p:cNvPr id="3" name="Text Placeholder 2"/>
+          <p:cNvSpPr>
+            <a:spLocks noGrp="1"/>
+          </p:cNvSpPr>
+          <p:nvPr>
+            <p:ph type="body" idx="1"/>
+          </p:nvPr>
+        </p:nvSpPr>
+        <p:spPr>
+          <a:xfrm>
+            <a:off x="646111" y="1270681"/>
+            <a:ext cx="4396338" cy="576262"/>
+          </a:xfrm>
+        </p:spPr>
+        <p:txBody>
+          <a:bodyPr/>
+          <a:lstStyle/>
+          <a:p>
             <a:r>
               <a:rPr lang="en-US" dirty="0"/>
-              <a:t>:</a:t>
-            </a:r>
-          </a:p>
-        </p:txBody>
-      </p:sp>
-      <p:sp>
-        <p:nvSpPr>
-          <p:cNvPr id="3" name="Subtitle 2"/>
-          <p:cNvSpPr>
-            <a:spLocks noGrp="1"/>
-          </p:cNvSpPr>
-          <p:nvPr>
-            <p:ph type="subTitle" idx="1"/>
-          </p:nvPr>
-        </p:nvSpPr>
-        <p:spPr/>
-        <p:txBody>
-          <a:bodyPr/>
-          <a:lstStyle/>
-          <a:p>
-            <a:r>
-              <a:rPr lang="en-US" dirty="0" smtClean="0"/>
-              <a:t>Presented by Ryan:</a:t>
-            </a:r>
-            <a:endParaRPr lang="en-US" dirty="0"/>
-          </a:p>
-        </p:txBody>
-      </p:sp>
+              <a:t>Notes:</a:t>
+            </a:r>
+          </a:p>
+        </p:txBody>
+      </p:sp>
+      <p:sp>
+        <p:nvSpPr>
+          <p:cNvPr id="4" name="Content Placeholder 3"/>
+          <p:cNvSpPr>
+            <a:spLocks noGrp="1"/>
+          </p:cNvSpPr>
+          <p:nvPr>
+            <p:ph sz="half" idx="2"/>
+          </p:nvPr>
+        </p:nvSpPr>
+        <p:spPr>
+          <a:xfrm>
+            <a:off x="646110" y="1880281"/>
+            <a:ext cx="4396339" cy="3741738"/>
+          </a:xfrm>
+        </p:spPr>
+        <p:txBody>
+          <a:bodyPr>
+            <a:normAutofit fontScale="92500" lnSpcReduction="10000"/>
+          </a:bodyPr>
+          <a:lstStyle/>
+          <a:p>
+            <a:r>
+              <a:rPr lang="en-US" dirty="0"/>
+              <a:t>The timer will be recorded and be viewable from the leaderboard (if the user is placed in the top 100). </a:t>
+            </a:r>
+          </a:p>
+          <a:p>
+            <a:r>
+              <a:rPr lang="en-US" dirty="0"/>
+              <a:t>Once the game has finished the score will be submitted to the cloud services.</a:t>
+            </a:r>
+            <a:endParaRPr lang="en-US" dirty="0"/>
+          </a:p>
+          <a:p>
+            <a:r>
+              <a:rPr lang="en-US" dirty="0"/>
+              <a:t>Options of reply, and quitting the game.</a:t>
+            </a:r>
+          </a:p>
+          <a:p>
+            <a:r>
+              <a:rPr lang="en-US" dirty="0"/>
+              <a:t>Disks will display numbers to make it easier to differentiate. </a:t>
+            </a:r>
+          </a:p>
+          <a:p>
+            <a:r>
+              <a:rPr lang="en-US" dirty="0"/>
+              <a:t>Note the optimal number of moves will also be displayed as to challenge the player to match it. </a:t>
+            </a:r>
+          </a:p>
+        </p:txBody>
+      </p:sp>
+      <p:sp>
+        <p:nvSpPr>
+          <p:cNvPr id="5" name="Text Placeholder 4"/>
+          <p:cNvSpPr>
+            <a:spLocks noGrp="1"/>
+          </p:cNvSpPr>
+          <p:nvPr>
+            <p:ph type="body" sz="quarter" idx="3"/>
+          </p:nvPr>
+        </p:nvSpPr>
+        <p:spPr>
+          <a:xfrm>
+            <a:off x="5233760" y="5094290"/>
+            <a:ext cx="5275901" cy="576262"/>
+          </a:xfrm>
+        </p:spPr>
+        <p:txBody>
+          <a:bodyPr/>
+          <a:lstStyle/>
+          <a:p>
+            <a:r>
+              <a:rPr lang="en-US" sz="1400" dirty="0"/>
+              <a:t>Figure 3: Tower of Hanoi interface (Ryan)</a:t>
+            </a:r>
+          </a:p>
+        </p:txBody>
+      </p:sp>
+      <p:pic>
+        <p:nvPicPr>
+          <p:cNvPr id="15" name="Content Placeholder 14"/>
+          <p:cNvPicPr>
+            <a:picLocks noGrp="1" noChangeAspect="1"/>
+          </p:cNvPicPr>
+          <p:nvPr>
+            <p:ph sz="quarter" idx="4"/>
+          </p:nvPr>
+        </p:nvPicPr>
+        <p:blipFill>
+          <a:blip r:embed="rId2"/>
+          <a:stretch>
+            <a:fillRect/>
+          </a:stretch>
+        </p:blipFill>
+        <p:spPr>
+          <a:xfrm>
+            <a:off x="5233759" y="1880280"/>
+            <a:ext cx="5275901" cy="3214009"/>
+          </a:xfrm>
+        </p:spPr>
+      </p:pic>
     </p:spTree>
     <p:extLst>
       <p:ext uri="{BB962C8B-B14F-4D97-AF65-F5344CB8AC3E}">
-        <p14:creationId xmlns:p14="http://schemas.microsoft.com/office/powerpoint/2010/main" val="993397549"/>
+        <p14:creationId xmlns:p14="http://schemas.microsoft.com/office/powerpoint/2010/main" val="1086719348"/>
       </p:ext>
     </p:extLst>
   </p:cSld>
@@ -7466,7 +7535,7 @@
           <a:p>
             <a:r>
               <a:rPr lang="en-US" dirty="0"/>
-              <a:t>Memory Test (Deck of Cards)</a:t>
+              <a:t>Tower of Hanoi:</a:t>
             </a:r>
           </a:p>
         </p:txBody>
@@ -7487,17 +7556,16 @@
           <a:lstStyle/>
           <a:p>
             <a:r>
-              <a:rPr lang="en-US" dirty="0" smtClean="0"/>
-              <a:t>PRESENTED BY Saxon:</a:t>
-            </a:r>
-            <a:endParaRPr lang="en-US" dirty="0"/>
+              <a:rPr lang="en-US" dirty="0"/>
+              <a:t>Presented by Ryan:</a:t>
+            </a:r>
           </a:p>
         </p:txBody>
       </p:sp>
     </p:spTree>
     <p:extLst>
       <p:ext uri="{BB962C8B-B14F-4D97-AF65-F5344CB8AC3E}">
-        <p14:creationId xmlns:p14="http://schemas.microsoft.com/office/powerpoint/2010/main" val="581551407"/>
+        <p14:creationId xmlns:p14="http://schemas.microsoft.com/office/powerpoint/2010/main" val="993397549"/>
       </p:ext>
     </p:extLst>
   </p:cSld>

</xml_diff>

<commit_message>
Slides were out of order(fixed them)
</commit_message>
<xml_diff>
--- a/SCaRArcade.pptx
+++ b/SCaRArcade.pptx
@@ -12,8 +12,8 @@
     <p:sldId id="268" r:id="rId6"/>
     <p:sldId id="269" r:id="rId7"/>
     <p:sldId id="271" r:id="rId8"/>
-    <p:sldId id="272" r:id="rId9"/>
-    <p:sldId id="261" r:id="rId10"/>
+    <p:sldId id="261" r:id="rId9"/>
+    <p:sldId id="272" r:id="rId10"/>
     <p:sldId id="262" r:id="rId11"/>
     <p:sldId id="270" r:id="rId12"/>
     <p:sldId id="266" r:id="rId13"/>
@@ -7342,7 +7342,7 @@
             <a:spLocks noGrp="1"/>
           </p:cNvSpPr>
           <p:nvPr>
-            <p:ph type="title"/>
+            <p:ph type="ctrTitle"/>
           </p:nvPr>
         </p:nvSpPr>
         <p:spPr/>
@@ -7352,146 +7352,37 @@
           <a:p>
             <a:r>
               <a:rPr lang="en-US" dirty="0"/>
-              <a:t>Tower of Hanoi interface:</a:t>
-            </a:r>
-          </a:p>
-        </p:txBody>
-      </p:sp>
-      <p:sp>
-        <p:nvSpPr>
-          <p:cNvPr id="3" name="Text Placeholder 2"/>
-          <p:cNvSpPr>
-            <a:spLocks noGrp="1"/>
-          </p:cNvSpPr>
-          <p:nvPr>
-            <p:ph type="body" idx="1"/>
-          </p:nvPr>
-        </p:nvSpPr>
-        <p:spPr>
-          <a:xfrm>
-            <a:off x="646111" y="1270681"/>
-            <a:ext cx="4396338" cy="576262"/>
-          </a:xfrm>
-        </p:spPr>
+              <a:t>Tower of Hanoi:</a:t>
+            </a:r>
+          </a:p>
+        </p:txBody>
+      </p:sp>
+      <p:sp>
+        <p:nvSpPr>
+          <p:cNvPr id="3" name="Subtitle 2"/>
+          <p:cNvSpPr>
+            <a:spLocks noGrp="1"/>
+          </p:cNvSpPr>
+          <p:nvPr>
+            <p:ph type="subTitle" idx="1"/>
+          </p:nvPr>
+        </p:nvSpPr>
+        <p:spPr/>
         <p:txBody>
           <a:bodyPr/>
           <a:lstStyle/>
           <a:p>
             <a:r>
               <a:rPr lang="en-US" dirty="0"/>
-              <a:t>Notes:</a:t>
-            </a:r>
-          </a:p>
-        </p:txBody>
-      </p:sp>
-      <p:sp>
-        <p:nvSpPr>
-          <p:cNvPr id="4" name="Content Placeholder 3"/>
-          <p:cNvSpPr>
-            <a:spLocks noGrp="1"/>
-          </p:cNvSpPr>
-          <p:nvPr>
-            <p:ph sz="half" idx="2"/>
-          </p:nvPr>
-        </p:nvSpPr>
-        <p:spPr>
-          <a:xfrm>
-            <a:off x="646110" y="1880281"/>
-            <a:ext cx="4396339" cy="3741738"/>
-          </a:xfrm>
-        </p:spPr>
-        <p:txBody>
-          <a:bodyPr>
-            <a:normAutofit fontScale="92500" lnSpcReduction="10000"/>
-          </a:bodyPr>
-          <a:lstStyle/>
-          <a:p>
-            <a:r>
-              <a:rPr lang="en-US" dirty="0"/>
-              <a:t>The timer will be recorded and be viewable from the leaderboard (if the user is placed in the top 100). </a:t>
-            </a:r>
-          </a:p>
-          <a:p>
-            <a:r>
-              <a:rPr lang="en-US" dirty="0"/>
-              <a:t>Once the game has finished the score will be submitted to the cloud services.</a:t>
-            </a:r>
-            <a:endParaRPr lang="en-US" dirty="0"/>
-          </a:p>
-          <a:p>
-            <a:r>
-              <a:rPr lang="en-US" dirty="0"/>
-              <a:t>Options of reply, and quitting the game.</a:t>
-            </a:r>
-          </a:p>
-          <a:p>
-            <a:r>
-              <a:rPr lang="en-US" dirty="0"/>
-              <a:t>Disks will display numbers to make it easier to differentiate. </a:t>
-            </a:r>
-          </a:p>
-          <a:p>
-            <a:r>
-              <a:rPr lang="en-US" dirty="0"/>
-              <a:t>Note the optimal number of moves will also be displayed as to challenge the player to match it. </a:t>
-            </a:r>
-          </a:p>
-        </p:txBody>
-      </p:sp>
-      <p:sp>
-        <p:nvSpPr>
-          <p:cNvPr id="5" name="Text Placeholder 4"/>
-          <p:cNvSpPr>
-            <a:spLocks noGrp="1"/>
-          </p:cNvSpPr>
-          <p:nvPr>
-            <p:ph type="body" sz="quarter" idx="3"/>
-          </p:nvPr>
-        </p:nvSpPr>
-        <p:spPr>
-          <a:xfrm>
-            <a:off x="5233760" y="5094290"/>
-            <a:ext cx="5275901" cy="576262"/>
-          </a:xfrm>
-        </p:spPr>
-        <p:txBody>
-          <a:bodyPr/>
-          <a:lstStyle/>
-          <a:p>
-            <a:r>
-              <a:rPr lang="en-US" sz="1400" dirty="0"/>
-              <a:t>Figure 3: Tower of Hanoi interface (Ryan)</a:t>
-            </a:r>
-          </a:p>
-        </p:txBody>
-      </p:sp>
-      <p:pic>
-        <p:nvPicPr>
-          <p:cNvPr id="15" name="Content Placeholder 14"/>
-          <p:cNvPicPr>
-            <a:picLocks noGrp="1" noChangeAspect="1"/>
-          </p:cNvPicPr>
-          <p:nvPr>
-            <p:ph sz="quarter" idx="4"/>
-          </p:nvPr>
-        </p:nvPicPr>
-        <p:blipFill>
-          <a:blip r:embed="rId2"/>
-          <a:stretch>
-            <a:fillRect/>
-          </a:stretch>
-        </p:blipFill>
-        <p:spPr>
-          <a:xfrm>
-            <a:off x="5233759" y="1880280"/>
-            <a:ext cx="5275901" cy="3214009"/>
-          </a:xfrm>
-        </p:spPr>
-      </p:pic>
+              <a:t>Presented by Ryan:</a:t>
+            </a:r>
+          </a:p>
+        </p:txBody>
+      </p:sp>
     </p:spTree>
     <p:extLst>
       <p:ext uri="{BB962C8B-B14F-4D97-AF65-F5344CB8AC3E}">
-        <p14:creationId xmlns:p14="http://schemas.microsoft.com/office/powerpoint/2010/main" val="1086719348"/>
+        <p14:creationId xmlns:p14="http://schemas.microsoft.com/office/powerpoint/2010/main" val="993397549"/>
       </p:ext>
     </p:extLst>
   </p:cSld>
@@ -7525,7 +7416,7 @@
             <a:spLocks noGrp="1"/>
           </p:cNvSpPr>
           <p:nvPr>
-            <p:ph type="ctrTitle"/>
+            <p:ph type="title"/>
           </p:nvPr>
         </p:nvSpPr>
         <p:spPr/>
@@ -7535,37 +7426,145 @@
           <a:p>
             <a:r>
               <a:rPr lang="en-US" dirty="0"/>
-              <a:t>Tower of Hanoi:</a:t>
-            </a:r>
-          </a:p>
-        </p:txBody>
-      </p:sp>
-      <p:sp>
-        <p:nvSpPr>
-          <p:cNvPr id="3" name="Subtitle 2"/>
-          <p:cNvSpPr>
-            <a:spLocks noGrp="1"/>
-          </p:cNvSpPr>
-          <p:nvPr>
-            <p:ph type="subTitle" idx="1"/>
-          </p:nvPr>
-        </p:nvSpPr>
-        <p:spPr/>
+              <a:t>Tower of Hanoi interface:</a:t>
+            </a:r>
+          </a:p>
+        </p:txBody>
+      </p:sp>
+      <p:sp>
+        <p:nvSpPr>
+          <p:cNvPr id="3" name="Text Placeholder 2"/>
+          <p:cNvSpPr>
+            <a:spLocks noGrp="1"/>
+          </p:cNvSpPr>
+          <p:nvPr>
+            <p:ph type="body" idx="1"/>
+          </p:nvPr>
+        </p:nvSpPr>
+        <p:spPr>
+          <a:xfrm>
+            <a:off x="646111" y="1270681"/>
+            <a:ext cx="4396338" cy="576262"/>
+          </a:xfrm>
+        </p:spPr>
         <p:txBody>
           <a:bodyPr/>
           <a:lstStyle/>
           <a:p>
             <a:r>
               <a:rPr lang="en-US" dirty="0"/>
-              <a:t>Presented by Ryan:</a:t>
-            </a:r>
-          </a:p>
-        </p:txBody>
-      </p:sp>
+              <a:t>Notes:</a:t>
+            </a:r>
+          </a:p>
+        </p:txBody>
+      </p:sp>
+      <p:sp>
+        <p:nvSpPr>
+          <p:cNvPr id="4" name="Content Placeholder 3"/>
+          <p:cNvSpPr>
+            <a:spLocks noGrp="1"/>
+          </p:cNvSpPr>
+          <p:nvPr>
+            <p:ph sz="half" idx="2"/>
+          </p:nvPr>
+        </p:nvSpPr>
+        <p:spPr>
+          <a:xfrm>
+            <a:off x="646110" y="1880281"/>
+            <a:ext cx="4396339" cy="3741738"/>
+          </a:xfrm>
+        </p:spPr>
+        <p:txBody>
+          <a:bodyPr>
+            <a:normAutofit fontScale="92500" lnSpcReduction="10000"/>
+          </a:bodyPr>
+          <a:lstStyle/>
+          <a:p>
+            <a:r>
+              <a:rPr lang="en-US" dirty="0"/>
+              <a:t>The timer will be recorded and be viewable from the leaderboard (if the user is placed in the top 100). </a:t>
+            </a:r>
+          </a:p>
+          <a:p>
+            <a:r>
+              <a:rPr lang="en-US" dirty="0"/>
+              <a:t>Once the game has finished the score will be submitted to the cloud services.</a:t>
+            </a:r>
+          </a:p>
+          <a:p>
+            <a:r>
+              <a:rPr lang="en-US" dirty="0"/>
+              <a:t>Options of reply, and quitting the game.</a:t>
+            </a:r>
+          </a:p>
+          <a:p>
+            <a:r>
+              <a:rPr lang="en-US" dirty="0"/>
+              <a:t>Disks will display numbers to make it easier to differentiate. </a:t>
+            </a:r>
+          </a:p>
+          <a:p>
+            <a:r>
+              <a:rPr lang="en-US" dirty="0"/>
+              <a:t>Note the optimal number of moves will also be displayed as to challenge the player to match it. </a:t>
+            </a:r>
+          </a:p>
+        </p:txBody>
+      </p:sp>
+      <p:sp>
+        <p:nvSpPr>
+          <p:cNvPr id="5" name="Text Placeholder 4"/>
+          <p:cNvSpPr>
+            <a:spLocks noGrp="1"/>
+          </p:cNvSpPr>
+          <p:nvPr>
+            <p:ph type="body" sz="quarter" idx="3"/>
+          </p:nvPr>
+        </p:nvSpPr>
+        <p:spPr>
+          <a:xfrm>
+            <a:off x="5233760" y="5094290"/>
+            <a:ext cx="5275901" cy="576262"/>
+          </a:xfrm>
+        </p:spPr>
+        <p:txBody>
+          <a:bodyPr/>
+          <a:lstStyle/>
+          <a:p>
+            <a:r>
+              <a:rPr lang="en-US" sz="1400" dirty="0"/>
+              <a:t>Figure 3: Tower of Hanoi interface (Ryan)</a:t>
+            </a:r>
+          </a:p>
+        </p:txBody>
+      </p:sp>
+      <p:pic>
+        <p:nvPicPr>
+          <p:cNvPr id="15" name="Content Placeholder 14"/>
+          <p:cNvPicPr>
+            <a:picLocks noGrp="1" noChangeAspect="1"/>
+          </p:cNvPicPr>
+          <p:nvPr>
+            <p:ph sz="quarter" idx="4"/>
+          </p:nvPr>
+        </p:nvPicPr>
+        <p:blipFill>
+          <a:blip r:embed="rId2"/>
+          <a:stretch>
+            <a:fillRect/>
+          </a:stretch>
+        </p:blipFill>
+        <p:spPr>
+          <a:xfrm>
+            <a:off x="5233759" y="1880280"/>
+            <a:ext cx="5275901" cy="3214009"/>
+          </a:xfrm>
+        </p:spPr>
+      </p:pic>
     </p:spTree>
     <p:extLst>
       <p:ext uri="{BB962C8B-B14F-4D97-AF65-F5344CB8AC3E}">
-        <p14:creationId xmlns:p14="http://schemas.microsoft.com/office/powerpoint/2010/main" val="993397549"/>
+        <p14:creationId xmlns:p14="http://schemas.microsoft.com/office/powerpoint/2010/main" val="1086719348"/>
       </p:ext>
     </p:extLst>
   </p:cSld>

</xml_diff>

<commit_message>
Changed Names on Powerpoint
</commit_message>
<xml_diff>
--- a/SCaRArcade.pptx
+++ b/SCaRArcade.pptx
@@ -309,7 +309,7 @@
           <a:p>
             <a:fld id="{48A87A34-81AB-432B-8DAE-1953F412C126}" type="datetimeFigureOut">
               <a:rPr lang="en-US" smtClean="0"/>
-              <a:t>20-Mar-17</a:t>
+              <a:t>23-Mar-17</a:t>
             </a:fld>
             <a:endParaRPr lang="en-US" dirty="0"/>
           </a:p>
@@ -584,7 +584,7 @@
           <a:p>
             <a:fld id="{48A87A34-81AB-432B-8DAE-1953F412C126}" type="datetimeFigureOut">
               <a:rPr lang="en-US" smtClean="0"/>
-              <a:t>20-Mar-17</a:t>
+              <a:t>23-Mar-17</a:t>
             </a:fld>
             <a:endParaRPr lang="en-US" dirty="0"/>
           </a:p>
@@ -778,7 +778,7 @@
           <a:p>
             <a:fld id="{48A87A34-81AB-432B-8DAE-1953F412C126}" type="datetimeFigureOut">
               <a:rPr lang="en-US" smtClean="0"/>
-              <a:t>20-Mar-17</a:t>
+              <a:t>23-Mar-17</a:t>
             </a:fld>
             <a:endParaRPr lang="en-US" dirty="0"/>
           </a:p>
@@ -1051,7 +1051,7 @@
           <a:p>
             <a:fld id="{48A87A34-81AB-432B-8DAE-1953F412C126}" type="datetimeFigureOut">
               <a:rPr lang="en-US" smtClean="0"/>
-              <a:t>20-Mar-17</a:t>
+              <a:t>23-Mar-17</a:t>
             </a:fld>
             <a:endParaRPr lang="en-US" dirty="0"/>
           </a:p>
@@ -1392,7 +1392,7 @@
           <a:p>
             <a:fld id="{48A87A34-81AB-432B-8DAE-1953F412C126}" type="datetimeFigureOut">
               <a:rPr lang="en-US" smtClean="0"/>
-              <a:t>20-Mar-17</a:t>
+              <a:t>23-Mar-17</a:t>
             </a:fld>
             <a:endParaRPr lang="en-US" dirty="0"/>
           </a:p>
@@ -2015,7 +2015,7 @@
           <a:p>
             <a:fld id="{48A87A34-81AB-432B-8DAE-1953F412C126}" type="datetimeFigureOut">
               <a:rPr lang="en-US" smtClean="0"/>
-              <a:t>20-Mar-17</a:t>
+              <a:t>23-Mar-17</a:t>
             </a:fld>
             <a:endParaRPr lang="en-US" dirty="0"/>
           </a:p>
@@ -2875,7 +2875,7 @@
           <a:p>
             <a:fld id="{48A87A34-81AB-432B-8DAE-1953F412C126}" type="datetimeFigureOut">
               <a:rPr lang="en-US" smtClean="0"/>
-              <a:t>20-Mar-17</a:t>
+              <a:t>23-Mar-17</a:t>
             </a:fld>
             <a:endParaRPr lang="en-US" dirty="0"/>
           </a:p>
@@ -3045,7 +3045,7 @@
           <a:p>
             <a:fld id="{48A87A34-81AB-432B-8DAE-1953F412C126}" type="datetimeFigureOut">
               <a:rPr lang="en-US" smtClean="0"/>
-              <a:t>20-Mar-17</a:t>
+              <a:t>23-Mar-17</a:t>
             </a:fld>
             <a:endParaRPr lang="en-US" dirty="0"/>
           </a:p>
@@ -3225,7 +3225,7 @@
           <a:p>
             <a:fld id="{48A87A34-81AB-432B-8DAE-1953F412C126}" type="datetimeFigureOut">
               <a:rPr lang="en-US" smtClean="0"/>
-              <a:t>20-Mar-17</a:t>
+              <a:t>23-Mar-17</a:t>
             </a:fld>
             <a:endParaRPr lang="en-US" dirty="0"/>
           </a:p>
@@ -3395,7 +3395,7 @@
           <a:p>
             <a:fld id="{48A87A34-81AB-432B-8DAE-1953F412C126}" type="datetimeFigureOut">
               <a:rPr lang="en-US" smtClean="0"/>
-              <a:t>20-Mar-17</a:t>
+              <a:t>23-Mar-17</a:t>
             </a:fld>
             <a:endParaRPr lang="en-US" dirty="0"/>
           </a:p>
@@ -3642,7 +3642,7 @@
           <a:p>
             <a:fld id="{48A87A34-81AB-432B-8DAE-1953F412C126}" type="datetimeFigureOut">
               <a:rPr lang="en-US" smtClean="0"/>
-              <a:t>20-Mar-17</a:t>
+              <a:t>23-Mar-17</a:t>
             </a:fld>
             <a:endParaRPr lang="en-US" dirty="0"/>
           </a:p>
@@ -3934,7 +3934,7 @@
           <a:p>
             <a:fld id="{48A87A34-81AB-432B-8DAE-1953F412C126}" type="datetimeFigureOut">
               <a:rPr lang="en-US" smtClean="0"/>
-              <a:t>20-Mar-17</a:t>
+              <a:t>23-Mar-17</a:t>
             </a:fld>
             <a:endParaRPr lang="en-US" dirty="0"/>
           </a:p>
@@ -4378,7 +4378,7 @@
           <a:p>
             <a:fld id="{48A87A34-81AB-432B-8DAE-1953F412C126}" type="datetimeFigureOut">
               <a:rPr lang="en-US" smtClean="0"/>
-              <a:t>20-Mar-17</a:t>
+              <a:t>23-Mar-17</a:t>
             </a:fld>
             <a:endParaRPr lang="en-US" dirty="0"/>
           </a:p>
@@ -4496,7 +4496,7 @@
           <a:p>
             <a:fld id="{48A87A34-81AB-432B-8DAE-1953F412C126}" type="datetimeFigureOut">
               <a:rPr lang="en-US" smtClean="0"/>
-              <a:t>20-Mar-17</a:t>
+              <a:t>23-Mar-17</a:t>
             </a:fld>
             <a:endParaRPr lang="en-US" dirty="0"/>
           </a:p>
@@ -4591,7 +4591,7 @@
           <a:p>
             <a:fld id="{48A87A34-81AB-432B-8DAE-1953F412C126}" type="datetimeFigureOut">
               <a:rPr lang="en-US" smtClean="0"/>
-              <a:t>20-Mar-17</a:t>
+              <a:t>23-Mar-17</a:t>
             </a:fld>
             <a:endParaRPr lang="en-US" dirty="0"/>
           </a:p>
@@ -4870,7 +4870,7 @@
           <a:p>
             <a:fld id="{48A87A34-81AB-432B-8DAE-1953F412C126}" type="datetimeFigureOut">
               <a:rPr lang="en-US" smtClean="0"/>
-              <a:t>20-Mar-17</a:t>
+              <a:t>23-Mar-17</a:t>
             </a:fld>
             <a:endParaRPr lang="en-US" dirty="0"/>
           </a:p>
@@ -5145,7 +5145,7 @@
           <a:p>
             <a:fld id="{48A87A34-81AB-432B-8DAE-1953F412C126}" type="datetimeFigureOut">
               <a:rPr lang="en-US" smtClean="0"/>
-              <a:t>20-Mar-17</a:t>
+              <a:t>23-Mar-17</a:t>
             </a:fld>
             <a:endParaRPr lang="en-US" dirty="0"/>
           </a:p>
@@ -5575,7 +5575,7 @@
             <a:fld id="{48A87A34-81AB-432B-8DAE-1953F412C126}" type="datetimeFigureOut">
               <a:rPr lang="en-US" smtClean="0"/>
               <a:pPr/>
-              <a:t>20-Mar-17</a:t>
+              <a:t>23-Mar-17</a:t>
             </a:fld>
             <a:endParaRPr lang="en-US" dirty="0"/>
           </a:p>
@@ -6143,7 +6143,7 @@
           <a:p>
             <a:r>
               <a:rPr lang="en-US" dirty="0"/>
-              <a:t>Presented by Saxon, Charles, and Ryan.</a:t>
+              <a:t>Presented by Saxon, Ryan and MARTIN.</a:t>
             </a:r>
           </a:p>
         </p:txBody>
@@ -7416,7 +7416,6 @@
               <a:rPr lang="en-US" dirty="0"/>
               <a:t>Once the game has finished the score will be submitted to the cloud services.</a:t>
             </a:r>
-            <a:endParaRPr lang="en-US" dirty="0"/>
           </a:p>
           <a:p>
             <a:r>

</xml_diff>

<commit_message>
Uploaded screenshot of game
</commit_message>
<xml_diff>
--- a/SCaRArcade.pptx
+++ b/SCaRArcade.pptx
@@ -314,7 +314,7 @@
           <a:p>
             <a:fld id="{48A87A34-81AB-432B-8DAE-1953F412C126}" type="datetimeFigureOut">
               <a:rPr lang="en-US" smtClean="0"/>
-              <a:t>3/27/2017</a:t>
+              <a:t>27-Mar-17</a:t>
             </a:fld>
             <a:endParaRPr lang="en-US" dirty="0"/>
           </a:p>
@@ -589,7 +589,7 @@
           <a:p>
             <a:fld id="{48A87A34-81AB-432B-8DAE-1953F412C126}" type="datetimeFigureOut">
               <a:rPr lang="en-US" smtClean="0"/>
-              <a:t>3/27/2017</a:t>
+              <a:t>27-Mar-17</a:t>
             </a:fld>
             <a:endParaRPr lang="en-US" dirty="0"/>
           </a:p>
@@ -783,7 +783,7 @@
           <a:p>
             <a:fld id="{48A87A34-81AB-432B-8DAE-1953F412C126}" type="datetimeFigureOut">
               <a:rPr lang="en-US" smtClean="0"/>
-              <a:t>3/27/2017</a:t>
+              <a:t>27-Mar-17</a:t>
             </a:fld>
             <a:endParaRPr lang="en-US" dirty="0"/>
           </a:p>
@@ -1056,7 +1056,7 @@
           <a:p>
             <a:fld id="{48A87A34-81AB-432B-8DAE-1953F412C126}" type="datetimeFigureOut">
               <a:rPr lang="en-US" smtClean="0"/>
-              <a:t>3/27/2017</a:t>
+              <a:t>27-Mar-17</a:t>
             </a:fld>
             <a:endParaRPr lang="en-US" dirty="0"/>
           </a:p>
@@ -1397,7 +1397,7 @@
           <a:p>
             <a:fld id="{48A87A34-81AB-432B-8DAE-1953F412C126}" type="datetimeFigureOut">
               <a:rPr lang="en-US" smtClean="0"/>
-              <a:t>3/27/2017</a:t>
+              <a:t>27-Mar-17</a:t>
             </a:fld>
             <a:endParaRPr lang="en-US" dirty="0"/>
           </a:p>
@@ -2020,7 +2020,7 @@
           <a:p>
             <a:fld id="{48A87A34-81AB-432B-8DAE-1953F412C126}" type="datetimeFigureOut">
               <a:rPr lang="en-US" smtClean="0"/>
-              <a:t>3/27/2017</a:t>
+              <a:t>27-Mar-17</a:t>
             </a:fld>
             <a:endParaRPr lang="en-US" dirty="0"/>
           </a:p>
@@ -2880,7 +2880,7 @@
           <a:p>
             <a:fld id="{48A87A34-81AB-432B-8DAE-1953F412C126}" type="datetimeFigureOut">
               <a:rPr lang="en-US" smtClean="0"/>
-              <a:t>3/27/2017</a:t>
+              <a:t>27-Mar-17</a:t>
             </a:fld>
             <a:endParaRPr lang="en-US" dirty="0"/>
           </a:p>
@@ -3050,7 +3050,7 @@
           <a:p>
             <a:fld id="{48A87A34-81AB-432B-8DAE-1953F412C126}" type="datetimeFigureOut">
               <a:rPr lang="en-US" smtClean="0"/>
-              <a:t>3/27/2017</a:t>
+              <a:t>27-Mar-17</a:t>
             </a:fld>
             <a:endParaRPr lang="en-US" dirty="0"/>
           </a:p>
@@ -3230,7 +3230,7 @@
           <a:p>
             <a:fld id="{48A87A34-81AB-432B-8DAE-1953F412C126}" type="datetimeFigureOut">
               <a:rPr lang="en-US" smtClean="0"/>
-              <a:t>3/27/2017</a:t>
+              <a:t>27-Mar-17</a:t>
             </a:fld>
             <a:endParaRPr lang="en-US" dirty="0"/>
           </a:p>
@@ -3400,7 +3400,7 @@
           <a:p>
             <a:fld id="{48A87A34-81AB-432B-8DAE-1953F412C126}" type="datetimeFigureOut">
               <a:rPr lang="en-US" smtClean="0"/>
-              <a:t>3/27/2017</a:t>
+              <a:t>27-Mar-17</a:t>
             </a:fld>
             <a:endParaRPr lang="en-US" dirty="0"/>
           </a:p>
@@ -3647,7 +3647,7 @@
           <a:p>
             <a:fld id="{48A87A34-81AB-432B-8DAE-1953F412C126}" type="datetimeFigureOut">
               <a:rPr lang="en-US" smtClean="0"/>
-              <a:t>3/27/2017</a:t>
+              <a:t>27-Mar-17</a:t>
             </a:fld>
             <a:endParaRPr lang="en-US" dirty="0"/>
           </a:p>
@@ -3939,7 +3939,7 @@
           <a:p>
             <a:fld id="{48A87A34-81AB-432B-8DAE-1953F412C126}" type="datetimeFigureOut">
               <a:rPr lang="en-US" smtClean="0"/>
-              <a:t>3/27/2017</a:t>
+              <a:t>27-Mar-17</a:t>
             </a:fld>
             <a:endParaRPr lang="en-US" dirty="0"/>
           </a:p>
@@ -4383,7 +4383,7 @@
           <a:p>
             <a:fld id="{48A87A34-81AB-432B-8DAE-1953F412C126}" type="datetimeFigureOut">
               <a:rPr lang="en-US" smtClean="0"/>
-              <a:t>3/27/2017</a:t>
+              <a:t>27-Mar-17</a:t>
             </a:fld>
             <a:endParaRPr lang="en-US" dirty="0"/>
           </a:p>
@@ -4501,7 +4501,7 @@
           <a:p>
             <a:fld id="{48A87A34-81AB-432B-8DAE-1953F412C126}" type="datetimeFigureOut">
               <a:rPr lang="en-US" smtClean="0"/>
-              <a:t>3/27/2017</a:t>
+              <a:t>27-Mar-17</a:t>
             </a:fld>
             <a:endParaRPr lang="en-US" dirty="0"/>
           </a:p>
@@ -4596,7 +4596,7 @@
           <a:p>
             <a:fld id="{48A87A34-81AB-432B-8DAE-1953F412C126}" type="datetimeFigureOut">
               <a:rPr lang="en-US" smtClean="0"/>
-              <a:t>3/27/2017</a:t>
+              <a:t>27-Mar-17</a:t>
             </a:fld>
             <a:endParaRPr lang="en-US" dirty="0"/>
           </a:p>
@@ -4875,7 +4875,7 @@
           <a:p>
             <a:fld id="{48A87A34-81AB-432B-8DAE-1953F412C126}" type="datetimeFigureOut">
               <a:rPr lang="en-US" smtClean="0"/>
-              <a:t>3/27/2017</a:t>
+              <a:t>27-Mar-17</a:t>
             </a:fld>
             <a:endParaRPr lang="en-US" dirty="0"/>
           </a:p>
@@ -5150,7 +5150,7 @@
           <a:p>
             <a:fld id="{48A87A34-81AB-432B-8DAE-1953F412C126}" type="datetimeFigureOut">
               <a:rPr lang="en-US" smtClean="0"/>
-              <a:t>3/27/2017</a:t>
+              <a:t>27-Mar-17</a:t>
             </a:fld>
             <a:endParaRPr lang="en-US" dirty="0"/>
           </a:p>
@@ -5580,7 +5580,7 @@
             <a:fld id="{48A87A34-81AB-432B-8DAE-1953F412C126}" type="datetimeFigureOut">
               <a:rPr lang="en-US" smtClean="0"/>
               <a:pPr/>
-              <a:t>3/27/2017</a:t>
+              <a:t>27-Mar-17</a:t>
             </a:fld>
             <a:endParaRPr lang="en-US" dirty="0"/>
           </a:p>
@@ -6125,14 +6125,13 @@
           <a:lstStyle/>
           <a:p>
             <a:r>
-              <a:rPr lang="en-US" dirty="0" err="1" smtClean="0"/>
+              <a:rPr lang="en-US" dirty="0" err="1"/>
               <a:t>S.C.a.R</a:t>
             </a:r>
             <a:r>
-              <a:rPr lang="en-US" dirty="0" smtClean="0"/>
+              <a:rPr lang="en-US" dirty="0"/>
               <a:t>. arcade</a:t>
             </a:r>
-            <a:endParaRPr lang="en-US" dirty="0"/>
           </a:p>
         </p:txBody>
       </p:sp>
@@ -6168,13 +6167,6 @@
   <p:clrMapOvr>
     <a:masterClrMapping/>
   </p:clrMapOvr>
-  <p:timing>
-    <p:tnLst>
-      <p:par>
-        <p:cTn id="1" dur="indefinite" restart="never" nodeType="tmRoot"/>
-      </p:par>
-    </p:tnLst>
-  </p:timing>
 </p:sld>
 </file>
 
@@ -6268,82 +6260,44 @@
           <a:p>
             <a:r>
               <a:rPr lang="en-US" dirty="0"/>
-              <a:t>The timer will be recorded and be viewable from the </a:t>
-            </a:r>
-            <a:r>
-              <a:rPr lang="en-US" dirty="0" smtClean="0"/>
-              <a:t>leaderboard.</a:t>
-            </a:r>
-            <a:endParaRPr lang="en-US" dirty="0"/>
-          </a:p>
-          <a:p>
-            <a:r>
-              <a:rPr lang="en-US" dirty="0"/>
-              <a:t>Once the game has </a:t>
-            </a:r>
-            <a:r>
-              <a:rPr lang="en-US" dirty="0" smtClean="0"/>
-              <a:t>ended </a:t>
-            </a:r>
-            <a:r>
-              <a:rPr lang="en-US" dirty="0"/>
-              <a:t>the score will be submitted </a:t>
-            </a:r>
-            <a:r>
-              <a:rPr lang="en-US" dirty="0" smtClean="0"/>
-              <a:t>for evaluation to the leaderboard</a:t>
-            </a:r>
-            <a:r>
-              <a:rPr lang="en-US" dirty="0" smtClean="0"/>
-              <a:t>.</a:t>
-            </a:r>
-          </a:p>
-          <a:p>
-            <a:r>
-              <a:rPr lang="en-US" dirty="0" smtClean="0"/>
-              <a:t>Disks </a:t>
-            </a:r>
-            <a:r>
-              <a:rPr lang="en-US" dirty="0"/>
-              <a:t>will display numbers to make it easier to differentiate. </a:t>
-            </a:r>
-          </a:p>
-          <a:p>
-            <a:r>
-              <a:rPr lang="en-US" dirty="0"/>
-              <a:t>O</a:t>
-            </a:r>
-            <a:r>
-              <a:rPr lang="en-US" dirty="0" smtClean="0"/>
-              <a:t>ptimal </a:t>
-            </a:r>
-            <a:r>
-              <a:rPr lang="en-US" dirty="0"/>
-              <a:t>number of moves will also be displayed as to challenge the </a:t>
-            </a:r>
-            <a:r>
-              <a:rPr lang="en-US" dirty="0" smtClean="0"/>
-              <a:t>player. </a:t>
-            </a:r>
-          </a:p>
-          <a:p>
-            <a:r>
-              <a:rPr lang="en-US" smtClean="0"/>
+              <a:t>The timer will be recorded and be viewable from the leaderboard.</a:t>
+            </a:r>
+          </a:p>
+          <a:p>
+            <a:r>
+              <a:rPr lang="en-US" dirty="0"/>
+              <a:t>Once the game has ended the score will be submitted for evaluation to the leaderboard.</a:t>
+            </a:r>
+          </a:p>
+          <a:p>
+            <a:r>
+              <a:rPr lang="en-US" dirty="0"/>
+              <a:t>Disks will display numbers to make it easier to differentiate. </a:t>
+            </a:r>
+          </a:p>
+          <a:p>
+            <a:r>
+              <a:rPr lang="en-US" dirty="0"/>
+              <a:t>Optimal number of moves will also be displayed as to challenge the player. </a:t>
+            </a:r>
+          </a:p>
+          <a:p>
+            <a:r>
+              <a:rPr lang="en-US"/>
               <a:t>Player can </a:t>
             </a:r>
             <a:r>
-              <a:rPr lang="en-US" dirty="0" smtClean="0"/>
+              <a:rPr lang="en-US" dirty="0"/>
               <a:t>increase number </a:t>
             </a:r>
             <a:r>
-              <a:rPr lang="en-US" smtClean="0"/>
+              <a:rPr lang="en-US"/>
               <a:t>of disks, </a:t>
             </a:r>
             <a:r>
-              <a:rPr lang="en-US" dirty="0" smtClean="0"/>
+              <a:rPr lang="en-US" dirty="0"/>
               <a:t>but cannot increase the number of poles. </a:t>
             </a:r>
-            <a:endParaRPr lang="en-US" dirty="0"/>
           </a:p>
         </p:txBody>
       </p:sp>
@@ -6369,15 +6323,7 @@
           <a:p>
             <a:r>
               <a:rPr lang="en-US" sz="1400" dirty="0"/>
-              <a:t>Figure 3: Tower of </a:t>
-            </a:r>
-            <a:r>
-              <a:rPr lang="en-US" sz="1400" dirty="0" smtClean="0"/>
-              <a:t>Hanoi Generic interface </a:t>
-            </a:r>
-            <a:r>
-              <a:rPr lang="en-US" sz="1400" dirty="0"/>
-              <a:t>(Ryan)</a:t>
+              <a:t>Figure 3: Tower of Hanoi Generic interface (Ryan)</a:t>
             </a:r>
           </a:p>
         </p:txBody>
@@ -6400,8 +6346,8 @@
         </p:blipFill>
         <p:spPr>
           <a:xfrm>
-            <a:off x="5233759" y="1880280"/>
-            <a:ext cx="5275901" cy="3214009"/>
+            <a:off x="5233759" y="2003437"/>
+            <a:ext cx="5275901" cy="2967694"/>
           </a:xfrm>
         </p:spPr>
       </p:pic>
@@ -6415,13 +6361,6 @@
   <p:clrMapOvr>
     <a:masterClrMapping/>
   </p:clrMapOvr>
-  <p:timing>
-    <p:tnLst>
-      <p:par>
-        <p:cTn id="1" dur="indefinite" restart="never" nodeType="tmRoot"/>
-      </p:par>
-    </p:tnLst>
-  </p:timing>
 </p:sld>
 </file>
 
@@ -6458,7 +6397,7 @@
           <a:lstStyle/>
           <a:p>
             <a:r>
-              <a:rPr lang="en-US" dirty="0" smtClean="0"/>
+              <a:rPr lang="en-US" dirty="0"/>
               <a:t>Tower of Hanoi (Continued):</a:t>
             </a:r>
             <a:endParaRPr lang="en-AU" dirty="0"/>
@@ -6481,7 +6420,7 @@
           <a:lstStyle/>
           <a:p>
             <a:r>
-              <a:rPr lang="en-US" dirty="0" smtClean="0"/>
+              <a:rPr lang="en-US" dirty="0"/>
               <a:t>Problems</a:t>
             </a:r>
             <a:endParaRPr lang="en-AU" dirty="0"/>
@@ -6504,25 +6443,25 @@
           <a:lstStyle/>
           <a:p>
             <a:r>
-              <a:rPr lang="en-US" dirty="0" smtClean="0"/>
+              <a:rPr lang="en-US" dirty="0"/>
               <a:t>Drag, and drop.</a:t>
             </a:r>
           </a:p>
           <a:p>
             <a:r>
-              <a:rPr lang="en-US" dirty="0" smtClean="0"/>
+              <a:rPr lang="en-US" dirty="0"/>
               <a:t>Image sizes.</a:t>
             </a:r>
           </a:p>
           <a:p>
             <a:r>
-              <a:rPr lang="en-US" dirty="0" smtClean="0"/>
+              <a:rPr lang="en-US" dirty="0"/>
               <a:t>Freedom of customization.</a:t>
             </a:r>
           </a:p>
           <a:p>
             <a:r>
-              <a:rPr lang="en-US" dirty="0" smtClean="0"/>
+              <a:rPr lang="en-US" dirty="0"/>
               <a:t>Implementing game logic.</a:t>
             </a:r>
           </a:p>
@@ -6547,7 +6486,7 @@
           <a:lstStyle/>
           <a:p>
             <a:r>
-              <a:rPr lang="en-US" dirty="0" smtClean="0"/>
+              <a:rPr lang="en-US" dirty="0"/>
               <a:t>Solutions:</a:t>
             </a:r>
             <a:endParaRPr lang="en-AU" dirty="0"/>
@@ -6570,31 +6509,31 @@
           <a:lstStyle/>
           <a:p>
             <a:r>
-              <a:rPr lang="en-US" dirty="0" smtClean="0"/>
+              <a:rPr lang="en-US" dirty="0"/>
               <a:t>Additional research into user input data collection, for triggering key event handlers.</a:t>
             </a:r>
           </a:p>
           <a:p>
             <a:r>
-              <a:rPr lang="en-US" dirty="0" smtClean="0"/>
+              <a:rPr lang="en-US" dirty="0"/>
               <a:t>Downscaling image resolution to fit a desired screen.</a:t>
             </a:r>
           </a:p>
           <a:p>
             <a:r>
-              <a:rPr lang="en-US" dirty="0" smtClean="0"/>
+              <a:rPr lang="en-US" dirty="0"/>
               <a:t>Creating min/max No. of disks.</a:t>
             </a:r>
           </a:p>
           <a:p>
             <a:r>
-              <a:rPr lang="en-US" dirty="0" smtClean="0"/>
+              <a:rPr lang="en-US" dirty="0"/>
               <a:t>Fixed No. of poles.</a:t>
             </a:r>
           </a:p>
           <a:p>
             <a:r>
-              <a:rPr lang="en-US" dirty="0" smtClean="0"/>
+              <a:rPr lang="en-US" dirty="0"/>
               <a:t>Research into the rules of the game and its components.</a:t>
             </a:r>
           </a:p>
@@ -6613,13 +6552,6 @@
   <p:clrMapOvr>
     <a:masterClrMapping/>
   </p:clrMapOvr>
-  <p:timing>
-    <p:tnLst>
-      <p:par>
-        <p:cTn id="1" dur="indefinite" restart="never" nodeType="tmRoot"/>
-      </p:par>
-    </p:tnLst>
-  </p:timing>
 </p:sld>
 </file>
 
@@ -6694,13 +6626,6 @@
   <p:clrMapOvr>
     <a:masterClrMapping/>
   </p:clrMapOvr>
-  <p:timing>
-    <p:tnLst>
-      <p:par>
-        <p:cTn id="1" dur="indefinite" restart="never" nodeType="tmRoot"/>
-      </p:par>
-    </p:tnLst>
-  </p:timing>
 </p:sld>
 </file>
 
@@ -6832,13 +6757,6 @@
   <p:clrMapOvr>
     <a:masterClrMapping/>
   </p:clrMapOvr>
-  <p:timing>
-    <p:tnLst>
-      <p:par>
-        <p:cTn id="1" dur="indefinite" restart="never" nodeType="tmRoot"/>
-      </p:par>
-    </p:tnLst>
-  </p:timing>
 </p:sld>
 </file>
 
@@ -6965,13 +6883,6 @@
   <p:clrMapOvr>
     <a:masterClrMapping/>
   </p:clrMapOvr>
-  <p:timing>
-    <p:tnLst>
-      <p:par>
-        <p:cTn id="1" dur="indefinite" restart="never" nodeType="tmRoot"/>
-      </p:par>
-    </p:tnLst>
-  </p:timing>
 </p:sld>
 </file>
 
@@ -7008,7 +6919,7 @@
           <a:lstStyle/>
           <a:p>
             <a:r>
-              <a:rPr lang="en-US" dirty="0" smtClean="0"/>
+              <a:rPr lang="en-US" dirty="0"/>
               <a:t>INFT2050 Techniques used in this application.</a:t>
             </a:r>
             <a:endParaRPr lang="en-AU" dirty="0"/>
@@ -7035,7 +6946,7 @@
               <a:buChar char="Ø"/>
             </a:pPr>
             <a:r>
-              <a:rPr lang="en-US" dirty="0" smtClean="0"/>
+              <a:rPr lang="en-US" dirty="0"/>
               <a:t>Layout manager</a:t>
             </a:r>
           </a:p>
@@ -7045,7 +6956,7 @@
               <a:buChar char="Ø"/>
             </a:pPr>
             <a:r>
-              <a:rPr lang="en-US" dirty="0" smtClean="0"/>
+              <a:rPr lang="en-US" dirty="0"/>
               <a:t>UI design</a:t>
             </a:r>
           </a:p>
@@ -7055,10 +6966,9 @@
               <a:buChar char="Ø"/>
             </a:pPr>
             <a:r>
-              <a:rPr lang="en-US" dirty="0" smtClean="0"/>
+              <a:rPr lang="en-US" dirty="0"/>
               <a:t>Decluttered </a:t>
             </a:r>
-            <a:endParaRPr lang="en-US" dirty="0"/>
           </a:p>
           <a:p>
             <a:pPr lvl="2">
@@ -7066,7 +6976,7 @@
               <a:buChar char="Ø"/>
             </a:pPr>
             <a:r>
-              <a:rPr lang="en-US" dirty="0" smtClean="0"/>
+              <a:rPr lang="en-US" dirty="0"/>
               <a:t>Avoiding colour confrontation</a:t>
             </a:r>
           </a:p>
@@ -7076,7 +6986,7 @@
               <a:buChar char="Ø"/>
             </a:pPr>
             <a:r>
-              <a:rPr lang="en-US" dirty="0" smtClean="0"/>
+              <a:rPr lang="en-US" dirty="0"/>
               <a:t>User friendly controls scheme</a:t>
             </a:r>
           </a:p>
@@ -7086,7 +6996,7 @@
               <a:buChar char="Ø"/>
             </a:pPr>
             <a:r>
-              <a:rPr lang="en-US" dirty="0" smtClean="0"/>
+              <a:rPr lang="en-US" dirty="0"/>
               <a:t>Graphics</a:t>
             </a:r>
           </a:p>
@@ -7096,7 +7006,7 @@
               <a:buChar char="Ø"/>
             </a:pPr>
             <a:r>
-              <a:rPr lang="en-US" dirty="0" smtClean="0"/>
+              <a:rPr lang="en-US" dirty="0"/>
               <a:t>Simple graphics</a:t>
             </a:r>
           </a:p>
@@ -7106,7 +7016,7 @@
               <a:buChar char="Ø"/>
             </a:pPr>
             <a:r>
-              <a:rPr lang="en-US" dirty="0" smtClean="0"/>
+              <a:rPr lang="en-US" dirty="0"/>
               <a:t>Sprite Generation </a:t>
             </a:r>
           </a:p>
@@ -7122,13 +7032,6 @@
   <p:clrMapOvr>
     <a:masterClrMapping/>
   </p:clrMapOvr>
-  <p:timing>
-    <p:tnLst>
-      <p:par>
-        <p:cTn id="1" dur="indefinite" restart="never" nodeType="tmRoot"/>
-      </p:par>
-    </p:tnLst>
-  </p:timing>
 </p:sld>
 </file>
 
@@ -7165,7 +7068,7 @@
           <a:lstStyle/>
           <a:p>
             <a:r>
-              <a:rPr lang="en-US" dirty="0" smtClean="0"/>
+              <a:rPr lang="en-US" dirty="0"/>
               <a:t>Resources required and where to find them.</a:t>
             </a:r>
             <a:endParaRPr lang="en-AU" dirty="0"/>
@@ -7188,7 +7091,7 @@
           <a:lstStyle/>
           <a:p>
             <a:r>
-              <a:rPr lang="en-US" dirty="0" smtClean="0"/>
+              <a:rPr lang="en-US" dirty="0"/>
               <a:t>Sprite Generation</a:t>
             </a:r>
           </a:p>
@@ -7198,7 +7101,7 @@
               <a:buChar char="Ø"/>
             </a:pPr>
             <a:r>
-              <a:rPr lang="en-US" dirty="0" smtClean="0"/>
+              <a:rPr lang="en-US" dirty="0"/>
               <a:t>www.Spritmakingtutorial.com</a:t>
             </a:r>
             <a:endParaRPr lang="en-AU" dirty="0"/>
@@ -7215,13 +7118,6 @@
   <p:clrMapOvr>
     <a:masterClrMapping/>
   </p:clrMapOvr>
-  <p:timing>
-    <p:tnLst>
-      <p:par>
-        <p:cTn id="1" dur="indefinite" restart="never" nodeType="tmRoot"/>
-      </p:par>
-    </p:tnLst>
-  </p:timing>
 </p:sld>
 </file>
 
@@ -7300,13 +7196,6 @@
   <p:clrMapOvr>
     <a:masterClrMapping/>
   </p:clrMapOvr>
-  <p:timing>
-    <p:tnLst>
-      <p:par>
-        <p:cTn id="1" dur="indefinite" restart="never" nodeType="tmRoot"/>
-      </p:par>
-    </p:tnLst>
-  </p:timing>
 </p:sld>
 </file>
 
@@ -7347,16 +7236,12 @@
               <a:t>What is </a:t>
             </a:r>
             <a:r>
-              <a:rPr lang="en-US" dirty="0" err="1" smtClean="0"/>
+              <a:rPr lang="en-US" dirty="0" err="1"/>
               <a:t>S.C.a.R</a:t>
             </a:r>
             <a:r>
-              <a:rPr lang="en-US" dirty="0" smtClean="0"/>
-              <a:t>. arcade</a:t>
-            </a:r>
-            <a:r>
-              <a:rPr lang="en-US" dirty="0"/>
-              <a:t>?</a:t>
+              <a:rPr lang="en-US" dirty="0"/>
+              <a:t>. arcade?</a:t>
             </a:r>
           </a:p>
         </p:txBody>
@@ -7383,15 +7268,7 @@
           <a:p>
             <a:r>
               <a:rPr lang="en-US" dirty="0"/>
-              <a:t>A game </a:t>
-            </a:r>
-            <a:r>
-              <a:rPr lang="en-US" dirty="0" smtClean="0"/>
-              <a:t>arcade designed for the Android OS, featuring </a:t>
-            </a:r>
-            <a:r>
-              <a:rPr lang="en-US" dirty="0"/>
-              <a:t>2 different games:</a:t>
+              <a:t>A game arcade designed for the Android OS, featuring 2 different games:</a:t>
             </a:r>
           </a:p>
           <a:p>
@@ -7404,18 +7281,9 @@
           <a:p>
             <a:pPr lvl="1"/>
             <a:r>
-              <a:rPr lang="en-US" dirty="0" smtClean="0"/>
-              <a:t>Picture </a:t>
-            </a:r>
-            <a:r>
-              <a:rPr lang="en-US" dirty="0"/>
-              <a:t>M</a:t>
-            </a:r>
-            <a:r>
-              <a:rPr lang="en-US" dirty="0" smtClean="0"/>
-              <a:t>emory test.</a:t>
-            </a:r>
-            <a:endParaRPr lang="en-US" dirty="0"/>
+              <a:rPr lang="en-US" dirty="0"/>
+              <a:t>Picture Memory test.</a:t>
+            </a:r>
           </a:p>
           <a:p>
             <a:r>
@@ -7440,18 +7308,9 @@
           <a:p>
             <a:pPr lvl="1"/>
             <a:r>
-              <a:rPr lang="en-US" dirty="0" smtClean="0"/>
-              <a:t>Possible </a:t>
-            </a:r>
-            <a:r>
-              <a:rPr lang="en-US" dirty="0"/>
-              <a:t>third game </a:t>
-            </a:r>
-            <a:r>
-              <a:rPr lang="en-US" dirty="0" smtClean="0"/>
-              <a:t>implemented.</a:t>
-            </a:r>
-            <a:endParaRPr lang="en-US" dirty="0"/>
+              <a:rPr lang="en-US" dirty="0"/>
+              <a:t>Possible third game implemented.</a:t>
+            </a:r>
           </a:p>
         </p:txBody>
       </p:sp>
@@ -7465,13 +7324,6 @@
   <p:clrMapOvr>
     <a:masterClrMapping/>
   </p:clrMapOvr>
-  <p:timing>
-    <p:tnLst>
-      <p:par>
-        <p:cTn id="1" dur="indefinite" restart="never" nodeType="tmRoot"/>
-      </p:par>
-    </p:tnLst>
-  </p:timing>
 </p:sld>
 </file>
 
@@ -7587,13 +7439,6 @@
   <p:clrMapOvr>
     <a:masterClrMapping/>
   </p:clrMapOvr>
-  <p:timing>
-    <p:tnLst>
-      <p:par>
-        <p:cTn id="1" dur="indefinite" restart="never" nodeType="tmRoot"/>
-      </p:par>
-    </p:tnLst>
-  </p:timing>
 </p:sld>
 </file>
 
@@ -7684,11 +7529,11 @@
                     <a:lstStyle/>
                     <a:p>
                       <a:r>
-                        <a:rPr lang="en-US" dirty="0" smtClean="0"/>
+                        <a:rPr lang="en-US" dirty="0"/>
                         <a:t>Phase:</a:t>
                       </a:r>
                       <a:r>
-                        <a:rPr lang="en-US" baseline="0" dirty="0" smtClean="0"/>
+                        <a:rPr lang="en-US" baseline="0" dirty="0"/>
                         <a:t> </a:t>
                       </a:r>
                       <a:endParaRPr lang="en-AU" dirty="0"/>
@@ -7702,7 +7547,7 @@
                     <a:lstStyle/>
                     <a:p>
                       <a:r>
-                        <a:rPr lang="en-US" dirty="0" smtClean="0"/>
+                        <a:rPr lang="en-US" dirty="0"/>
                         <a:t>Description:</a:t>
                       </a:r>
                       <a:endParaRPr lang="en-AU" dirty="0"/>
@@ -7723,7 +7568,7 @@
                     <a:lstStyle/>
                     <a:p>
                       <a:r>
-                        <a:rPr lang="en-US" dirty="0" smtClean="0"/>
+                        <a:rPr lang="en-US" dirty="0"/>
                         <a:t>1</a:t>
                       </a:r>
                       <a:endParaRPr lang="en-AU" dirty="0"/>
@@ -7737,7 +7582,7 @@
                     <a:lstStyle/>
                     <a:p>
                       <a:r>
-                        <a:rPr lang="en-US" dirty="0" smtClean="0"/>
+                        <a:rPr lang="en-US" dirty="0"/>
                         <a:t>Design:</a:t>
                       </a:r>
                     </a:p>
@@ -7747,7 +7592,7 @@
                         <a:buAutoNum type="arabicPeriod"/>
                       </a:pPr>
                       <a:r>
-                        <a:rPr lang="en-US" dirty="0" smtClean="0">
+                        <a:rPr lang="en-US" dirty="0">
                           <a:solidFill>
                             <a:schemeClr val="tx1">
                               <a:lumMod val="65000"/>
@@ -7763,7 +7608,7 @@
                         <a:buAutoNum type="arabicPeriod"/>
                       </a:pPr>
                       <a:r>
-                        <a:rPr lang="en-US" dirty="0" smtClean="0">
+                        <a:rPr lang="en-US" dirty="0">
                           <a:solidFill>
                             <a:schemeClr val="tx1">
                               <a:lumMod val="65000"/>
@@ -7773,7 +7618,7 @@
                         <a:t>Navigational</a:t>
                       </a:r>
                       <a:r>
-                        <a:rPr lang="en-US" baseline="0" dirty="0" smtClean="0">
+                        <a:rPr lang="en-US" baseline="0" dirty="0">
                           <a:solidFill>
                             <a:schemeClr val="tx1">
                               <a:lumMod val="65000"/>
@@ -7789,7 +7634,7 @@
                         <a:buAutoNum type="arabicPeriod"/>
                       </a:pPr>
                       <a:r>
-                        <a:rPr lang="en-US" baseline="0" dirty="0" smtClean="0">
+                        <a:rPr lang="en-US" baseline="0" dirty="0">
                           <a:solidFill>
                             <a:schemeClr val="tx1">
                               <a:lumMod val="65000"/>
@@ -7805,7 +7650,7 @@
                         <a:buAutoNum type="arabicPeriod"/>
                       </a:pPr>
                       <a:r>
-                        <a:rPr lang="en-US" baseline="0" dirty="0" smtClean="0">
+                        <a:rPr lang="en-US" baseline="0" dirty="0">
                           <a:solidFill>
                             <a:schemeClr val="tx1">
                               <a:lumMod val="65000"/>
@@ -7814,7 +7659,7 @@
                         </a:rPr>
                         <a:t>Leaderboard. </a:t>
                       </a:r>
-                      <a:endParaRPr lang="en-US" dirty="0" smtClean="0">
+                      <a:endParaRPr lang="en-US" dirty="0">
                         <a:solidFill>
                           <a:schemeClr val="tx1">
                             <a:lumMod val="65000"/>
@@ -7838,7 +7683,7 @@
                     <a:lstStyle/>
                     <a:p>
                       <a:r>
-                        <a:rPr lang="en-US" dirty="0" smtClean="0"/>
+                        <a:rPr lang="en-US" dirty="0"/>
                         <a:t>2</a:t>
                       </a:r>
                       <a:endParaRPr lang="en-AU" dirty="0"/>
@@ -7852,7 +7697,7 @@
                     <a:lstStyle/>
                     <a:p>
                       <a:r>
-                        <a:rPr lang="en-US" dirty="0" smtClean="0"/>
+                        <a:rPr lang="en-US" dirty="0"/>
                         <a:t>Prototype:</a:t>
                       </a:r>
                     </a:p>
@@ -7862,7 +7707,7 @@
                         <a:buAutoNum type="arabicPeriod"/>
                       </a:pPr>
                       <a:r>
-                        <a:rPr lang="en-US" dirty="0" smtClean="0">
+                        <a:rPr lang="en-US" dirty="0">
                           <a:solidFill>
                             <a:schemeClr val="bg1"/>
                           </a:solidFill>
@@ -7870,7 +7715,7 @@
                         <a:t>Build interface</a:t>
                       </a:r>
                       <a:r>
-                        <a:rPr lang="en-US" baseline="0" dirty="0" smtClean="0">
+                        <a:rPr lang="en-US" baseline="0" dirty="0">
                           <a:solidFill>
                             <a:schemeClr val="bg1"/>
                           </a:solidFill>
@@ -7884,7 +7729,7 @@
                         <a:buAutoNum type="arabicPeriod"/>
                       </a:pPr>
                       <a:r>
-                        <a:rPr lang="en-US" baseline="0" dirty="0" smtClean="0">
+                        <a:rPr lang="en-US" baseline="0" dirty="0">
                           <a:solidFill>
                             <a:schemeClr val="bg1"/>
                           </a:solidFill>
@@ -7898,7 +7743,7 @@
                         <a:buAutoNum type="arabicPeriod"/>
                       </a:pPr>
                       <a:r>
-                        <a:rPr lang="en-US" baseline="0" dirty="0" smtClean="0">
+                        <a:rPr lang="en-US" baseline="0" dirty="0">
                           <a:solidFill>
                             <a:schemeClr val="bg1"/>
                           </a:solidFill>
@@ -7912,7 +7757,7 @@
                         <a:buAutoNum type="arabicPeriod"/>
                       </a:pPr>
                       <a:r>
-                        <a:rPr lang="en-US" baseline="0" dirty="0" smtClean="0">
+                        <a:rPr lang="en-US" baseline="0" dirty="0">
                           <a:solidFill>
                             <a:schemeClr val="bg1"/>
                           </a:solidFill>
@@ -7941,7 +7786,7 @@
                     <a:lstStyle/>
                     <a:p>
                       <a:r>
-                        <a:rPr lang="en-US" dirty="0" smtClean="0"/>
+                        <a:rPr lang="en-US" dirty="0"/>
                         <a:t>3</a:t>
                       </a:r>
                       <a:endParaRPr lang="en-AU" dirty="0"/>
@@ -7955,7 +7800,7 @@
                     <a:lstStyle/>
                     <a:p>
                       <a:r>
-                        <a:rPr lang="en-US" dirty="0" smtClean="0"/>
+                        <a:rPr lang="en-US" dirty="0"/>
                         <a:t>Test:</a:t>
                       </a:r>
                     </a:p>
@@ -7965,7 +7810,7 @@
                         <a:buAutoNum type="arabicPeriod"/>
                       </a:pPr>
                       <a:r>
-                        <a:rPr lang="en-US" dirty="0" smtClean="0">
+                        <a:rPr lang="en-US" dirty="0">
                           <a:solidFill>
                             <a:schemeClr val="tx1">
                               <a:lumMod val="50000"/>
@@ -7975,7 +7820,7 @@
                         <a:t>Navigational</a:t>
                       </a:r>
                       <a:r>
-                        <a:rPr lang="en-US" baseline="0" dirty="0" smtClean="0">
+                        <a:rPr lang="en-US" baseline="0" dirty="0">
                           <a:solidFill>
                             <a:schemeClr val="tx1">
                               <a:lumMod val="50000"/>
@@ -7991,7 +7836,7 @@
                         <a:buAutoNum type="arabicPeriod"/>
                       </a:pPr>
                       <a:r>
-                        <a:rPr lang="en-US" baseline="0" dirty="0" smtClean="0">
+                        <a:rPr lang="en-US" baseline="0" dirty="0">
                           <a:solidFill>
                             <a:schemeClr val="tx1">
                               <a:lumMod val="50000"/>
@@ -8007,7 +7852,7 @@
                         <a:buAutoNum type="arabicPeriod"/>
                       </a:pPr>
                       <a:r>
-                        <a:rPr lang="en-US" baseline="0" dirty="0" smtClean="0">
+                        <a:rPr lang="en-US" baseline="0" dirty="0">
                           <a:solidFill>
                             <a:schemeClr val="tx1">
                               <a:lumMod val="50000"/>
@@ -8040,7 +7885,7 @@
                     <a:lstStyle/>
                     <a:p>
                       <a:r>
-                        <a:rPr lang="en-US" dirty="0" smtClean="0"/>
+                        <a:rPr lang="en-US" dirty="0"/>
                         <a:t>4</a:t>
                       </a:r>
                       <a:endParaRPr lang="en-AU" dirty="0"/>
@@ -8054,15 +7899,15 @@
                     <a:lstStyle/>
                     <a:p>
                       <a:r>
-                        <a:rPr lang="en-US" dirty="0" smtClean="0"/>
+                        <a:rPr lang="en-US" dirty="0"/>
                         <a:t>Finalize</a:t>
                       </a:r>
                       <a:r>
-                        <a:rPr lang="en-US" baseline="0" dirty="0" smtClean="0"/>
+                        <a:rPr lang="en-US" baseline="0" dirty="0"/>
                         <a:t>, and </a:t>
                       </a:r>
                       <a:r>
-                        <a:rPr lang="en-US" dirty="0" smtClean="0"/>
+                        <a:rPr lang="en-US" dirty="0"/>
                         <a:t>Deploy</a:t>
                       </a:r>
                       <a:endParaRPr lang="en-AU" dirty="0"/>
@@ -8090,13 +7935,6 @@
   <p:clrMapOvr>
     <a:masterClrMapping/>
   </p:clrMapOvr>
-  <p:timing>
-    <p:tnLst>
-      <p:par>
-        <p:cTn id="1" dur="indefinite" restart="never" nodeType="tmRoot"/>
-      </p:par>
-    </p:tnLst>
-  </p:timing>
 </p:sld>
 </file>
 
@@ -8195,37 +8033,20 @@
           </a:p>
           <a:p>
             <a:r>
-              <a:rPr lang="en-US" dirty="0" smtClean="0"/>
-              <a:t>Linear layout(vertical) </a:t>
-            </a:r>
-            <a:r>
-              <a:rPr lang="en-US" dirty="0"/>
-              <a:t>with selectable buttons to run a specific game.</a:t>
-            </a:r>
-          </a:p>
-          <a:p>
-            <a:r>
-              <a:rPr lang="en-US" dirty="0"/>
-              <a:t>Each item will display the name, and a button to show description/rules of the game</a:t>
-            </a:r>
-            <a:r>
-              <a:rPr lang="en-US" dirty="0" smtClean="0"/>
-              <a:t>.</a:t>
-            </a:r>
-            <a:endParaRPr lang="en-US" dirty="0" smtClean="0"/>
-          </a:p>
-          <a:p>
-            <a:r>
-              <a:rPr lang="en-US" dirty="0" smtClean="0"/>
-              <a:t>Simple</a:t>
-            </a:r>
-            <a:r>
-              <a:rPr lang="en-US" dirty="0"/>
-              <a:t>, informative, conveys all necessary information while efficiently using screen ‘real-estate</a:t>
-            </a:r>
-            <a:r>
-              <a:rPr lang="en-US" dirty="0" smtClean="0"/>
-              <a:t>’.</a:t>
+              <a:rPr lang="en-US" dirty="0"/>
+              <a:t>Linear layout(vertical) with selectable buttons to run a specific game.</a:t>
+            </a:r>
+          </a:p>
+          <a:p>
+            <a:r>
+              <a:rPr lang="en-US" dirty="0"/>
+              <a:t>Each item will display the name, and a button to show description/rules of the game.</a:t>
+            </a:r>
+          </a:p>
+          <a:p>
+            <a:r>
+              <a:rPr lang="en-US" dirty="0"/>
+              <a:t>Simple, informative, conveys all necessary information while efficiently using screen ‘real-estate’.</a:t>
             </a:r>
           </a:p>
           <a:p>
@@ -8299,13 +8120,6 @@
   <p:clrMapOvr>
     <a:masterClrMapping/>
   </p:clrMapOvr>
-  <p:timing>
-    <p:tnLst>
-      <p:par>
-        <p:cTn id="1" dur="indefinite" restart="never" nodeType="tmRoot"/>
-      </p:par>
-    </p:tnLst>
-  </p:timing>
 </p:sld>
 </file>
 
@@ -8405,20 +8219,12 @@
           <a:p>
             <a:r>
               <a:rPr lang="en-US" dirty="0"/>
-              <a:t>Aesthetic variations can be applied to uniquely identify games (colour </a:t>
-            </a:r>
-            <a:r>
-              <a:rPr lang="en-US" dirty="0" smtClean="0"/>
-              <a:t>scheme, diffused </a:t>
-            </a:r>
-            <a:r>
-              <a:rPr lang="en-US" dirty="0"/>
-              <a:t>background, game title).</a:t>
-            </a:r>
-          </a:p>
-          <a:p>
-            <a:r>
-              <a:rPr lang="en-US" dirty="0" smtClean="0"/>
+              <a:t>Aesthetic variations can be applied to uniquely identify games (colour scheme, diffused background, game title).</a:t>
+            </a:r>
+          </a:p>
+          <a:p>
+            <a:r>
+              <a:rPr lang="en-US" dirty="0"/>
               <a:t>Each game will range in difficulty (information for difficulty will be provided in the description).</a:t>
             </a:r>
           </a:p>
@@ -8453,10 +8259,9 @@
           <a:p>
             <a:pPr algn="r"/>
             <a:r>
-              <a:rPr lang="en-US" sz="1600" dirty="0" smtClean="0"/>
+              <a:rPr lang="en-US" sz="1600" dirty="0"/>
               <a:t>(Martin)</a:t>
             </a:r>
-            <a:endParaRPr lang="en-US" sz="1600" dirty="0"/>
           </a:p>
         </p:txBody>
       </p:sp>
@@ -8492,13 +8297,6 @@
   <p:clrMapOvr>
     <a:masterClrMapping/>
   </p:clrMapOvr>
-  <p:timing>
-    <p:tnLst>
-      <p:par>
-        <p:cTn id="1" dur="indefinite" restart="never" nodeType="tmRoot"/>
-      </p:par>
-    </p:tnLst>
-  </p:timing>
 </p:sld>
 </file>
 
@@ -8591,23 +8389,14 @@
           </a:p>
           <a:p>
             <a:r>
-              <a:rPr lang="en-US" dirty="0" smtClean="0"/>
+              <a:rPr lang="en-US" dirty="0"/>
               <a:t>The background will be based upon game menu interface.</a:t>
             </a:r>
-            <a:endParaRPr lang="en-US" dirty="0"/>
-          </a:p>
-          <a:p>
-            <a:r>
-              <a:rPr lang="en-US" dirty="0"/>
-              <a:t>Leaderboard is a scrollable </a:t>
-            </a:r>
-            <a:r>
-              <a:rPr lang="en-US" dirty="0" smtClean="0"/>
-              <a:t>list updated </a:t>
-            </a:r>
-            <a:r>
-              <a:rPr lang="en-US" dirty="0"/>
-              <a:t>from local database in the application.</a:t>
+          </a:p>
+          <a:p>
+            <a:r>
+              <a:rPr lang="en-US" dirty="0"/>
+              <a:t>Leaderboard is a scrollable list updated from local database in the application.</a:t>
             </a:r>
           </a:p>
           <a:p>
@@ -8619,13 +8408,8 @@
           <a:p>
             <a:r>
               <a:rPr lang="en-US" dirty="0"/>
-              <a:t>Score from previous game is highlighted in leaderboard</a:t>
-            </a:r>
-            <a:r>
-              <a:rPr lang="en-US" dirty="0" smtClean="0"/>
-              <a:t>.</a:t>
-            </a:r>
-            <a:endParaRPr lang="en-US" dirty="0"/>
+              <a:t>Score from previous game is highlighted in leaderboard.</a:t>
+            </a:r>
           </a:p>
         </p:txBody>
       </p:sp>
@@ -8700,13 +8484,6 @@
   <p:clrMapOvr>
     <a:masterClrMapping/>
   </p:clrMapOvr>
-  <p:timing>
-    <p:tnLst>
-      <p:par>
-        <p:cTn id="1" dur="indefinite" restart="never" nodeType="tmRoot"/>
-      </p:par>
-    </p:tnLst>
-  </p:timing>
 </p:sld>
 </file>
 
@@ -8748,7 +8525,7 @@
           <a:lstStyle/>
           <a:p>
             <a:r>
-              <a:rPr lang="en-US" dirty="0" smtClean="0"/>
+              <a:rPr lang="en-US" dirty="0"/>
               <a:t>Issues anticipated, and solutions:</a:t>
             </a:r>
             <a:endParaRPr lang="en-AU" dirty="0"/>
@@ -8780,7 +8557,7 @@
             <a:pPr marL="0" indent="0">
               <a:buNone/>
             </a:pPr>
-            <a:endParaRPr lang="en-US" dirty="0" smtClean="0"/>
+            <a:endParaRPr lang="en-US" dirty="0"/>
           </a:p>
           <a:p>
             <a:pPr>
@@ -8788,7 +8565,7 @@
               <a:buAutoNum type="arabicPeriod"/>
             </a:pPr>
             <a:r>
-              <a:rPr lang="en-US" dirty="0" smtClean="0"/>
+              <a:rPr lang="en-US" dirty="0"/>
               <a:t>Deployment to various Android OS’s.</a:t>
             </a:r>
           </a:p>
@@ -8798,7 +8575,7 @@
               <a:buAutoNum type="arabicPeriod"/>
             </a:pPr>
             <a:r>
-              <a:rPr lang="en-US" dirty="0" smtClean="0"/>
+              <a:rPr lang="en-US" dirty="0"/>
               <a:t>Not connecting to cloud-services.</a:t>
             </a:r>
           </a:p>
@@ -8808,7 +8585,7 @@
               <a:buAutoNum type="arabicPeriod"/>
             </a:pPr>
             <a:r>
-              <a:rPr lang="en-US" dirty="0" smtClean="0"/>
+              <a:rPr lang="en-US" dirty="0"/>
               <a:t>Unable to save necessary game data (scores, or game state). </a:t>
             </a:r>
           </a:p>
@@ -8818,7 +8595,7 @@
               <a:buAutoNum type="arabicPeriod"/>
             </a:pPr>
             <a:r>
-              <a:rPr lang="en-US" dirty="0" smtClean="0"/>
+              <a:rPr lang="en-US" dirty="0"/>
               <a:t>Abnormalities in positioning application components. </a:t>
             </a:r>
           </a:p>
@@ -8826,13 +8603,13 @@
             <a:pPr marL="0" indent="0">
               <a:buNone/>
             </a:pPr>
-            <a:endParaRPr lang="en-US" dirty="0" smtClean="0"/>
-          </a:p>
-          <a:p>
-            <a:endParaRPr lang="en-US" dirty="0" smtClean="0"/>
-          </a:p>
-          <a:p>
-            <a:endParaRPr lang="en-US" dirty="0" smtClean="0"/>
+            <a:endParaRPr lang="en-US" dirty="0"/>
+          </a:p>
+          <a:p>
+            <a:endParaRPr lang="en-US" dirty="0"/>
+          </a:p>
+          <a:p>
+            <a:endParaRPr lang="en-US" dirty="0"/>
           </a:p>
           <a:p>
             <a:endParaRPr lang="en-AU" dirty="0"/>
@@ -8866,21 +8643,21 @@
               <a:buAutoNum type="arabicPeriod"/>
             </a:pPr>
             <a:r>
-              <a:rPr lang="en-US" dirty="0" smtClean="0"/>
+              <a:rPr lang="en-US" dirty="0"/>
               <a:t>Android OS:</a:t>
             </a:r>
           </a:p>
           <a:p>
             <a:pPr lvl="1"/>
             <a:r>
-              <a:rPr lang="en-US" dirty="0" smtClean="0"/>
+              <a:rPr lang="en-US" dirty="0"/>
               <a:t>Specify minimum Android OS.</a:t>
             </a:r>
           </a:p>
           <a:p>
             <a:pPr lvl="1"/>
             <a:r>
-              <a:rPr lang="en-US" dirty="0" smtClean="0"/>
+              <a:rPr lang="en-US" dirty="0"/>
               <a:t>Specify target Android OS. </a:t>
             </a:r>
           </a:p>
@@ -8890,14 +8667,14 @@
               <a:buAutoNum type="arabicPeriod"/>
             </a:pPr>
             <a:r>
-              <a:rPr lang="en-US" dirty="0" smtClean="0"/>
+              <a:rPr lang="en-US" dirty="0"/>
               <a:t>cloud-services:</a:t>
             </a:r>
           </a:p>
           <a:p>
             <a:pPr lvl="1"/>
             <a:r>
-              <a:rPr lang="en-US" dirty="0" smtClean="0"/>
+              <a:rPr lang="en-US" dirty="0"/>
               <a:t>Upcoming class material.</a:t>
             </a:r>
           </a:p>
@@ -8907,14 +8684,14 @@
               <a:buAutoNum type="arabicPeriod"/>
             </a:pPr>
             <a:r>
-              <a:rPr lang="en-US" dirty="0" smtClean="0"/>
+              <a:rPr lang="en-US" dirty="0"/>
               <a:t>Saving game data:</a:t>
             </a:r>
           </a:p>
           <a:p>
             <a:pPr lvl="1"/>
             <a:r>
-              <a:rPr lang="en-US" dirty="0" smtClean="0"/>
+              <a:rPr lang="en-US" dirty="0"/>
               <a:t>Implement procedures for saving, and updating high-scores. </a:t>
             </a:r>
           </a:p>
@@ -8924,21 +8701,21 @@
               <a:buAutoNum type="arabicPeriod"/>
             </a:pPr>
             <a:r>
-              <a:rPr lang="en-US" dirty="0" smtClean="0"/>
+              <a:rPr lang="en-US" dirty="0"/>
               <a:t>Abnormalities: </a:t>
             </a:r>
           </a:p>
           <a:p>
             <a:pPr lvl="1"/>
             <a:r>
-              <a:rPr lang="en-US" dirty="0" smtClean="0"/>
+              <a:rPr lang="en-US" dirty="0"/>
               <a:t>Research components for layout. </a:t>
             </a:r>
           </a:p>
           <a:p>
             <a:pPr lvl="1"/>
             <a:r>
-              <a:rPr lang="en-US" dirty="0" smtClean="0"/>
+              <a:rPr lang="en-US" dirty="0"/>
               <a:t>Test different parameters, layout managers. </a:t>
             </a:r>
           </a:p>
@@ -8947,17 +8724,17 @@
               <a:buFont typeface="+mj-lt"/>
               <a:buAutoNum type="arabicPeriod"/>
             </a:pPr>
-            <a:endParaRPr lang="en-US" dirty="0" smtClean="0"/>
+            <a:endParaRPr lang="en-US" dirty="0"/>
           </a:p>
           <a:p>
             <a:pPr lvl="1"/>
-            <a:endParaRPr lang="en-US" dirty="0" smtClean="0"/>
+            <a:endParaRPr lang="en-US" dirty="0"/>
           </a:p>
           <a:p>
             <a:pPr marL="457200" lvl="1" indent="0">
               <a:buNone/>
             </a:pPr>
-            <a:endParaRPr lang="en-US" dirty="0" smtClean="0"/>
+            <a:endParaRPr lang="en-US" dirty="0"/>
           </a:p>
           <a:p>
             <a:pPr lvl="1">
@@ -8991,7 +8768,7 @@
           <a:lstStyle/>
           <a:p>
             <a:r>
-              <a:rPr lang="en-US" dirty="0" smtClean="0"/>
+              <a:rPr lang="en-US" dirty="0"/>
               <a:t>Problems:</a:t>
             </a:r>
             <a:endParaRPr lang="en-AU" dirty="0"/>
@@ -9021,7 +8798,7 @@
           <a:lstStyle/>
           <a:p>
             <a:r>
-              <a:rPr lang="en-US" dirty="0" smtClean="0"/>
+              <a:rPr lang="en-US" dirty="0"/>
               <a:t>Solutions:</a:t>
             </a:r>
             <a:endParaRPr lang="en-AU" dirty="0"/>
@@ -9038,13 +8815,6 @@
   <p:clrMapOvr>
     <a:masterClrMapping/>
   </p:clrMapOvr>
-  <p:timing>
-    <p:tnLst>
-      <p:par>
-        <p:cTn id="1" dur="indefinite" restart="never" nodeType="tmRoot"/>
-      </p:par>
-    </p:tnLst>
-  </p:timing>
 </p:sld>
 </file>
 
@@ -9119,13 +8889,6 @@
   <p:clrMapOvr>
     <a:masterClrMapping/>
   </p:clrMapOvr>
-  <p:timing>
-    <p:tnLst>
-      <p:par>
-        <p:cTn id="1" dur="indefinite" restart="never" nodeType="tmRoot"/>
-      </p:par>
-    </p:tnLst>
-  </p:timing>
 </p:sld>
 </file>
 

</xml_diff>

<commit_message>
Updated the powerpoint slide by added additional information
</commit_message>
<xml_diff>
--- a/SCaRArcade.pptx
+++ b/SCaRArcade.pptx
@@ -6323,15 +6323,7 @@
           <a:p>
             <a:r>
               <a:rPr lang="en-US" sz="1400" dirty="0"/>
-              <a:t>Figure 3: Tower of </a:t>
-            </a:r>
-            <a:r>
-              <a:rPr lang="en-US" sz="1400"/>
-              <a:t>Hanoi interface </a:t>
-            </a:r>
-            <a:r>
-              <a:rPr lang="en-US" sz="1400" dirty="0"/>
-              <a:t>(Ryan)</a:t>
+              <a:t>Figure 3: Tower of Hanoi interface (Ryan)</a:t>
             </a:r>
           </a:p>
         </p:txBody>
@@ -6406,7 +6398,7 @@
           <a:p>
             <a:r>
               <a:rPr lang="en-US" dirty="0"/>
-              <a:t>Tower of Hanoi (Continued):</a:t>
+              <a:t>Tower of Hanoi Problems/Solutions:</a:t>
             </a:r>
             <a:endParaRPr lang="en-AU" dirty="0"/>
           </a:p>
@@ -6422,7 +6414,12 @@
             <p:ph type="body" idx="1"/>
           </p:nvPr>
         </p:nvSpPr>
-        <p:spPr/>
+        <p:spPr>
+          <a:xfrm>
+            <a:off x="1103312" y="1338263"/>
+            <a:ext cx="4396338" cy="576262"/>
+          </a:xfrm>
+        </p:spPr>
         <p:txBody>
           <a:bodyPr/>
           <a:lstStyle/>
@@ -6445,35 +6442,86 @@
             <p:ph sz="half" idx="2"/>
           </p:nvPr>
         </p:nvSpPr>
-        <p:spPr/>
-        <p:txBody>
-          <a:bodyPr/>
-          <a:lstStyle/>
-          <a:p>
-            <a:r>
-              <a:rPr lang="en-US" dirty="0"/>
-              <a:t>Drag, and drop.</a:t>
-            </a:r>
-          </a:p>
-          <a:p>
+        <p:spPr>
+          <a:xfrm>
+            <a:off x="461412" y="1966912"/>
+            <a:ext cx="4396339" cy="4529138"/>
+          </a:xfrm>
+        </p:spPr>
+        <p:txBody>
+          <a:bodyPr/>
+          <a:lstStyle/>
+          <a:p>
+            <a:pPr>
+              <a:buFont typeface="+mj-lt"/>
+              <a:buAutoNum type="arabicPeriod"/>
+            </a:pPr>
+            <a:r>
+              <a:rPr lang="en-US" dirty="0"/>
+              <a:t>Drag, and drop functionality. </a:t>
+            </a:r>
+          </a:p>
+          <a:p>
+            <a:pPr lvl="1">
+              <a:buFont typeface="+mj-lt"/>
+              <a:buAutoNum type="arabicPeriod"/>
+            </a:pPr>
+            <a:r>
+              <a:rPr lang="en-US" dirty="0"/>
+              <a:t>Event handlers will not be triggered correctly or at all.</a:t>
+            </a:r>
+          </a:p>
+          <a:p>
+            <a:pPr>
+              <a:buFont typeface="+mj-lt"/>
+              <a:buAutoNum type="arabicPeriod"/>
+            </a:pPr>
             <a:r>
               <a:rPr lang="en-US" dirty="0"/>
               <a:t>Image sizes.</a:t>
             </a:r>
           </a:p>
           <a:p>
+            <a:pPr lvl="1">
+              <a:buFont typeface="+mj-lt"/>
+              <a:buAutoNum type="arabicPeriod"/>
+            </a:pPr>
+            <a:r>
+              <a:rPr lang="en-US" dirty="0"/>
+              <a:t>Images decrease in size as number of disks are created, with distance between disks increase.</a:t>
+            </a:r>
+          </a:p>
+          <a:p>
+            <a:pPr>
+              <a:buFont typeface="+mj-lt"/>
+              <a:buAutoNum type="arabicPeriod"/>
+            </a:pPr>
             <a:r>
               <a:rPr lang="en-US" dirty="0"/>
               <a:t>Freedom of customization.</a:t>
             </a:r>
           </a:p>
           <a:p>
+            <a:pPr>
+              <a:buFont typeface="+mj-lt"/>
+              <a:buAutoNum type="arabicPeriod"/>
+            </a:pPr>
             <a:r>
               <a:rPr lang="en-US" dirty="0"/>
               <a:t>Implementing game logic.</a:t>
             </a:r>
           </a:p>
           <a:p>
+            <a:pPr lvl="1">
+              <a:buFont typeface="+mj-lt"/>
+              <a:buAutoNum type="arabicPeriod"/>
+            </a:pPr>
+            <a:r>
+              <a:rPr lang="en-US" dirty="0"/>
+              <a:t>Incorrect functions not being implemented correctly.</a:t>
+            </a:r>
+          </a:p>
+          <a:p>
             <a:endParaRPr lang="en-AU" dirty="0"/>
           </a:p>
         </p:txBody>
@@ -6488,7 +6536,12 @@
             <p:ph type="body" sz="quarter" idx="3"/>
           </p:nvPr>
         </p:nvSpPr>
-        <p:spPr/>
+        <p:spPr>
+          <a:xfrm>
+            <a:off x="4857751" y="1285876"/>
+            <a:ext cx="4396339" cy="576262"/>
+          </a:xfrm>
+        </p:spPr>
         <p:txBody>
           <a:bodyPr/>
           <a:lstStyle/>
@@ -6511,35 +6564,112 @@
             <p:ph sz="quarter" idx="4"/>
           </p:nvPr>
         </p:nvSpPr>
-        <p:spPr/>
-        <p:txBody>
-          <a:bodyPr/>
-          <a:lstStyle/>
-          <a:p>
+        <p:spPr>
+          <a:xfrm>
+            <a:off x="4857750" y="1919287"/>
+            <a:ext cx="5193084" cy="4552949"/>
+          </a:xfrm>
+        </p:spPr>
+        <p:txBody>
+          <a:bodyPr>
+            <a:normAutofit lnSpcReduction="10000"/>
+          </a:bodyPr>
+          <a:lstStyle/>
+          <a:p>
+            <a:pPr>
+              <a:buFont typeface="+mj-lt"/>
+              <a:buAutoNum type="arabicPeriod"/>
+            </a:pPr>
+            <a:r>
+              <a:rPr lang="en-US" dirty="0"/>
+              <a:t>Drag and drop:</a:t>
+            </a:r>
+          </a:p>
+          <a:p>
+            <a:pPr lvl="1">
+              <a:buFont typeface="+mj-lt"/>
+              <a:buAutoNum type="arabicPeriod"/>
+            </a:pPr>
             <a:r>
               <a:rPr lang="en-US" dirty="0"/>
               <a:t>Additional research into user input data collection, for triggering key event handlers.</a:t>
             </a:r>
           </a:p>
           <a:p>
+            <a:pPr>
+              <a:buFont typeface="+mj-lt"/>
+              <a:buAutoNum type="arabicPeriod"/>
+            </a:pPr>
+            <a:r>
+              <a:rPr lang="en-US" dirty="0"/>
+              <a:t>Image size:</a:t>
+            </a:r>
+          </a:p>
+          <a:p>
+            <a:pPr lvl="1">
+              <a:buFont typeface="+mj-lt"/>
+              <a:buAutoNum type="arabicPeriod"/>
+            </a:pPr>
             <a:r>
               <a:rPr lang="en-US" dirty="0"/>
               <a:t>Downscaling image resolution to fit a desired screen.</a:t>
             </a:r>
           </a:p>
           <a:p>
-            <a:r>
-              <a:rPr lang="en-US" dirty="0"/>
-              <a:t>Creating min/max No. of disks.</a:t>
-            </a:r>
-          </a:p>
-          <a:p>
-            <a:r>
-              <a:rPr lang="en-US" dirty="0"/>
-              <a:t>Fixed No. of poles.</a:t>
-            </a:r>
-          </a:p>
-          <a:p>
+            <a:pPr lvl="1">
+              <a:buFont typeface="+mj-lt"/>
+              <a:buAutoNum type="arabicPeriod"/>
+            </a:pPr>
+            <a:r>
+              <a:rPr lang="en-US" dirty="0"/>
+              <a:t>Setting an image size to a set value. </a:t>
+            </a:r>
+          </a:p>
+          <a:p>
+            <a:pPr>
+              <a:buFont typeface="+mj-lt"/>
+              <a:buAutoNum type="arabicPeriod"/>
+            </a:pPr>
+            <a:r>
+              <a:rPr lang="en-US" dirty="0"/>
+              <a:t>Freedom of customization:</a:t>
+            </a:r>
+          </a:p>
+          <a:p>
+            <a:pPr lvl="1">
+              <a:buFont typeface="+mj-lt"/>
+              <a:buAutoNum type="arabicPeriod"/>
+            </a:pPr>
+            <a:r>
+              <a:rPr lang="en-US" dirty="0"/>
+              <a:t>Limit number of disks.</a:t>
+            </a:r>
+          </a:p>
+          <a:p>
+            <a:pPr lvl="1">
+              <a:buFont typeface="+mj-lt"/>
+              <a:buAutoNum type="arabicPeriod"/>
+            </a:pPr>
+            <a:r>
+              <a:rPr lang="en-US" dirty="0"/>
+              <a:t>Fixed number of poles.</a:t>
+            </a:r>
+          </a:p>
+          <a:p>
+            <a:pPr>
+              <a:buFont typeface="+mj-lt"/>
+              <a:buAutoNum type="arabicPeriod"/>
+            </a:pPr>
+            <a:r>
+              <a:rPr lang="en-US" dirty="0"/>
+              <a:t>Game logic:</a:t>
+            </a:r>
+          </a:p>
+          <a:p>
+            <a:pPr lvl="1">
+              <a:buFont typeface="+mj-lt"/>
+              <a:buAutoNum type="arabicPeriod"/>
+            </a:pPr>
             <a:r>
               <a:rPr lang="en-US" dirty="0"/>
               <a:t>Research into the rules of the game and its components.</a:t>
@@ -6806,7 +6936,7 @@
           <a:lstStyle/>
           <a:p>
             <a:r>
-              <a:rPr lang="en-US" sz="2800" dirty="0"/>
+              <a:rPr lang="en-US" dirty="0"/>
               <a:t>Optional Features</a:t>
             </a:r>
           </a:p>
@@ -6824,7 +6954,7 @@
         </p:nvSpPr>
         <p:spPr>
           <a:xfrm>
-            <a:off x="646111" y="1052945"/>
+            <a:off x="646111" y="1233920"/>
             <a:ext cx="10178907" cy="4987637"/>
           </a:xfrm>
         </p:spPr>
@@ -6838,14 +6968,50 @@
             </a:r>
           </a:p>
           <a:p>
-            <a:pPr lvl="1"/>
+            <a:pPr lvl="1">
+              <a:buFont typeface="Courier New" panose="02070309020205020404" pitchFamily="49" charset="0"/>
+              <a:buChar char="o"/>
+            </a:pPr>
             <a:r>
               <a:rPr lang="en-US" dirty="0"/>
               <a:t>Add/Remove games</a:t>
             </a:r>
           </a:p>
           <a:p>
-            <a:pPr lvl="1"/>
+            <a:pPr lvl="1">
+              <a:buFont typeface="Courier New" panose="02070309020205020404" pitchFamily="49" charset="0"/>
+              <a:buChar char="o"/>
+            </a:pPr>
+            <a:r>
+              <a:rPr lang="en-US" dirty="0"/>
+              <a:t>Customizable ordering of games in menu:</a:t>
+            </a:r>
+          </a:p>
+          <a:p>
+            <a:pPr marL="1257300" lvl="2" indent="-342900">
+              <a:buFont typeface="+mj-lt"/>
+              <a:buAutoNum type="alphaLcPeriod"/>
+            </a:pPr>
+            <a:r>
+              <a:rPr lang="en-US" dirty="0"/>
+              <a:t>Alphabetically</a:t>
+            </a:r>
+          </a:p>
+          <a:p>
+            <a:pPr marL="1257300" lvl="2" indent="-342900">
+              <a:buFont typeface="+mj-lt"/>
+              <a:buAutoNum type="alphaLcPeriod"/>
+            </a:pPr>
+            <a:r>
+              <a:rPr lang="en-US" dirty="0"/>
+              <a:t>Or by the user’s preference. </a:t>
+            </a:r>
+          </a:p>
+          <a:p>
+            <a:pPr lvl="1">
+              <a:buFont typeface="Courier New" panose="02070309020205020404" pitchFamily="49" charset="0"/>
+              <a:buChar char="o"/>
+            </a:pPr>
             <a:r>
               <a:rPr lang="en-US" dirty="0"/>
               <a:t>Additional games available through cloud</a:t>
@@ -6858,14 +7024,20 @@
             </a:r>
           </a:p>
           <a:p>
-            <a:pPr lvl="1"/>
+            <a:pPr lvl="1">
+              <a:buFont typeface="Courier New" panose="02070309020205020404" pitchFamily="49" charset="0"/>
+              <a:buChar char="o"/>
+            </a:pPr>
             <a:r>
               <a:rPr lang="en-US" dirty="0"/>
               <a:t>Track country data (Google maps API?)</a:t>
             </a:r>
           </a:p>
           <a:p>
-            <a:pPr lvl="1"/>
+            <a:pPr lvl="1">
+              <a:buFont typeface="Courier New" panose="02070309020205020404" pitchFamily="49" charset="0"/>
+              <a:buChar char="o"/>
+            </a:pPr>
             <a:r>
               <a:rPr lang="en-US" dirty="0"/>
               <a:t>Single database stored on cloud (top 100)</a:t>
@@ -6955,7 +7127,27 @@
             </a:pPr>
             <a:r>
               <a:rPr lang="en-US" dirty="0"/>
-              <a:t>Layout manager</a:t>
+              <a:t>Layout manager:</a:t>
+            </a:r>
+          </a:p>
+          <a:p>
+            <a:pPr lvl="2">
+              <a:buFont typeface="Wingdings" panose="05000000000000000000" pitchFamily="2" charset="2"/>
+              <a:buChar char="Ø"/>
+            </a:pPr>
+            <a:r>
+              <a:rPr lang="en-US" dirty="0"/>
+              <a:t>Positioning of key components. </a:t>
+            </a:r>
+          </a:p>
+          <a:p>
+            <a:pPr lvl="2">
+              <a:buFont typeface="Wingdings" panose="05000000000000000000" pitchFamily="2" charset="2"/>
+              <a:buChar char="Ø"/>
+            </a:pPr>
+            <a:r>
+              <a:rPr lang="en-US" dirty="0"/>
+              <a:t>Modulization of distinct components.</a:t>
             </a:r>
           </a:p>
           <a:p>
@@ -7499,14 +7691,14 @@
           <p:nvPr>
             <p:extLst>
               <p:ext uri="{D42A27DB-BD31-4B8C-83A1-F6EECF244321}">
-                <p14:modId xmlns:p14="http://schemas.microsoft.com/office/powerpoint/2010/main" val="900626126"/>
+                <p14:modId xmlns:p14="http://schemas.microsoft.com/office/powerpoint/2010/main" val="1048579398"/>
               </p:ext>
             </p:extLst>
           </p:nvPr>
         </p:nvGraphicFramePr>
         <p:xfrm>
-          <a:off x="826052" y="1381607"/>
-          <a:ext cx="9918148" cy="5266508"/>
+          <a:off x="778427" y="1219682"/>
+          <a:ext cx="9918148" cy="5540828"/>
         </p:xfrm>
         <a:graphic>
           <a:graphicData uri="http://schemas.openxmlformats.org/drawingml/2006/table">
@@ -7720,7 +7912,7 @@
                             <a:schemeClr val="bg1"/>
                           </a:solidFill>
                         </a:rPr>
-                        <a:t>Build interface</a:t>
+                        <a:t>Build interfaces (game, menu)</a:t>
                       </a:r>
                       <a:r>
                         <a:rPr lang="en-US" baseline="0" dirty="0">
@@ -7728,7 +7920,7 @@
                             <a:schemeClr val="bg1"/>
                           </a:solidFill>
                         </a:rPr>
-                        <a:t> (from design plan)</a:t>
+                        <a:t> from design plan</a:t>
                       </a:r>
                     </a:p>
                     <a:p>
@@ -7756,7 +7948,7 @@
                             <a:schemeClr val="bg1"/>
                           </a:solidFill>
                         </a:rPr>
-                        <a:t>Program games.  </a:t>
+                        <a:t>Build prototype of games.  </a:t>
                       </a:r>
                     </a:p>
                     <a:p>
@@ -7869,6 +8061,22 @@
                         </a:rPr>
                         <a:t>User inputs.</a:t>
                       </a:r>
+                    </a:p>
+                    <a:p>
+                      <a:pPr marL="342900" indent="-342900">
+                        <a:buFont typeface="+mj-lt"/>
+                        <a:buAutoNum type="arabicPeriod"/>
+                      </a:pPr>
+                      <a:r>
+                        <a:rPr lang="en-US" baseline="0" dirty="0">
+                          <a:solidFill>
+                            <a:schemeClr val="tx1">
+                              <a:lumMod val="50000"/>
+                            </a:schemeClr>
+                          </a:solidFill>
+                        </a:rPr>
+                        <a:t>Leaderboard.</a:t>
+                      </a:r>
                       <a:endParaRPr lang="en-AU" dirty="0">
                         <a:solidFill>
                           <a:schemeClr val="tx1">
@@ -8584,7 +8792,7 @@
             </a:pPr>
             <a:r>
               <a:rPr lang="en-US" dirty="0"/>
-              <a:t>Not connecting to cloud-services.</a:t>
+              <a:t>Unable to connect to cloud-services.</a:t>
             </a:r>
           </a:p>
           <a:p>
@@ -8724,7 +8932,7 @@
             <a:pPr lvl="1"/>
             <a:r>
               <a:rPr lang="en-US" dirty="0"/>
-              <a:t>Test different parameters, layout managers. </a:t>
+              <a:t>Test different parameters, and layout managers. </a:t>
             </a:r>
           </a:p>
           <a:p>
@@ -8761,7 +8969,7 @@
         </p:nvSpPr>
         <p:spPr>
           <a:xfrm>
-            <a:off x="1103312" y="1480201"/>
+            <a:off x="1103312" y="1348895"/>
             <a:ext cx="4551181" cy="369332"/>
           </a:xfrm>
           <a:prstGeom prst="rect">
@@ -8791,7 +8999,7 @@
         </p:nvSpPr>
         <p:spPr>
           <a:xfrm>
-            <a:off x="5499653" y="1500211"/>
+            <a:off x="5538363" y="1322215"/>
             <a:ext cx="4551181" cy="369332"/>
           </a:xfrm>
           <a:prstGeom prst="rect">

</xml_diff>

<commit_message>
Power point slides updated
</commit_message>
<xml_diff>
--- a/SCaRArcade.pptx
+++ b/SCaRArcade.pptx
@@ -18,10 +18,11 @@
     <p:sldId id="275" r:id="rId12"/>
     <p:sldId id="262" r:id="rId13"/>
     <p:sldId id="274" r:id="rId14"/>
-    <p:sldId id="270" r:id="rId15"/>
-    <p:sldId id="277" r:id="rId16"/>
-    <p:sldId id="278" r:id="rId17"/>
-    <p:sldId id="266" r:id="rId18"/>
+    <p:sldId id="279" r:id="rId15"/>
+    <p:sldId id="270" r:id="rId16"/>
+    <p:sldId id="277" r:id="rId17"/>
+    <p:sldId id="278" r:id="rId18"/>
+    <p:sldId id="266" r:id="rId19"/>
   </p:sldIdLst>
   <p:sldSz cx="12192000" cy="6858000"/>
   <p:notesSz cx="6858000" cy="9144000"/>
@@ -314,7 +315,7 @@
           <a:p>
             <a:fld id="{48A87A34-81AB-432B-8DAE-1953F412C126}" type="datetimeFigureOut">
               <a:rPr lang="en-US" smtClean="0"/>
-              <a:t>27-Mar-17</a:t>
+              <a:t>3/30/2017</a:t>
             </a:fld>
             <a:endParaRPr lang="en-US" dirty="0"/>
           </a:p>
@@ -589,7 +590,7 @@
           <a:p>
             <a:fld id="{48A87A34-81AB-432B-8DAE-1953F412C126}" type="datetimeFigureOut">
               <a:rPr lang="en-US" smtClean="0"/>
-              <a:t>27-Mar-17</a:t>
+              <a:t>3/30/2017</a:t>
             </a:fld>
             <a:endParaRPr lang="en-US" dirty="0"/>
           </a:p>
@@ -783,7 +784,7 @@
           <a:p>
             <a:fld id="{48A87A34-81AB-432B-8DAE-1953F412C126}" type="datetimeFigureOut">
               <a:rPr lang="en-US" smtClean="0"/>
-              <a:t>27-Mar-17</a:t>
+              <a:t>3/30/2017</a:t>
             </a:fld>
             <a:endParaRPr lang="en-US" dirty="0"/>
           </a:p>
@@ -1056,7 +1057,7 @@
           <a:p>
             <a:fld id="{48A87A34-81AB-432B-8DAE-1953F412C126}" type="datetimeFigureOut">
               <a:rPr lang="en-US" smtClean="0"/>
-              <a:t>27-Mar-17</a:t>
+              <a:t>3/30/2017</a:t>
             </a:fld>
             <a:endParaRPr lang="en-US" dirty="0"/>
           </a:p>
@@ -1397,7 +1398,7 @@
           <a:p>
             <a:fld id="{48A87A34-81AB-432B-8DAE-1953F412C126}" type="datetimeFigureOut">
               <a:rPr lang="en-US" smtClean="0"/>
-              <a:t>27-Mar-17</a:t>
+              <a:t>3/30/2017</a:t>
             </a:fld>
             <a:endParaRPr lang="en-US" dirty="0"/>
           </a:p>
@@ -2020,7 +2021,7 @@
           <a:p>
             <a:fld id="{48A87A34-81AB-432B-8DAE-1953F412C126}" type="datetimeFigureOut">
               <a:rPr lang="en-US" smtClean="0"/>
-              <a:t>27-Mar-17</a:t>
+              <a:t>3/30/2017</a:t>
             </a:fld>
             <a:endParaRPr lang="en-US" dirty="0"/>
           </a:p>
@@ -2880,7 +2881,7 @@
           <a:p>
             <a:fld id="{48A87A34-81AB-432B-8DAE-1953F412C126}" type="datetimeFigureOut">
               <a:rPr lang="en-US" smtClean="0"/>
-              <a:t>27-Mar-17</a:t>
+              <a:t>3/30/2017</a:t>
             </a:fld>
             <a:endParaRPr lang="en-US" dirty="0"/>
           </a:p>
@@ -3050,7 +3051,7 @@
           <a:p>
             <a:fld id="{48A87A34-81AB-432B-8DAE-1953F412C126}" type="datetimeFigureOut">
               <a:rPr lang="en-US" smtClean="0"/>
-              <a:t>27-Mar-17</a:t>
+              <a:t>3/30/2017</a:t>
             </a:fld>
             <a:endParaRPr lang="en-US" dirty="0"/>
           </a:p>
@@ -3230,7 +3231,7 @@
           <a:p>
             <a:fld id="{48A87A34-81AB-432B-8DAE-1953F412C126}" type="datetimeFigureOut">
               <a:rPr lang="en-US" smtClean="0"/>
-              <a:t>27-Mar-17</a:t>
+              <a:t>3/30/2017</a:t>
             </a:fld>
             <a:endParaRPr lang="en-US" dirty="0"/>
           </a:p>
@@ -3400,7 +3401,7 @@
           <a:p>
             <a:fld id="{48A87A34-81AB-432B-8DAE-1953F412C126}" type="datetimeFigureOut">
               <a:rPr lang="en-US" smtClean="0"/>
-              <a:t>27-Mar-17</a:t>
+              <a:t>3/30/2017</a:t>
             </a:fld>
             <a:endParaRPr lang="en-US" dirty="0"/>
           </a:p>
@@ -3647,7 +3648,7 @@
           <a:p>
             <a:fld id="{48A87A34-81AB-432B-8DAE-1953F412C126}" type="datetimeFigureOut">
               <a:rPr lang="en-US" smtClean="0"/>
-              <a:t>27-Mar-17</a:t>
+              <a:t>3/30/2017</a:t>
             </a:fld>
             <a:endParaRPr lang="en-US" dirty="0"/>
           </a:p>
@@ -3939,7 +3940,7 @@
           <a:p>
             <a:fld id="{48A87A34-81AB-432B-8DAE-1953F412C126}" type="datetimeFigureOut">
               <a:rPr lang="en-US" smtClean="0"/>
-              <a:t>27-Mar-17</a:t>
+              <a:t>3/30/2017</a:t>
             </a:fld>
             <a:endParaRPr lang="en-US" dirty="0"/>
           </a:p>
@@ -4383,7 +4384,7 @@
           <a:p>
             <a:fld id="{48A87A34-81AB-432B-8DAE-1953F412C126}" type="datetimeFigureOut">
               <a:rPr lang="en-US" smtClean="0"/>
-              <a:t>27-Mar-17</a:t>
+              <a:t>3/30/2017</a:t>
             </a:fld>
             <a:endParaRPr lang="en-US" dirty="0"/>
           </a:p>
@@ -4501,7 +4502,7 @@
           <a:p>
             <a:fld id="{48A87A34-81AB-432B-8DAE-1953F412C126}" type="datetimeFigureOut">
               <a:rPr lang="en-US" smtClean="0"/>
-              <a:t>27-Mar-17</a:t>
+              <a:t>3/30/2017</a:t>
             </a:fld>
             <a:endParaRPr lang="en-US" dirty="0"/>
           </a:p>
@@ -4596,7 +4597,7 @@
           <a:p>
             <a:fld id="{48A87A34-81AB-432B-8DAE-1953F412C126}" type="datetimeFigureOut">
               <a:rPr lang="en-US" smtClean="0"/>
-              <a:t>27-Mar-17</a:t>
+              <a:t>3/30/2017</a:t>
             </a:fld>
             <a:endParaRPr lang="en-US" dirty="0"/>
           </a:p>
@@ -4875,7 +4876,7 @@
           <a:p>
             <a:fld id="{48A87A34-81AB-432B-8DAE-1953F412C126}" type="datetimeFigureOut">
               <a:rPr lang="en-US" smtClean="0"/>
-              <a:t>27-Mar-17</a:t>
+              <a:t>3/30/2017</a:t>
             </a:fld>
             <a:endParaRPr lang="en-US" dirty="0"/>
           </a:p>
@@ -5150,7 +5151,7 @@
           <a:p>
             <a:fld id="{48A87A34-81AB-432B-8DAE-1953F412C126}" type="datetimeFigureOut">
               <a:rPr lang="en-US" smtClean="0"/>
-              <a:t>27-Mar-17</a:t>
+              <a:t>3/30/2017</a:t>
             </a:fld>
             <a:endParaRPr lang="en-US" dirty="0"/>
           </a:p>
@@ -5580,7 +5581,7 @@
             <a:fld id="{48A87A34-81AB-432B-8DAE-1953F412C126}" type="datetimeFigureOut">
               <a:rPr lang="en-US" smtClean="0"/>
               <a:pPr/>
-              <a:t>27-Mar-17</a:t>
+              <a:t>3/30/2017</a:t>
             </a:fld>
             <a:endParaRPr lang="en-US" dirty="0"/>
           </a:p>
@@ -6283,20 +6284,8 @@
           </a:p>
           <a:p>
             <a:r>
-              <a:rPr lang="en-US"/>
-              <a:t>Player can </a:t>
-            </a:r>
-            <a:r>
-              <a:rPr lang="en-US" dirty="0"/>
-              <a:t>increase number </a:t>
-            </a:r>
-            <a:r>
-              <a:rPr lang="en-US"/>
-              <a:t>of disks, </a:t>
-            </a:r>
-            <a:r>
-              <a:rPr lang="en-US" dirty="0"/>
-              <a:t>but cannot increase the number of poles. </a:t>
+              <a:rPr lang="en-US" dirty="0"/>
+              <a:t>Player can increase number of disks, but cannot increase the number of poles. </a:t>
             </a:r>
           </a:p>
         </p:txBody>
@@ -6799,7 +6788,10 @@
           <a:bodyPr/>
           <a:lstStyle/>
           <a:p>
-            <a:endParaRPr lang="en-AU"/>
+            <a:r>
+              <a:rPr lang="en-AU" dirty="0"/>
+              <a:t>Memory Test (Deck of Cards)</a:t>
+            </a:r>
           </a:p>
         </p:txBody>
       </p:sp>
@@ -6818,7 +6810,10 @@
           <a:bodyPr/>
           <a:lstStyle/>
           <a:p>
-            <a:endParaRPr lang="en-AU"/>
+            <a:r>
+              <a:rPr lang="en-AU" dirty="0"/>
+              <a:t>Notes</a:t>
+            </a:r>
           </a:p>
         </p:txBody>
       </p:sp>
@@ -6839,8 +6834,23 @@
           <a:p>
             <a:r>
               <a:rPr lang="en-US" dirty="0"/>
-              <a:t>Memory test: hint will disabled, number of cards will increase, and cards will re-shuffle upon fail.</a:t>
-            </a:r>
+              <a:t>Memory test difficulties: hint can be disabled, number of cards can increase, and cards can re-shuffle upon fail.</a:t>
+            </a:r>
+          </a:p>
+          <a:p>
+            <a:r>
+              <a:rPr lang="en-US" dirty="0"/>
+              <a:t>Once the game has ended the score will be submitted for evaluation to the leaderboard.</a:t>
+            </a:r>
+          </a:p>
+          <a:p>
+            <a:r>
+              <a:rPr lang="en-US" dirty="0"/>
+              <a:t>Player can increase number of cards, but cannot increase the time or the number of failures. </a:t>
+            </a:r>
+          </a:p>
+          <a:p>
+            <a:endParaRPr lang="en-US" dirty="0"/>
           </a:p>
           <a:p>
             <a:endParaRPr lang="en-AU" dirty="0"/>
@@ -6925,10 +6935,37 @@
             <p:ph type="title"/>
           </p:nvPr>
         </p:nvSpPr>
+        <p:spPr/>
+        <p:txBody>
+          <a:bodyPr/>
+          <a:lstStyle/>
+          <a:p>
+            <a:r>
+              <a:rPr lang="en-AU" dirty="0"/>
+              <a:t>Memory Test </a:t>
+            </a:r>
+            <a:r>
+              <a:rPr lang="en-US" dirty="0"/>
+              <a:t>Problems/Solutions:</a:t>
+            </a:r>
+            <a:endParaRPr lang="en-AU" dirty="0"/>
+          </a:p>
+        </p:txBody>
+      </p:sp>
+      <p:sp>
+        <p:nvSpPr>
+          <p:cNvPr id="3" name="Text Placeholder 2"/>
+          <p:cNvSpPr>
+            <a:spLocks noGrp="1"/>
+          </p:cNvSpPr>
+          <p:nvPr>
+            <p:ph type="body" idx="1"/>
+          </p:nvPr>
+        </p:nvSpPr>
         <p:spPr>
           <a:xfrm>
-            <a:off x="646111" y="452718"/>
-            <a:ext cx="9404723" cy="600227"/>
+            <a:off x="1103312" y="1338263"/>
+            <a:ext cx="4396338" cy="576262"/>
           </a:xfrm>
         </p:spPr>
         <p:txBody>
@@ -6937,126 +6974,261 @@
           <a:p>
             <a:r>
               <a:rPr lang="en-US" dirty="0"/>
-              <a:t>Optional Features</a:t>
-            </a:r>
-          </a:p>
-        </p:txBody>
-      </p:sp>
-      <p:sp>
-        <p:nvSpPr>
-          <p:cNvPr id="3" name="Content Placeholder 2"/>
-          <p:cNvSpPr>
-            <a:spLocks noGrp="1"/>
-          </p:cNvSpPr>
-          <p:nvPr>
-            <p:ph idx="1"/>
+              <a:t>Problems</a:t>
+            </a:r>
+            <a:endParaRPr lang="en-AU" dirty="0"/>
+          </a:p>
+        </p:txBody>
+      </p:sp>
+      <p:sp>
+        <p:nvSpPr>
+          <p:cNvPr id="4" name="Content Placeholder 3"/>
+          <p:cNvSpPr>
+            <a:spLocks noGrp="1"/>
+          </p:cNvSpPr>
+          <p:nvPr>
+            <p:ph sz="half" idx="2"/>
           </p:nvPr>
         </p:nvSpPr>
         <p:spPr>
           <a:xfrm>
-            <a:off x="646111" y="1233920"/>
-            <a:ext cx="10178907" cy="4987637"/>
+            <a:off x="461412" y="1966912"/>
+            <a:ext cx="4396339" cy="4529138"/>
           </a:xfrm>
         </p:spPr>
         <p:txBody>
           <a:bodyPr/>
           <a:lstStyle/>
           <a:p>
-            <a:r>
-              <a:rPr lang="en-US" dirty="0"/>
-              <a:t>Adjustable games library</a:t>
+            <a:pPr>
+              <a:buFont typeface="+mj-lt"/>
+              <a:buAutoNum type="arabicPeriod"/>
+            </a:pPr>
+            <a:r>
+              <a:rPr lang="en-US" dirty="0"/>
+              <a:t>Image sizes.</a:t>
             </a:r>
           </a:p>
           <a:p>
             <a:pPr lvl="1">
-              <a:buFont typeface="Courier New" panose="02070309020205020404" pitchFamily="49" charset="0"/>
-              <a:buChar char="o"/>
+              <a:buFont typeface="+mj-lt"/>
+              <a:buAutoNum type="arabicPeriod"/>
             </a:pPr>
             <a:r>
               <a:rPr lang="en-US" dirty="0"/>
-              <a:t>Add/Remove games</a:t>
+              <a:t>Images decrease in size as number of pairs are created, with distance between cards decreased.</a:t>
+            </a:r>
+          </a:p>
+          <a:p>
+            <a:pPr>
+              <a:buFont typeface="+mj-lt"/>
+              <a:buAutoNum type="arabicPeriod"/>
+            </a:pPr>
+            <a:r>
+              <a:rPr lang="en-US" dirty="0"/>
+              <a:t>Freedom of customization.</a:t>
+            </a:r>
+          </a:p>
+          <a:p>
+            <a:pPr>
+              <a:buFont typeface="+mj-lt"/>
+              <a:buAutoNum type="arabicPeriod"/>
+            </a:pPr>
+            <a:r>
+              <a:rPr lang="en-US" dirty="0"/>
+              <a:t>Implementing game logic.</a:t>
             </a:r>
           </a:p>
           <a:p>
             <a:pPr lvl="1">
-              <a:buFont typeface="Courier New" panose="02070309020205020404" pitchFamily="49" charset="0"/>
-              <a:buChar char="o"/>
+              <a:buFont typeface="+mj-lt"/>
+              <a:buAutoNum type="arabicPeriod"/>
             </a:pPr>
             <a:r>
               <a:rPr lang="en-US" dirty="0"/>
-              <a:t>Customizable ordering of games in menu:</a:t>
-            </a:r>
-          </a:p>
-          <a:p>
-            <a:pPr marL="1257300" lvl="2" indent="-342900">
+              <a:t>Incorrect functions not being implemented correctly.</a:t>
+            </a:r>
+          </a:p>
+          <a:p>
+            <a:pPr>
               <a:buFont typeface="+mj-lt"/>
-              <a:buAutoNum type="alphaLcPeriod"/>
+              <a:buAutoNum type="arabicPeriod"/>
             </a:pPr>
             <a:r>
-              <a:rPr lang="en-US" dirty="0"/>
-              <a:t>Alphabetically</a:t>
-            </a:r>
-          </a:p>
-          <a:p>
-            <a:pPr marL="1257300" lvl="2" indent="-342900">
+              <a:rPr lang="en-AU" dirty="0"/>
+              <a:t>Cards</a:t>
+            </a:r>
+          </a:p>
+          <a:p>
+            <a:pPr marL="800100" lvl="1" indent="-342900">
               <a:buFont typeface="+mj-lt"/>
-              <a:buAutoNum type="alphaLcPeriod"/>
+              <a:buAutoNum type="arabicPeriod"/>
             </a:pPr>
             <a:r>
-              <a:rPr lang="en-US" dirty="0"/>
-              <a:t>Or by the user’s preference. </a:t>
+              <a:rPr lang="en-AU" dirty="0"/>
+              <a:t>Shuffling.</a:t>
+            </a:r>
+          </a:p>
+          <a:p>
+            <a:pPr marL="800100" lvl="1" indent="-342900">
+              <a:buFont typeface="+mj-lt"/>
+              <a:buAutoNum type="arabicPeriod"/>
+            </a:pPr>
+            <a:r>
+              <a:rPr lang="en-AU" dirty="0"/>
+              <a:t>Animations</a:t>
+            </a:r>
+          </a:p>
+        </p:txBody>
+      </p:sp>
+      <p:sp>
+        <p:nvSpPr>
+          <p:cNvPr id="5" name="Text Placeholder 4"/>
+          <p:cNvSpPr>
+            <a:spLocks noGrp="1"/>
+          </p:cNvSpPr>
+          <p:nvPr>
+            <p:ph type="body" sz="quarter" idx="3"/>
+          </p:nvPr>
+        </p:nvSpPr>
+        <p:spPr>
+          <a:xfrm>
+            <a:off x="4857751" y="1285876"/>
+            <a:ext cx="4396339" cy="576262"/>
+          </a:xfrm>
+        </p:spPr>
+        <p:txBody>
+          <a:bodyPr/>
+          <a:lstStyle/>
+          <a:p>
+            <a:r>
+              <a:rPr lang="en-US" dirty="0"/>
+              <a:t>Solutions:</a:t>
+            </a:r>
+            <a:endParaRPr lang="en-AU" dirty="0"/>
+          </a:p>
+        </p:txBody>
+      </p:sp>
+      <p:sp>
+        <p:nvSpPr>
+          <p:cNvPr id="6" name="Content Placeholder 5"/>
+          <p:cNvSpPr>
+            <a:spLocks noGrp="1"/>
+          </p:cNvSpPr>
+          <p:nvPr>
+            <p:ph sz="quarter" idx="4"/>
+          </p:nvPr>
+        </p:nvSpPr>
+        <p:spPr>
+          <a:xfrm>
+            <a:off x="4857750" y="1919287"/>
+            <a:ext cx="5193084" cy="4552949"/>
+          </a:xfrm>
+        </p:spPr>
+        <p:txBody>
+          <a:bodyPr>
+            <a:normAutofit/>
+          </a:bodyPr>
+          <a:lstStyle/>
+          <a:p>
+            <a:pPr>
+              <a:buFont typeface="+mj-lt"/>
+              <a:buAutoNum type="arabicPeriod"/>
+            </a:pPr>
+            <a:r>
+              <a:rPr lang="en-US" dirty="0"/>
+              <a:t>Image size:</a:t>
             </a:r>
           </a:p>
           <a:p>
             <a:pPr lvl="1">
-              <a:buFont typeface="Courier New" panose="02070309020205020404" pitchFamily="49" charset="0"/>
-              <a:buChar char="o"/>
+              <a:buFont typeface="+mj-lt"/>
+              <a:buAutoNum type="arabicPeriod"/>
             </a:pPr>
             <a:r>
               <a:rPr lang="en-US" dirty="0"/>
-              <a:t>Additional games available through cloud</a:t>
-            </a:r>
-          </a:p>
-          <a:p>
-            <a:r>
-              <a:rPr lang="en-US" dirty="0"/>
-              <a:t>Cloud-based Leaderboard</a:t>
+              <a:t>Downscaling image resolution to fit a desired screen.</a:t>
             </a:r>
           </a:p>
           <a:p>
             <a:pPr lvl="1">
-              <a:buFont typeface="Courier New" panose="02070309020205020404" pitchFamily="49" charset="0"/>
-              <a:buChar char="o"/>
+              <a:buFont typeface="+mj-lt"/>
+              <a:buAutoNum type="arabicPeriod"/>
             </a:pPr>
             <a:r>
               <a:rPr lang="en-US" dirty="0"/>
-              <a:t>Track country data (Google maps API?)</a:t>
+              <a:t>Setting an image size to a set value. </a:t>
+            </a:r>
+          </a:p>
+          <a:p>
+            <a:pPr>
+              <a:buFont typeface="+mj-lt"/>
+              <a:buAutoNum type="arabicPeriod"/>
+            </a:pPr>
+            <a:r>
+              <a:rPr lang="en-US" dirty="0"/>
+              <a:t>Freedom of customization:</a:t>
             </a:r>
           </a:p>
           <a:p>
             <a:pPr lvl="1">
-              <a:buFont typeface="Courier New" panose="02070309020205020404" pitchFamily="49" charset="0"/>
-              <a:buChar char="o"/>
+              <a:buFont typeface="+mj-lt"/>
+              <a:buAutoNum type="arabicPeriod"/>
             </a:pPr>
             <a:r>
               <a:rPr lang="en-US" dirty="0"/>
-              <a:t>Single database stored on cloud (top 100)</a:t>
-            </a:r>
-          </a:p>
-          <a:p>
-            <a:pPr lvl="1"/>
-            <a:endParaRPr lang="en-US" dirty="0"/>
-          </a:p>
-          <a:p>
-            <a:pPr lvl="1"/>
-            <a:endParaRPr lang="en-US" dirty="0"/>
+              <a:t>Limit number of pairs.</a:t>
+            </a:r>
+          </a:p>
+          <a:p>
+            <a:pPr lvl="1">
+              <a:buFont typeface="+mj-lt"/>
+              <a:buAutoNum type="arabicPeriod"/>
+            </a:pPr>
+            <a:r>
+              <a:rPr lang="en-US" dirty="0"/>
+              <a:t>Fixed time/failures.</a:t>
+            </a:r>
+          </a:p>
+          <a:p>
+            <a:pPr lvl="1">
+              <a:buFont typeface="+mj-lt"/>
+              <a:buAutoNum type="arabicPeriod"/>
+            </a:pPr>
+            <a:r>
+              <a:rPr lang="en-US" dirty="0"/>
+              <a:t>Having a deck on the side to pull new pairs </a:t>
+            </a:r>
+          </a:p>
+          <a:p>
+            <a:pPr>
+              <a:buFont typeface="+mj-lt"/>
+              <a:buAutoNum type="arabicPeriod"/>
+            </a:pPr>
+            <a:r>
+              <a:rPr lang="en-US" dirty="0"/>
+              <a:t>Game logic:</a:t>
+            </a:r>
+          </a:p>
+          <a:p>
+            <a:pPr lvl="1">
+              <a:buFont typeface="+mj-lt"/>
+              <a:buAutoNum type="arabicPeriod"/>
+            </a:pPr>
+            <a:r>
+              <a:rPr lang="en-US" dirty="0"/>
+              <a:t>Research into the rules of the game and its components.</a:t>
+            </a:r>
+          </a:p>
+          <a:p>
+            <a:endParaRPr lang="en-AU" dirty="0"/>
           </a:p>
         </p:txBody>
       </p:sp>
     </p:spTree>
     <p:extLst>
       <p:ext uri="{BB962C8B-B14F-4D97-AF65-F5344CB8AC3E}">
-        <p14:creationId xmlns:p14="http://schemas.microsoft.com/office/powerpoint/2010/main" val="3421208875"/>
+        <p14:creationId xmlns:p14="http://schemas.microsoft.com/office/powerpoint/2010/main" val="2840896906"/>
       </p:ext>
     </p:extLst>
   </p:cSld>
@@ -7093,16 +7265,20 @@
             <p:ph type="title"/>
           </p:nvPr>
         </p:nvSpPr>
-        <p:spPr/>
-        <p:txBody>
-          <a:bodyPr/>
-          <a:lstStyle/>
-          <a:p>
-            <a:r>
-              <a:rPr lang="en-US" dirty="0"/>
-              <a:t>INFT2050 Techniques used in this application.</a:t>
-            </a:r>
-            <a:endParaRPr lang="en-AU" dirty="0"/>
+        <p:spPr>
+          <a:xfrm>
+            <a:off x="646111" y="452718"/>
+            <a:ext cx="9404723" cy="600227"/>
+          </a:xfrm>
+        </p:spPr>
+        <p:txBody>
+          <a:bodyPr/>
+          <a:lstStyle/>
+          <a:p>
+            <a:r>
+              <a:rPr lang="en-US" dirty="0"/>
+              <a:t>Optional Features</a:t>
+            </a:r>
           </a:p>
         </p:txBody>
       </p:sp>
@@ -7116,116 +7292,111 @@
             <p:ph idx="1"/>
           </p:nvPr>
         </p:nvSpPr>
-        <p:spPr/>
-        <p:txBody>
-          <a:bodyPr/>
-          <a:lstStyle/>
+        <p:spPr>
+          <a:xfrm>
+            <a:off x="646111" y="1233920"/>
+            <a:ext cx="10178907" cy="4987637"/>
+          </a:xfrm>
+        </p:spPr>
+        <p:txBody>
+          <a:bodyPr/>
+          <a:lstStyle/>
+          <a:p>
+            <a:r>
+              <a:rPr lang="en-US" dirty="0"/>
+              <a:t>Adjustable games library</a:t>
+            </a:r>
+          </a:p>
           <a:p>
             <a:pPr lvl="1">
-              <a:buFont typeface="Wingdings" panose="05000000000000000000" pitchFamily="2" charset="2"/>
-              <a:buChar char="Ø"/>
+              <a:buFont typeface="Courier New" panose="02070309020205020404" pitchFamily="49" charset="0"/>
+              <a:buChar char="o"/>
             </a:pPr>
             <a:r>
               <a:rPr lang="en-US" dirty="0"/>
-              <a:t>Layout manager:</a:t>
-            </a:r>
-          </a:p>
-          <a:p>
-            <a:pPr lvl="2">
-              <a:buFont typeface="Wingdings" panose="05000000000000000000" pitchFamily="2" charset="2"/>
-              <a:buChar char="Ø"/>
+              <a:t>Add/Remove games</a:t>
+            </a:r>
+          </a:p>
+          <a:p>
+            <a:pPr lvl="1">
+              <a:buFont typeface="Courier New" panose="02070309020205020404" pitchFamily="49" charset="0"/>
+              <a:buChar char="o"/>
             </a:pPr>
             <a:r>
               <a:rPr lang="en-US" dirty="0"/>
-              <a:t>Positioning of key components. </a:t>
-            </a:r>
-          </a:p>
-          <a:p>
-            <a:pPr lvl="2">
-              <a:buFont typeface="Wingdings" panose="05000000000000000000" pitchFamily="2" charset="2"/>
-              <a:buChar char="Ø"/>
+              <a:t>Customizable ordering of games in menu:</a:t>
+            </a:r>
+          </a:p>
+          <a:p>
+            <a:pPr marL="1257300" lvl="2" indent="-342900">
+              <a:buFont typeface="+mj-lt"/>
+              <a:buAutoNum type="alphaLcPeriod"/>
             </a:pPr>
             <a:r>
               <a:rPr lang="en-US" dirty="0"/>
-              <a:t>Modulization of distinct components.</a:t>
+              <a:t>Alphabetically</a:t>
+            </a:r>
+          </a:p>
+          <a:p>
+            <a:pPr marL="1257300" lvl="2" indent="-342900">
+              <a:buFont typeface="+mj-lt"/>
+              <a:buAutoNum type="alphaLcPeriod"/>
+            </a:pPr>
+            <a:r>
+              <a:rPr lang="en-US" dirty="0"/>
+              <a:t>Or by the user’s preference. </a:t>
             </a:r>
           </a:p>
           <a:p>
             <a:pPr lvl="1">
-              <a:buFont typeface="Wingdings" panose="05000000000000000000" pitchFamily="2" charset="2"/>
-              <a:buChar char="Ø"/>
+              <a:buFont typeface="Courier New" panose="02070309020205020404" pitchFamily="49" charset="0"/>
+              <a:buChar char="o"/>
             </a:pPr>
             <a:r>
               <a:rPr lang="en-US" dirty="0"/>
-              <a:t>UI design</a:t>
-            </a:r>
-          </a:p>
-          <a:p>
-            <a:pPr lvl="2">
-              <a:buFont typeface="Wingdings" panose="05000000000000000000" pitchFamily="2" charset="2"/>
-              <a:buChar char="Ø"/>
+              <a:t>Additional games available through cloud</a:t>
+            </a:r>
+          </a:p>
+          <a:p>
+            <a:r>
+              <a:rPr lang="en-US" dirty="0"/>
+              <a:t>Cloud-based Leaderboard</a:t>
+            </a:r>
+          </a:p>
+          <a:p>
+            <a:pPr lvl="1">
+              <a:buFont typeface="Courier New" panose="02070309020205020404" pitchFamily="49" charset="0"/>
+              <a:buChar char="o"/>
             </a:pPr>
             <a:r>
               <a:rPr lang="en-US" dirty="0"/>
-              <a:t>Decluttered </a:t>
-            </a:r>
-          </a:p>
-          <a:p>
-            <a:pPr lvl="2">
-              <a:buFont typeface="Wingdings" panose="05000000000000000000" pitchFamily="2" charset="2"/>
-              <a:buChar char="Ø"/>
+              <a:t>Track country data (Google maps API?)</a:t>
+            </a:r>
+          </a:p>
+          <a:p>
+            <a:pPr lvl="1">
+              <a:buFont typeface="Courier New" panose="02070309020205020404" pitchFamily="49" charset="0"/>
+              <a:buChar char="o"/>
             </a:pPr>
             <a:r>
               <a:rPr lang="en-US" dirty="0"/>
-              <a:t>Avoiding colour confrontation</a:t>
-            </a:r>
-          </a:p>
-          <a:p>
-            <a:pPr lvl="2">
-              <a:buFont typeface="Wingdings" panose="05000000000000000000" pitchFamily="2" charset="2"/>
-              <a:buChar char="Ø"/>
-            </a:pPr>
-            <a:r>
-              <a:rPr lang="en-US" dirty="0"/>
-              <a:t>User friendly controls scheme</a:t>
-            </a:r>
-          </a:p>
-          <a:p>
-            <a:pPr lvl="1">
-              <a:buFont typeface="Wingdings" panose="05000000000000000000" pitchFamily="2" charset="2"/>
-              <a:buChar char="Ø"/>
-            </a:pPr>
-            <a:r>
-              <a:rPr lang="en-US" dirty="0"/>
-              <a:t>Graphics</a:t>
-            </a:r>
-          </a:p>
-          <a:p>
-            <a:pPr lvl="2">
-              <a:buFont typeface="Wingdings" panose="05000000000000000000" pitchFamily="2" charset="2"/>
-              <a:buChar char="Ø"/>
-            </a:pPr>
-            <a:r>
-              <a:rPr lang="en-US" dirty="0"/>
-              <a:t>Simple graphics</a:t>
-            </a:r>
-          </a:p>
-          <a:p>
-            <a:pPr lvl="1">
-              <a:buFont typeface="Wingdings" panose="05000000000000000000" pitchFamily="2" charset="2"/>
-              <a:buChar char="Ø"/>
-            </a:pPr>
-            <a:r>
-              <a:rPr lang="en-US" dirty="0"/>
-              <a:t>Sprite Generation </a:t>
-            </a:r>
+              <a:t>Single database stored on cloud (top 100)</a:t>
+            </a:r>
+          </a:p>
+          <a:p>
+            <a:pPr lvl="1"/>
+            <a:endParaRPr lang="en-US" dirty="0"/>
+          </a:p>
+          <a:p>
+            <a:pPr lvl="1"/>
+            <a:endParaRPr lang="en-US" dirty="0"/>
           </a:p>
         </p:txBody>
       </p:sp>
     </p:spTree>
     <p:extLst>
       <p:ext uri="{BB962C8B-B14F-4D97-AF65-F5344CB8AC3E}">
-        <p14:creationId xmlns:p14="http://schemas.microsoft.com/office/powerpoint/2010/main" val="4139807353"/>
+        <p14:creationId xmlns:p14="http://schemas.microsoft.com/office/powerpoint/2010/main" val="3421208875"/>
       </p:ext>
     </p:extLst>
   </p:cSld>
@@ -7269,7 +7440,7 @@
           <a:p>
             <a:r>
               <a:rPr lang="en-US" dirty="0"/>
-              <a:t>Resources required and where to find them.</a:t>
+              <a:t>INFT2050 Techniques used in this application.</a:t>
             </a:r>
             <a:endParaRPr lang="en-AU" dirty="0"/>
           </a:p>
@@ -7289,12 +7460,6 @@
         <p:txBody>
           <a:bodyPr/>
           <a:lstStyle/>
-          <a:p>
-            <a:r>
-              <a:rPr lang="en-US" dirty="0"/>
-              <a:t>Sprite Generation</a:t>
-            </a:r>
-          </a:p>
           <a:p>
             <a:pPr lvl="1">
               <a:buFont typeface="Wingdings" panose="05000000000000000000" pitchFamily="2" charset="2"/>
@@ -7302,9 +7467,195 @@
             </a:pPr>
             <a:r>
               <a:rPr lang="en-US" dirty="0"/>
-              <a:t>www.Spritmakingtutorial.com</a:t>
+              <a:t>Layout manager:</a:t>
+            </a:r>
+          </a:p>
+          <a:p>
+            <a:pPr lvl="2">
+              <a:buFont typeface="Wingdings" panose="05000000000000000000" pitchFamily="2" charset="2"/>
+              <a:buChar char="Ø"/>
+            </a:pPr>
+            <a:r>
+              <a:rPr lang="en-US" dirty="0"/>
+              <a:t>Positioning of key components. </a:t>
+            </a:r>
+          </a:p>
+          <a:p>
+            <a:pPr lvl="2">
+              <a:buFont typeface="Wingdings" panose="05000000000000000000" pitchFamily="2" charset="2"/>
+              <a:buChar char="Ø"/>
+            </a:pPr>
+            <a:r>
+              <a:rPr lang="en-US" dirty="0"/>
+              <a:t>Modulization of distinct components.</a:t>
+            </a:r>
+          </a:p>
+          <a:p>
+            <a:pPr lvl="1">
+              <a:buFont typeface="Wingdings" panose="05000000000000000000" pitchFamily="2" charset="2"/>
+              <a:buChar char="Ø"/>
+            </a:pPr>
+            <a:r>
+              <a:rPr lang="en-US" dirty="0"/>
+              <a:t>UI design</a:t>
+            </a:r>
+          </a:p>
+          <a:p>
+            <a:pPr lvl="2">
+              <a:buFont typeface="Wingdings" panose="05000000000000000000" pitchFamily="2" charset="2"/>
+              <a:buChar char="Ø"/>
+            </a:pPr>
+            <a:r>
+              <a:rPr lang="en-US" dirty="0"/>
+              <a:t>Decluttered </a:t>
+            </a:r>
+          </a:p>
+          <a:p>
+            <a:pPr lvl="2">
+              <a:buFont typeface="Wingdings" panose="05000000000000000000" pitchFamily="2" charset="2"/>
+              <a:buChar char="Ø"/>
+            </a:pPr>
+            <a:r>
+              <a:rPr lang="en-US" dirty="0"/>
+              <a:t>Avoiding colour confrontation</a:t>
+            </a:r>
+          </a:p>
+          <a:p>
+            <a:pPr lvl="2">
+              <a:buFont typeface="Wingdings" panose="05000000000000000000" pitchFamily="2" charset="2"/>
+              <a:buChar char="Ø"/>
+            </a:pPr>
+            <a:r>
+              <a:rPr lang="en-US" dirty="0"/>
+              <a:t>User friendly controls scheme</a:t>
+            </a:r>
+          </a:p>
+          <a:p>
+            <a:pPr lvl="1">
+              <a:buFont typeface="Wingdings" panose="05000000000000000000" pitchFamily="2" charset="2"/>
+              <a:buChar char="Ø"/>
+            </a:pPr>
+            <a:r>
+              <a:rPr lang="en-US" dirty="0"/>
+              <a:t>Graphics</a:t>
+            </a:r>
+          </a:p>
+          <a:p>
+            <a:pPr lvl="2">
+              <a:buFont typeface="Wingdings" panose="05000000000000000000" pitchFamily="2" charset="2"/>
+              <a:buChar char="Ø"/>
+            </a:pPr>
+            <a:r>
+              <a:rPr lang="en-US" dirty="0"/>
+              <a:t>Simple graphics</a:t>
+            </a:r>
+          </a:p>
+          <a:p>
+            <a:pPr lvl="1">
+              <a:buFont typeface="Wingdings" panose="05000000000000000000" pitchFamily="2" charset="2"/>
+              <a:buChar char="Ø"/>
+            </a:pPr>
+            <a:r>
+              <a:rPr lang="en-US" dirty="0"/>
+              <a:t>Sprite Generation </a:t>
+            </a:r>
+          </a:p>
+        </p:txBody>
+      </p:sp>
+    </p:spTree>
+    <p:extLst>
+      <p:ext uri="{BB962C8B-B14F-4D97-AF65-F5344CB8AC3E}">
+        <p14:creationId xmlns:p14="http://schemas.microsoft.com/office/powerpoint/2010/main" val="4139807353"/>
+      </p:ext>
+    </p:extLst>
+  </p:cSld>
+  <p:clrMapOvr>
+    <a:masterClrMapping/>
+  </p:clrMapOvr>
+</p:sld>
+</file>
+
+<file path=ppt/slides/slide17.xml><?xml version="1.0" encoding="utf-8"?>
+<p:sld xmlns:a="http://schemas.openxmlformats.org/drawingml/2006/main" xmlns:r="http://schemas.openxmlformats.org/officeDocument/2006/relationships" xmlns:p="http://schemas.openxmlformats.org/presentationml/2006/main">
+  <p:cSld>
+    <p:spTree>
+      <p:nvGrpSpPr>
+        <p:cNvPr id="1" name=""/>
+        <p:cNvGrpSpPr/>
+        <p:nvPr/>
+      </p:nvGrpSpPr>
+      <p:grpSpPr>
+        <a:xfrm>
+          <a:off x="0" y="0"/>
+          <a:ext cx="0" cy="0"/>
+          <a:chOff x="0" y="0"/>
+          <a:chExt cx="0" cy="0"/>
+        </a:xfrm>
+      </p:grpSpPr>
+      <p:sp>
+        <p:nvSpPr>
+          <p:cNvPr id="2" name="Title 1"/>
+          <p:cNvSpPr>
+            <a:spLocks noGrp="1"/>
+          </p:cNvSpPr>
+          <p:nvPr>
+            <p:ph type="title"/>
+          </p:nvPr>
+        </p:nvSpPr>
+        <p:spPr/>
+        <p:txBody>
+          <a:bodyPr/>
+          <a:lstStyle/>
+          <a:p>
+            <a:r>
+              <a:rPr lang="en-US" dirty="0"/>
+              <a:t>Resources required and where to find them.</a:t>
             </a:r>
             <a:endParaRPr lang="en-AU" dirty="0"/>
+          </a:p>
+        </p:txBody>
+      </p:sp>
+      <p:sp>
+        <p:nvSpPr>
+          <p:cNvPr id="3" name="Content Placeholder 2"/>
+          <p:cNvSpPr>
+            <a:spLocks noGrp="1"/>
+          </p:cNvSpPr>
+          <p:nvPr>
+            <p:ph idx="1"/>
+          </p:nvPr>
+        </p:nvSpPr>
+        <p:spPr/>
+        <p:txBody>
+          <a:bodyPr/>
+          <a:lstStyle/>
+          <a:p>
+            <a:r>
+              <a:rPr lang="en-US" dirty="0"/>
+              <a:t>Drag and Drop</a:t>
+            </a:r>
+          </a:p>
+          <a:p>
+            <a:pPr lvl="1">
+              <a:buFont typeface="Wingdings" panose="05000000000000000000" pitchFamily="2" charset="2"/>
+              <a:buChar char="Ø"/>
+            </a:pPr>
+            <a:r>
+              <a:rPr lang="en-US" sz="1400" dirty="0"/>
+              <a:t>https://developer.xamarin.com/samples/mac/DragAndDropExample/</a:t>
+            </a:r>
+            <a:endParaRPr lang="en-US" sz="1400" dirty="0"/>
+          </a:p>
+          <a:p>
+            <a:pPr lvl="1">
+              <a:buFont typeface="Wingdings" panose="05000000000000000000" pitchFamily="2" charset="2"/>
+              <a:buChar char="Ø"/>
+            </a:pPr>
+            <a:r>
+              <a:rPr lang="en-AU" sz="1400" dirty="0"/>
+              <a:t>https://blog.xamarin.com/android-tricks-supporting-drag-and-drop-in-an-app/</a:t>
+            </a:r>
+            <a:endParaRPr lang="en-AU" sz="1400" dirty="0"/>
           </a:p>
         </p:txBody>
       </p:sp>
@@ -7321,7 +7672,7 @@
 </p:sld>
 </file>
 
-<file path=ppt/slides/slide17.xml><?xml version="1.0" encoding="utf-8"?>
+<file path=ppt/slides/slide18.xml><?xml version="1.0" encoding="utf-8"?>
 <p:sld xmlns:a="http://schemas.openxmlformats.org/drawingml/2006/main" xmlns:r="http://schemas.openxmlformats.org/officeDocument/2006/relationships" xmlns:p="http://schemas.openxmlformats.org/presentationml/2006/main">
   <p:cSld>
     <p:spTree>
@@ -8288,7 +8639,7 @@
         </p:nvSpPr>
         <p:spPr>
           <a:xfrm>
-            <a:off x="5627070" y="4370300"/>
+            <a:off x="5837741" y="5190571"/>
             <a:ext cx="4511842" cy="406126"/>
           </a:xfrm>
         </p:spPr>
@@ -8305,7 +8656,7 @@
       </p:sp>
       <p:pic>
         <p:nvPicPr>
-          <p:cNvPr id="11" name="Content Placeholder 10"/>
+          <p:cNvPr id="8" name="Content Placeholder 7"/>
           <p:cNvPicPr>
             <a:picLocks noGrp="1" noChangeAspect="1"/>
           </p:cNvPicPr>
@@ -8321,8 +8672,8 @@
         </p:blipFill>
         <p:spPr>
           <a:xfrm>
-            <a:off x="5627070" y="2107131"/>
-            <a:ext cx="4354328" cy="2368617"/>
+            <a:off x="7033288" y="1958788"/>
+            <a:ext cx="1836290" cy="3264516"/>
           </a:xfrm>
         </p:spPr>
       </p:pic>

</xml_diff>

<commit_message>
Added resources and links
</commit_message>
<xml_diff>
--- a/SCaRArcade.pptx
+++ b/SCaRArcade.pptx
@@ -7627,13 +7627,16 @@
         </p:nvSpPr>
         <p:spPr/>
         <p:txBody>
-          <a:bodyPr/>
-          <a:lstStyle/>
-          <a:p>
-            <a:r>
-              <a:rPr lang="en-US" dirty="0"/>
-              <a:t>Drag and Drop</a:t>
-            </a:r>
+          <a:bodyPr>
+            <a:normAutofit fontScale="85000" lnSpcReduction="10000"/>
+          </a:bodyPr>
+          <a:lstStyle/>
+          <a:p>
+            <a:r>
+              <a:rPr lang="en-US" dirty="0"/>
+              <a:t>Menus</a:t>
+            </a:r>
+            <a:endParaRPr lang="en-AU" sz="1400" dirty="0"/>
           </a:p>
           <a:p>
             <a:pPr lvl="1">
@@ -7641,10 +7644,9 @@
               <a:buChar char="Ø"/>
             </a:pPr>
             <a:r>
-              <a:rPr lang="en-US" sz="1400" dirty="0"/>
-              <a:t>https://developer.xamarin.com/samples/mac/DragAndDropExample/</a:t>
-            </a:r>
-            <a:endParaRPr lang="en-US" sz="1400" dirty="0"/>
+              <a:rPr lang="en-AU" sz="1400" dirty="0"/>
+              <a:t>https://developer.xamarin.com/guides/android/user_interface/working_with_listviews_and_adapters/part_3_-_customizing_a_listview's_appearance/</a:t>
+            </a:r>
           </a:p>
           <a:p>
             <a:pPr lvl="1">
@@ -7653,8 +7655,90 @@
             </a:pPr>
             <a:r>
               <a:rPr lang="en-AU" sz="1400" dirty="0"/>
+              <a:t>https://developer.xamarin.com/guides/android/user_interface/designer_overview/designer_walkthrough/</a:t>
+            </a:r>
+          </a:p>
+          <a:p>
+            <a:r>
+              <a:rPr lang="en-US" dirty="0"/>
+              <a:t>Sprite Clipping</a:t>
+            </a:r>
+          </a:p>
+          <a:p>
+            <a:pPr lvl="1">
+              <a:buFont typeface="Wingdings" panose="05000000000000000000" pitchFamily="2" charset="2"/>
+              <a:buChar char="Ø"/>
+            </a:pPr>
+            <a:r>
+              <a:rPr lang="en-US" sz="1400" dirty="0"/>
+              <a:t>https://uonline.newcastle.edu.au/bbcswebdav/pid-3195529-dt-content-rid-10647750_1/xid-10647750_1</a:t>
+            </a:r>
+          </a:p>
+          <a:p>
+            <a:pPr lvl="1">
+              <a:buFont typeface="Wingdings" panose="05000000000000000000" pitchFamily="2" charset="2"/>
+              <a:buChar char="Ø"/>
+            </a:pPr>
+            <a:r>
+              <a:rPr lang="en-US" sz="1400" dirty="0"/>
+              <a:t>http://gamecodeschool.com/android/coding-android-sprite-sheet-animations/</a:t>
+            </a:r>
+            <a:endParaRPr lang="en-US" sz="1400" dirty="0"/>
+          </a:p>
+          <a:p>
+            <a:r>
+              <a:rPr lang="en-US" dirty="0"/>
+              <a:t>Cloud</a:t>
+            </a:r>
+          </a:p>
+          <a:p>
+            <a:pPr lvl="1">
+              <a:buFont typeface="Wingdings" panose="05000000000000000000" pitchFamily="2" charset="2"/>
+              <a:buChar char="Ø"/>
+            </a:pPr>
+            <a:r>
+              <a:rPr lang="en-US" sz="1500" dirty="0"/>
+              <a:t>(Week 7-11) https://uonline.newcastle.edu.au/webapps/blackboard/content/listContent.jsp?course_id=_1387923_1&amp;content_id=_3110559_1&amp;mode=reset</a:t>
+            </a:r>
+            <a:endParaRPr lang="en-US" dirty="0"/>
+          </a:p>
+          <a:p>
+            <a:r>
+              <a:rPr lang="en-US" dirty="0"/>
+              <a:t>Drag and Drop</a:t>
+            </a:r>
+          </a:p>
+          <a:p>
+            <a:pPr lvl="1">
+              <a:buFont typeface="Wingdings" panose="05000000000000000000" pitchFamily="2" charset="2"/>
+              <a:buChar char="Ø"/>
+            </a:pPr>
+            <a:r>
+              <a:rPr lang="en-US" sz="1400" dirty="0"/>
+              <a:t>https://developer.xamarin.com/samples/mac/DragAndDropExample/</a:t>
+            </a:r>
+          </a:p>
+          <a:p>
+            <a:pPr lvl="1">
+              <a:buFont typeface="Wingdings" panose="05000000000000000000" pitchFamily="2" charset="2"/>
+              <a:buChar char="Ø"/>
+            </a:pPr>
+            <a:r>
+              <a:rPr lang="en-AU" sz="1400" dirty="0"/>
               <a:t>https://blog.xamarin.com/android-tricks-supporting-drag-and-drop-in-an-app/</a:t>
             </a:r>
+          </a:p>
+          <a:p>
+            <a:pPr marL="457200" lvl="1" indent="0">
+              <a:buNone/>
+            </a:pPr>
+            <a:endParaRPr lang="en-AU" sz="1400" dirty="0"/>
+          </a:p>
+          <a:p>
+            <a:pPr lvl="1">
+              <a:buFont typeface="Wingdings" panose="05000000000000000000" pitchFamily="2" charset="2"/>
+              <a:buChar char="Ø"/>
+            </a:pPr>
             <a:endParaRPr lang="en-AU" sz="1400" dirty="0"/>
           </a:p>
         </p:txBody>

</xml_diff>

<commit_message>
part of speach (pp), gamemenu passes on difficulty
</commit_message>
<xml_diff>
--- a/SCaRArcade.pptx
+++ b/SCaRArcade.pptx
@@ -4,6 +4,9 @@
   <p:sldMasterIdLst>
     <p:sldMasterId id="2147483669" r:id="rId1"/>
   </p:sldMasterIdLst>
+  <p:notesMasterIdLst>
+    <p:notesMasterId r:id="rId20"/>
+  </p:notesMasterIdLst>
   <p:sldIdLst>
     <p:sldId id="256" r:id="rId2"/>
     <p:sldId id="260" r:id="rId3"/>
@@ -129,6 +132,709 @@
 </p:presentation>
 </file>
 
+<file path=ppt/notesMasters/notesMaster1.xml><?xml version="1.0" encoding="utf-8"?>
+<p:notesMaster xmlns:a="http://schemas.openxmlformats.org/drawingml/2006/main" xmlns:r="http://schemas.openxmlformats.org/officeDocument/2006/relationships" xmlns:p="http://schemas.openxmlformats.org/presentationml/2006/main">
+  <p:cSld>
+    <p:bg>
+      <p:bgRef idx="1001">
+        <a:schemeClr val="bg1"/>
+      </p:bgRef>
+    </p:bg>
+    <p:spTree>
+      <p:nvGrpSpPr>
+        <p:cNvPr id="1" name=""/>
+        <p:cNvGrpSpPr/>
+        <p:nvPr/>
+      </p:nvGrpSpPr>
+      <p:grpSpPr>
+        <a:xfrm>
+          <a:off x="0" y="0"/>
+          <a:ext cx="0" cy="0"/>
+          <a:chOff x="0" y="0"/>
+          <a:chExt cx="0" cy="0"/>
+        </a:xfrm>
+      </p:grpSpPr>
+      <p:sp>
+        <p:nvSpPr>
+          <p:cNvPr id="2" name="Header Placeholder 1"/>
+          <p:cNvSpPr>
+            <a:spLocks noGrp="1"/>
+          </p:cNvSpPr>
+          <p:nvPr>
+            <p:ph type="hdr" sz="quarter"/>
+          </p:nvPr>
+        </p:nvSpPr>
+        <p:spPr>
+          <a:xfrm>
+            <a:off x="0" y="0"/>
+            <a:ext cx="2971800" cy="458788"/>
+          </a:xfrm>
+          <a:prstGeom prst="rect">
+            <a:avLst/>
+          </a:prstGeom>
+        </p:spPr>
+        <p:txBody>
+          <a:bodyPr vert="horz" lIns="91440" tIns="45720" rIns="91440" bIns="45720" rtlCol="0"/>
+          <a:lstStyle>
+            <a:lvl1pPr algn="l">
+              <a:defRPr sz="1200"/>
+            </a:lvl1pPr>
+          </a:lstStyle>
+          <a:p>
+            <a:endParaRPr lang="en-AU"/>
+          </a:p>
+        </p:txBody>
+      </p:sp>
+      <p:sp>
+        <p:nvSpPr>
+          <p:cNvPr id="3" name="Date Placeholder 2"/>
+          <p:cNvSpPr>
+            <a:spLocks noGrp="1"/>
+          </p:cNvSpPr>
+          <p:nvPr>
+            <p:ph type="dt" idx="1"/>
+          </p:nvPr>
+        </p:nvSpPr>
+        <p:spPr>
+          <a:xfrm>
+            <a:off x="3884613" y="0"/>
+            <a:ext cx="2971800" cy="458788"/>
+          </a:xfrm>
+          <a:prstGeom prst="rect">
+            <a:avLst/>
+          </a:prstGeom>
+        </p:spPr>
+        <p:txBody>
+          <a:bodyPr vert="horz" lIns="91440" tIns="45720" rIns="91440" bIns="45720" rtlCol="0"/>
+          <a:lstStyle>
+            <a:lvl1pPr algn="r">
+              <a:defRPr sz="1200"/>
+            </a:lvl1pPr>
+          </a:lstStyle>
+          <a:p>
+            <a:fld id="{A217C4EB-741C-46AC-ACC7-C6BD45D1E9A3}" type="datetimeFigureOut">
+              <a:rPr lang="en-AU" smtClean="0"/>
+              <a:t>1/04/2017</a:t>
+            </a:fld>
+            <a:endParaRPr lang="en-AU"/>
+          </a:p>
+        </p:txBody>
+      </p:sp>
+      <p:sp>
+        <p:nvSpPr>
+          <p:cNvPr id="4" name="Slide Image Placeholder 3"/>
+          <p:cNvSpPr>
+            <a:spLocks noGrp="1" noRot="1" noChangeAspect="1"/>
+          </p:cNvSpPr>
+          <p:nvPr>
+            <p:ph type="sldImg" idx="2"/>
+          </p:nvPr>
+        </p:nvSpPr>
+        <p:spPr>
+          <a:xfrm>
+            <a:off x="685800" y="1143000"/>
+            <a:ext cx="5486400" cy="3086100"/>
+          </a:xfrm>
+          <a:prstGeom prst="rect">
+            <a:avLst/>
+          </a:prstGeom>
+          <a:noFill/>
+          <a:ln w="12700">
+            <a:solidFill>
+              <a:prstClr val="black"/>
+            </a:solidFill>
+          </a:ln>
+        </p:spPr>
+        <p:txBody>
+          <a:bodyPr vert="horz" lIns="91440" tIns="45720" rIns="91440" bIns="45720" rtlCol="0" anchor="ctr"/>
+          <a:lstStyle/>
+          <a:p>
+            <a:endParaRPr lang="en-AU"/>
+          </a:p>
+        </p:txBody>
+      </p:sp>
+      <p:sp>
+        <p:nvSpPr>
+          <p:cNvPr id="5" name="Notes Placeholder 4"/>
+          <p:cNvSpPr>
+            <a:spLocks noGrp="1"/>
+          </p:cNvSpPr>
+          <p:nvPr>
+            <p:ph type="body" sz="quarter" idx="3"/>
+          </p:nvPr>
+        </p:nvSpPr>
+        <p:spPr>
+          <a:xfrm>
+            <a:off x="685800" y="4400550"/>
+            <a:ext cx="5486400" cy="3600450"/>
+          </a:xfrm>
+          <a:prstGeom prst="rect">
+            <a:avLst/>
+          </a:prstGeom>
+        </p:spPr>
+        <p:txBody>
+          <a:bodyPr vert="horz" lIns="91440" tIns="45720" rIns="91440" bIns="45720" rtlCol="0"/>
+          <a:lstStyle/>
+          <a:p>
+            <a:pPr lvl="0"/>
+            <a:r>
+              <a:rPr lang="en-US"/>
+              <a:t>Edit Master text styles</a:t>
+            </a:r>
+          </a:p>
+          <a:p>
+            <a:pPr lvl="1"/>
+            <a:r>
+              <a:rPr lang="en-US"/>
+              <a:t>Second level</a:t>
+            </a:r>
+          </a:p>
+          <a:p>
+            <a:pPr lvl="2"/>
+            <a:r>
+              <a:rPr lang="en-US"/>
+              <a:t>Third level</a:t>
+            </a:r>
+          </a:p>
+          <a:p>
+            <a:pPr lvl="3"/>
+            <a:r>
+              <a:rPr lang="en-US"/>
+              <a:t>Fourth level</a:t>
+            </a:r>
+          </a:p>
+          <a:p>
+            <a:pPr lvl="4"/>
+            <a:r>
+              <a:rPr lang="en-US"/>
+              <a:t>Fifth level</a:t>
+            </a:r>
+            <a:endParaRPr lang="en-AU"/>
+          </a:p>
+        </p:txBody>
+      </p:sp>
+      <p:sp>
+        <p:nvSpPr>
+          <p:cNvPr id="6" name="Footer Placeholder 5"/>
+          <p:cNvSpPr>
+            <a:spLocks noGrp="1"/>
+          </p:cNvSpPr>
+          <p:nvPr>
+            <p:ph type="ftr" sz="quarter" idx="4"/>
+          </p:nvPr>
+        </p:nvSpPr>
+        <p:spPr>
+          <a:xfrm>
+            <a:off x="0" y="8685213"/>
+            <a:ext cx="2971800" cy="458787"/>
+          </a:xfrm>
+          <a:prstGeom prst="rect">
+            <a:avLst/>
+          </a:prstGeom>
+        </p:spPr>
+        <p:txBody>
+          <a:bodyPr vert="horz" lIns="91440" tIns="45720" rIns="91440" bIns="45720" rtlCol="0" anchor="b"/>
+          <a:lstStyle>
+            <a:lvl1pPr algn="l">
+              <a:defRPr sz="1200"/>
+            </a:lvl1pPr>
+          </a:lstStyle>
+          <a:p>
+            <a:endParaRPr lang="en-AU"/>
+          </a:p>
+        </p:txBody>
+      </p:sp>
+      <p:sp>
+        <p:nvSpPr>
+          <p:cNvPr id="7" name="Slide Number Placeholder 6"/>
+          <p:cNvSpPr>
+            <a:spLocks noGrp="1"/>
+          </p:cNvSpPr>
+          <p:nvPr>
+            <p:ph type="sldNum" sz="quarter" idx="5"/>
+          </p:nvPr>
+        </p:nvSpPr>
+        <p:spPr>
+          <a:xfrm>
+            <a:off x="3884613" y="8685213"/>
+            <a:ext cx="2971800" cy="458787"/>
+          </a:xfrm>
+          <a:prstGeom prst="rect">
+            <a:avLst/>
+          </a:prstGeom>
+        </p:spPr>
+        <p:txBody>
+          <a:bodyPr vert="horz" lIns="91440" tIns="45720" rIns="91440" bIns="45720" rtlCol="0" anchor="b"/>
+          <a:lstStyle>
+            <a:lvl1pPr algn="r">
+              <a:defRPr sz="1200"/>
+            </a:lvl1pPr>
+          </a:lstStyle>
+          <a:p>
+            <a:fld id="{69EA1A26-A095-45B7-AC9F-041832E92BB7}" type="slidenum">
+              <a:rPr lang="en-AU" smtClean="0"/>
+              <a:t>‹#›</a:t>
+            </a:fld>
+            <a:endParaRPr lang="en-AU"/>
+          </a:p>
+        </p:txBody>
+      </p:sp>
+    </p:spTree>
+    <p:extLst>
+      <p:ext uri="{BB962C8B-B14F-4D97-AF65-F5344CB8AC3E}">
+        <p14:creationId xmlns:p14="http://schemas.microsoft.com/office/powerpoint/2010/main" val="3041285508"/>
+      </p:ext>
+    </p:extLst>
+  </p:cSld>
+  <p:clrMap bg1="lt1" tx1="dk1" bg2="lt2" tx2="dk2" accent1="accent1" accent2="accent2" accent3="accent3" accent4="accent4" accent5="accent5" accent6="accent6" hlink="hlink" folHlink="folHlink"/>
+  <p:notesStyle>
+    <a:lvl1pPr marL="0" algn="l" defTabSz="914400" rtl="0" eaLnBrk="1" latinLnBrk="0" hangingPunct="1">
+      <a:defRPr sz="1200" kern="1200">
+        <a:solidFill>
+          <a:schemeClr val="tx1"/>
+        </a:solidFill>
+        <a:latin typeface="+mn-lt"/>
+        <a:ea typeface="+mn-ea"/>
+        <a:cs typeface="+mn-cs"/>
+      </a:defRPr>
+    </a:lvl1pPr>
+    <a:lvl2pPr marL="457200" algn="l" defTabSz="914400" rtl="0" eaLnBrk="1" latinLnBrk="0" hangingPunct="1">
+      <a:defRPr sz="1200" kern="1200">
+        <a:solidFill>
+          <a:schemeClr val="tx1"/>
+        </a:solidFill>
+        <a:latin typeface="+mn-lt"/>
+        <a:ea typeface="+mn-ea"/>
+        <a:cs typeface="+mn-cs"/>
+      </a:defRPr>
+    </a:lvl2pPr>
+    <a:lvl3pPr marL="914400" algn="l" defTabSz="914400" rtl="0" eaLnBrk="1" latinLnBrk="0" hangingPunct="1">
+      <a:defRPr sz="1200" kern="1200">
+        <a:solidFill>
+          <a:schemeClr val="tx1"/>
+        </a:solidFill>
+        <a:latin typeface="+mn-lt"/>
+        <a:ea typeface="+mn-ea"/>
+        <a:cs typeface="+mn-cs"/>
+      </a:defRPr>
+    </a:lvl3pPr>
+    <a:lvl4pPr marL="1371600" algn="l" defTabSz="914400" rtl="0" eaLnBrk="1" latinLnBrk="0" hangingPunct="1">
+      <a:defRPr sz="1200" kern="1200">
+        <a:solidFill>
+          <a:schemeClr val="tx1"/>
+        </a:solidFill>
+        <a:latin typeface="+mn-lt"/>
+        <a:ea typeface="+mn-ea"/>
+        <a:cs typeface="+mn-cs"/>
+      </a:defRPr>
+    </a:lvl4pPr>
+    <a:lvl5pPr marL="1828800" algn="l" defTabSz="914400" rtl="0" eaLnBrk="1" latinLnBrk="0" hangingPunct="1">
+      <a:defRPr sz="1200" kern="1200">
+        <a:solidFill>
+          <a:schemeClr val="tx1"/>
+        </a:solidFill>
+        <a:latin typeface="+mn-lt"/>
+        <a:ea typeface="+mn-ea"/>
+        <a:cs typeface="+mn-cs"/>
+      </a:defRPr>
+    </a:lvl5pPr>
+    <a:lvl6pPr marL="2286000" algn="l" defTabSz="914400" rtl="0" eaLnBrk="1" latinLnBrk="0" hangingPunct="1">
+      <a:defRPr sz="1200" kern="1200">
+        <a:solidFill>
+          <a:schemeClr val="tx1"/>
+        </a:solidFill>
+        <a:latin typeface="+mn-lt"/>
+        <a:ea typeface="+mn-ea"/>
+        <a:cs typeface="+mn-cs"/>
+      </a:defRPr>
+    </a:lvl6pPr>
+    <a:lvl7pPr marL="2743200" algn="l" defTabSz="914400" rtl="0" eaLnBrk="1" latinLnBrk="0" hangingPunct="1">
+      <a:defRPr sz="1200" kern="1200">
+        <a:solidFill>
+          <a:schemeClr val="tx1"/>
+        </a:solidFill>
+        <a:latin typeface="+mn-lt"/>
+        <a:ea typeface="+mn-ea"/>
+        <a:cs typeface="+mn-cs"/>
+      </a:defRPr>
+    </a:lvl7pPr>
+    <a:lvl8pPr marL="3200400" algn="l" defTabSz="914400" rtl="0" eaLnBrk="1" latinLnBrk="0" hangingPunct="1">
+      <a:defRPr sz="1200" kern="1200">
+        <a:solidFill>
+          <a:schemeClr val="tx1"/>
+        </a:solidFill>
+        <a:latin typeface="+mn-lt"/>
+        <a:ea typeface="+mn-ea"/>
+        <a:cs typeface="+mn-cs"/>
+      </a:defRPr>
+    </a:lvl8pPr>
+    <a:lvl9pPr marL="3657600" algn="l" defTabSz="914400" rtl="0" eaLnBrk="1" latinLnBrk="0" hangingPunct="1">
+      <a:defRPr sz="1200" kern="1200">
+        <a:solidFill>
+          <a:schemeClr val="tx1"/>
+        </a:solidFill>
+        <a:latin typeface="+mn-lt"/>
+        <a:ea typeface="+mn-ea"/>
+        <a:cs typeface="+mn-cs"/>
+      </a:defRPr>
+    </a:lvl9pPr>
+  </p:notesStyle>
+</p:notesMaster>
+</file>
+
+<file path=ppt/notesSlides/notesSlide1.xml><?xml version="1.0" encoding="utf-8"?>
+<p:notes xmlns:a="http://schemas.openxmlformats.org/drawingml/2006/main" xmlns:r="http://schemas.openxmlformats.org/officeDocument/2006/relationships" xmlns:p="http://schemas.openxmlformats.org/presentationml/2006/main">
+  <p:cSld>
+    <p:spTree>
+      <p:nvGrpSpPr>
+        <p:cNvPr id="1" name=""/>
+        <p:cNvGrpSpPr/>
+        <p:nvPr/>
+      </p:nvGrpSpPr>
+      <p:grpSpPr>
+        <a:xfrm>
+          <a:off x="0" y="0"/>
+          <a:ext cx="0" cy="0"/>
+          <a:chOff x="0" y="0"/>
+          <a:chExt cx="0" cy="0"/>
+        </a:xfrm>
+      </p:grpSpPr>
+      <p:sp>
+        <p:nvSpPr>
+          <p:cNvPr id="2" name="Slide Image Placeholder 1"/>
+          <p:cNvSpPr>
+            <a:spLocks noGrp="1" noRot="1" noChangeAspect="1"/>
+          </p:cNvSpPr>
+          <p:nvPr>
+            <p:ph type="sldImg"/>
+          </p:nvPr>
+        </p:nvSpPr>
+        <p:spPr/>
+      </p:sp>
+      <p:sp>
+        <p:nvSpPr>
+          <p:cNvPr id="3" name="Notes Placeholder 2"/>
+          <p:cNvSpPr>
+            <a:spLocks noGrp="1"/>
+          </p:cNvSpPr>
+          <p:nvPr>
+            <p:ph type="body" idx="1"/>
+          </p:nvPr>
+        </p:nvSpPr>
+        <p:spPr/>
+        <p:txBody>
+          <a:bodyPr/>
+          <a:lstStyle/>
+          <a:p>
+            <a:r>
+              <a:rPr lang="en-AU" dirty="0"/>
+              <a:t>Greetings gentlemen, I am Martin and today I’ll be introducing our application Scar arcade, while also running through some of the components as well  as some of the issues anticipated and solutions to those issues. Ryan will then talk about a game in the application and its issues and solutions. Then Saxon will do the same and I’ll come back and wrap up the talk.</a:t>
+            </a:r>
+          </a:p>
+        </p:txBody>
+      </p:sp>
+      <p:sp>
+        <p:nvSpPr>
+          <p:cNvPr id="4" name="Slide Number Placeholder 3"/>
+          <p:cNvSpPr>
+            <a:spLocks noGrp="1"/>
+          </p:cNvSpPr>
+          <p:nvPr>
+            <p:ph type="sldNum" sz="quarter" idx="10"/>
+          </p:nvPr>
+        </p:nvSpPr>
+        <p:spPr/>
+        <p:txBody>
+          <a:bodyPr/>
+          <a:lstStyle/>
+          <a:p>
+            <a:fld id="{69EA1A26-A095-45B7-AC9F-041832E92BB7}" type="slidenum">
+              <a:rPr lang="en-AU" smtClean="0"/>
+              <a:t>1</a:t>
+            </a:fld>
+            <a:endParaRPr lang="en-AU"/>
+          </a:p>
+        </p:txBody>
+      </p:sp>
+    </p:spTree>
+    <p:extLst>
+      <p:ext uri="{BB962C8B-B14F-4D97-AF65-F5344CB8AC3E}">
+        <p14:creationId xmlns:p14="http://schemas.microsoft.com/office/powerpoint/2010/main" val="1096064531"/>
+      </p:ext>
+    </p:extLst>
+  </p:cSld>
+  <p:clrMapOvr>
+    <a:masterClrMapping/>
+  </p:clrMapOvr>
+</p:notes>
+</file>
+
+<file path=ppt/notesSlides/notesSlide2.xml><?xml version="1.0" encoding="utf-8"?>
+<p:notes xmlns:a="http://schemas.openxmlformats.org/drawingml/2006/main" xmlns:r="http://schemas.openxmlformats.org/officeDocument/2006/relationships" xmlns:p="http://schemas.openxmlformats.org/presentationml/2006/main">
+  <p:cSld>
+    <p:spTree>
+      <p:nvGrpSpPr>
+        <p:cNvPr id="1" name=""/>
+        <p:cNvGrpSpPr/>
+        <p:nvPr/>
+      </p:nvGrpSpPr>
+      <p:grpSpPr>
+        <a:xfrm>
+          <a:off x="0" y="0"/>
+          <a:ext cx="0" cy="0"/>
+          <a:chOff x="0" y="0"/>
+          <a:chExt cx="0" cy="0"/>
+        </a:xfrm>
+      </p:grpSpPr>
+      <p:sp>
+        <p:nvSpPr>
+          <p:cNvPr id="2" name="Slide Image Placeholder 1"/>
+          <p:cNvSpPr>
+            <a:spLocks noGrp="1" noRot="1" noChangeAspect="1"/>
+          </p:cNvSpPr>
+          <p:nvPr>
+            <p:ph type="sldImg"/>
+          </p:nvPr>
+        </p:nvSpPr>
+        <p:spPr/>
+      </p:sp>
+      <p:sp>
+        <p:nvSpPr>
+          <p:cNvPr id="3" name="Notes Placeholder 2"/>
+          <p:cNvSpPr>
+            <a:spLocks noGrp="1"/>
+          </p:cNvSpPr>
+          <p:nvPr>
+            <p:ph type="body" idx="1"/>
+          </p:nvPr>
+        </p:nvSpPr>
+        <p:spPr/>
+        <p:txBody>
+          <a:bodyPr/>
+          <a:lstStyle/>
+          <a:p>
+            <a:r>
+              <a:rPr lang="en-AU" dirty="0"/>
+              <a:t>Scar arcade is a Game manager designed for Android with the ability to manage and run games and keep track of personal high scores.</a:t>
+            </a:r>
+          </a:p>
+        </p:txBody>
+      </p:sp>
+      <p:sp>
+        <p:nvSpPr>
+          <p:cNvPr id="4" name="Slide Number Placeholder 3"/>
+          <p:cNvSpPr>
+            <a:spLocks noGrp="1"/>
+          </p:cNvSpPr>
+          <p:nvPr>
+            <p:ph type="sldNum" sz="quarter" idx="10"/>
+          </p:nvPr>
+        </p:nvSpPr>
+        <p:spPr/>
+        <p:txBody>
+          <a:bodyPr/>
+          <a:lstStyle/>
+          <a:p>
+            <a:fld id="{69EA1A26-A095-45B7-AC9F-041832E92BB7}" type="slidenum">
+              <a:rPr lang="en-AU" smtClean="0"/>
+              <a:t>2</a:t>
+            </a:fld>
+            <a:endParaRPr lang="en-AU"/>
+          </a:p>
+        </p:txBody>
+      </p:sp>
+    </p:spTree>
+    <p:extLst>
+      <p:ext uri="{BB962C8B-B14F-4D97-AF65-F5344CB8AC3E}">
+        <p14:creationId xmlns:p14="http://schemas.microsoft.com/office/powerpoint/2010/main" val="1987178217"/>
+      </p:ext>
+    </p:extLst>
+  </p:cSld>
+  <p:clrMapOvr>
+    <a:masterClrMapping/>
+  </p:clrMapOvr>
+</p:notes>
+</file>
+
+<file path=ppt/notesSlides/notesSlide3.xml><?xml version="1.0" encoding="utf-8"?>
+<p:notes xmlns:a="http://schemas.openxmlformats.org/drawingml/2006/main" xmlns:r="http://schemas.openxmlformats.org/officeDocument/2006/relationships" xmlns:p="http://schemas.openxmlformats.org/presentationml/2006/main">
+  <p:cSld>
+    <p:spTree>
+      <p:nvGrpSpPr>
+        <p:cNvPr id="1" name=""/>
+        <p:cNvGrpSpPr/>
+        <p:nvPr/>
+      </p:nvGrpSpPr>
+      <p:grpSpPr>
+        <a:xfrm>
+          <a:off x="0" y="0"/>
+          <a:ext cx="0" cy="0"/>
+          <a:chOff x="0" y="0"/>
+          <a:chExt cx="0" cy="0"/>
+        </a:xfrm>
+      </p:grpSpPr>
+      <p:sp>
+        <p:nvSpPr>
+          <p:cNvPr id="2" name="Slide Image Placeholder 1"/>
+          <p:cNvSpPr>
+            <a:spLocks noGrp="1" noRot="1" noChangeAspect="1"/>
+          </p:cNvSpPr>
+          <p:nvPr>
+            <p:ph type="sldImg"/>
+          </p:nvPr>
+        </p:nvSpPr>
+        <p:spPr/>
+      </p:sp>
+      <p:sp>
+        <p:nvSpPr>
+          <p:cNvPr id="3" name="Notes Placeholder 2"/>
+          <p:cNvSpPr>
+            <a:spLocks noGrp="1"/>
+          </p:cNvSpPr>
+          <p:nvPr>
+            <p:ph type="body" idx="1"/>
+          </p:nvPr>
+        </p:nvSpPr>
+        <p:spPr/>
+        <p:txBody>
+          <a:bodyPr/>
+          <a:lstStyle/>
+          <a:p>
+            <a:r>
+              <a:rPr lang="en-AU" dirty="0"/>
+              <a:t>Why did we choose this application, well games are a great way to utilize the skills taught in INFT2050, but it would be silly to try and implement all of the skills into just one game. When you can focus skills, like coding sensors for example with a game dedicated to using a sensor for an action. Grouping these games together in a manager seemed like the most logical step, this also gives us the ability to implement more skills like cloud services in </a:t>
+            </a:r>
+            <a:r>
+              <a:rPr lang="en-AU"/>
+              <a:t>leaderboards.</a:t>
+            </a:r>
+            <a:endParaRPr lang="en-AU" dirty="0"/>
+          </a:p>
+        </p:txBody>
+      </p:sp>
+      <p:sp>
+        <p:nvSpPr>
+          <p:cNvPr id="4" name="Slide Number Placeholder 3"/>
+          <p:cNvSpPr>
+            <a:spLocks noGrp="1"/>
+          </p:cNvSpPr>
+          <p:nvPr>
+            <p:ph type="sldNum" sz="quarter" idx="10"/>
+          </p:nvPr>
+        </p:nvSpPr>
+        <p:spPr/>
+        <p:txBody>
+          <a:bodyPr/>
+          <a:lstStyle/>
+          <a:p>
+            <a:fld id="{69EA1A26-A095-45B7-AC9F-041832E92BB7}" type="slidenum">
+              <a:rPr lang="en-AU" smtClean="0"/>
+              <a:t>3</a:t>
+            </a:fld>
+            <a:endParaRPr lang="en-AU"/>
+          </a:p>
+        </p:txBody>
+      </p:sp>
+    </p:spTree>
+    <p:extLst>
+      <p:ext uri="{BB962C8B-B14F-4D97-AF65-F5344CB8AC3E}">
+        <p14:creationId xmlns:p14="http://schemas.microsoft.com/office/powerpoint/2010/main" val="3956974806"/>
+      </p:ext>
+    </p:extLst>
+  </p:cSld>
+  <p:clrMapOvr>
+    <a:masterClrMapping/>
+  </p:clrMapOvr>
+</p:notes>
+</file>
+
+<file path=ppt/notesSlides/notesSlide4.xml><?xml version="1.0" encoding="utf-8"?>
+<p:notes xmlns:a="http://schemas.openxmlformats.org/drawingml/2006/main" xmlns:r="http://schemas.openxmlformats.org/officeDocument/2006/relationships" xmlns:p="http://schemas.openxmlformats.org/presentationml/2006/main">
+  <p:cSld>
+    <p:spTree>
+      <p:nvGrpSpPr>
+        <p:cNvPr id="1" name=""/>
+        <p:cNvGrpSpPr/>
+        <p:nvPr/>
+      </p:nvGrpSpPr>
+      <p:grpSpPr>
+        <a:xfrm>
+          <a:off x="0" y="0"/>
+          <a:ext cx="0" cy="0"/>
+          <a:chOff x="0" y="0"/>
+          <a:chExt cx="0" cy="0"/>
+        </a:xfrm>
+      </p:grpSpPr>
+      <p:sp>
+        <p:nvSpPr>
+          <p:cNvPr id="2" name="Slide Image Placeholder 1"/>
+          <p:cNvSpPr>
+            <a:spLocks noGrp="1" noRot="1" noChangeAspect="1"/>
+          </p:cNvSpPr>
+          <p:nvPr>
+            <p:ph type="sldImg"/>
+          </p:nvPr>
+        </p:nvSpPr>
+        <p:spPr/>
+      </p:sp>
+      <p:sp>
+        <p:nvSpPr>
+          <p:cNvPr id="3" name="Notes Placeholder 2"/>
+          <p:cNvSpPr>
+            <a:spLocks noGrp="1"/>
+          </p:cNvSpPr>
+          <p:nvPr>
+            <p:ph type="body" idx="1"/>
+          </p:nvPr>
+        </p:nvSpPr>
+        <p:spPr/>
+        <p:txBody>
+          <a:bodyPr/>
+          <a:lstStyle/>
+          <a:p>
+            <a:r>
+              <a:rPr lang="en-AU" dirty="0"/>
+              <a:t>We have a four phase development plan, That includes a Design phase, prototyping phase, testing phase and lastly a finalizing and deployment phase.</a:t>
+            </a:r>
+          </a:p>
+        </p:txBody>
+      </p:sp>
+      <p:sp>
+        <p:nvSpPr>
+          <p:cNvPr id="4" name="Slide Number Placeholder 3"/>
+          <p:cNvSpPr>
+            <a:spLocks noGrp="1"/>
+          </p:cNvSpPr>
+          <p:nvPr>
+            <p:ph type="sldNum" sz="quarter" idx="10"/>
+          </p:nvPr>
+        </p:nvSpPr>
+        <p:spPr/>
+        <p:txBody>
+          <a:bodyPr/>
+          <a:lstStyle/>
+          <a:p>
+            <a:fld id="{69EA1A26-A095-45B7-AC9F-041832E92BB7}" type="slidenum">
+              <a:rPr lang="en-AU" smtClean="0"/>
+              <a:t>4</a:t>
+            </a:fld>
+            <a:endParaRPr lang="en-AU"/>
+          </a:p>
+        </p:txBody>
+      </p:sp>
+    </p:spTree>
+    <p:extLst>
+      <p:ext uri="{BB962C8B-B14F-4D97-AF65-F5344CB8AC3E}">
+        <p14:creationId xmlns:p14="http://schemas.microsoft.com/office/powerpoint/2010/main" val="1318794582"/>
+      </p:ext>
+    </p:extLst>
+  </p:cSld>
+  <p:clrMapOvr>
+    <a:masterClrMapping/>
+  </p:clrMapOvr>
+</p:notes>
+</file>
+
 <file path=ppt/slideLayouts/slideLayout1.xml><?xml version="1.0" encoding="utf-8"?>
 <p:sldLayout xmlns:a="http://schemas.openxmlformats.org/drawingml/2006/main" xmlns:r="http://schemas.openxmlformats.org/officeDocument/2006/relationships" xmlns:p="http://schemas.openxmlformats.org/presentationml/2006/main" type="title" preserve="1">
   <p:cSld name="Title Slide">
@@ -315,7 +1021,7 @@
           <a:p>
             <a:fld id="{48A87A34-81AB-432B-8DAE-1953F412C126}" type="datetimeFigureOut">
               <a:rPr lang="en-US" smtClean="0"/>
-              <a:t>3/31/2017</a:t>
+              <a:t>4/1/2017</a:t>
             </a:fld>
             <a:endParaRPr lang="en-US" dirty="0"/>
           </a:p>
@@ -590,7 +1296,7 @@
           <a:p>
             <a:fld id="{48A87A34-81AB-432B-8DAE-1953F412C126}" type="datetimeFigureOut">
               <a:rPr lang="en-US" smtClean="0"/>
-              <a:t>3/31/2017</a:t>
+              <a:t>4/1/2017</a:t>
             </a:fld>
             <a:endParaRPr lang="en-US" dirty="0"/>
           </a:p>
@@ -784,7 +1490,7 @@
           <a:p>
             <a:fld id="{48A87A34-81AB-432B-8DAE-1953F412C126}" type="datetimeFigureOut">
               <a:rPr lang="en-US" smtClean="0"/>
-              <a:t>3/31/2017</a:t>
+              <a:t>4/1/2017</a:t>
             </a:fld>
             <a:endParaRPr lang="en-US" dirty="0"/>
           </a:p>
@@ -1057,7 +1763,7 @@
           <a:p>
             <a:fld id="{48A87A34-81AB-432B-8DAE-1953F412C126}" type="datetimeFigureOut">
               <a:rPr lang="en-US" smtClean="0"/>
-              <a:t>3/31/2017</a:t>
+              <a:t>4/1/2017</a:t>
             </a:fld>
             <a:endParaRPr lang="en-US" dirty="0"/>
           </a:p>
@@ -1398,7 +2104,7 @@
           <a:p>
             <a:fld id="{48A87A34-81AB-432B-8DAE-1953F412C126}" type="datetimeFigureOut">
               <a:rPr lang="en-US" smtClean="0"/>
-              <a:t>3/31/2017</a:t>
+              <a:t>4/1/2017</a:t>
             </a:fld>
             <a:endParaRPr lang="en-US" dirty="0"/>
           </a:p>
@@ -2021,7 +2727,7 @@
           <a:p>
             <a:fld id="{48A87A34-81AB-432B-8DAE-1953F412C126}" type="datetimeFigureOut">
               <a:rPr lang="en-US" smtClean="0"/>
-              <a:t>3/31/2017</a:t>
+              <a:t>4/1/2017</a:t>
             </a:fld>
             <a:endParaRPr lang="en-US" dirty="0"/>
           </a:p>
@@ -2881,7 +3587,7 @@
           <a:p>
             <a:fld id="{48A87A34-81AB-432B-8DAE-1953F412C126}" type="datetimeFigureOut">
               <a:rPr lang="en-US" smtClean="0"/>
-              <a:t>3/31/2017</a:t>
+              <a:t>4/1/2017</a:t>
             </a:fld>
             <a:endParaRPr lang="en-US" dirty="0"/>
           </a:p>
@@ -3051,7 +3757,7 @@
           <a:p>
             <a:fld id="{48A87A34-81AB-432B-8DAE-1953F412C126}" type="datetimeFigureOut">
               <a:rPr lang="en-US" smtClean="0"/>
-              <a:t>3/31/2017</a:t>
+              <a:t>4/1/2017</a:t>
             </a:fld>
             <a:endParaRPr lang="en-US" dirty="0"/>
           </a:p>
@@ -3231,7 +3937,7 @@
           <a:p>
             <a:fld id="{48A87A34-81AB-432B-8DAE-1953F412C126}" type="datetimeFigureOut">
               <a:rPr lang="en-US" smtClean="0"/>
-              <a:t>3/31/2017</a:t>
+              <a:t>4/1/2017</a:t>
             </a:fld>
             <a:endParaRPr lang="en-US" dirty="0"/>
           </a:p>
@@ -3401,7 +4107,7 @@
           <a:p>
             <a:fld id="{48A87A34-81AB-432B-8DAE-1953F412C126}" type="datetimeFigureOut">
               <a:rPr lang="en-US" smtClean="0"/>
-              <a:t>3/31/2017</a:t>
+              <a:t>4/1/2017</a:t>
             </a:fld>
             <a:endParaRPr lang="en-US" dirty="0"/>
           </a:p>
@@ -3648,7 +4354,7 @@
           <a:p>
             <a:fld id="{48A87A34-81AB-432B-8DAE-1953F412C126}" type="datetimeFigureOut">
               <a:rPr lang="en-US" smtClean="0"/>
-              <a:t>3/31/2017</a:t>
+              <a:t>4/1/2017</a:t>
             </a:fld>
             <a:endParaRPr lang="en-US" dirty="0"/>
           </a:p>
@@ -3940,7 +4646,7 @@
           <a:p>
             <a:fld id="{48A87A34-81AB-432B-8DAE-1953F412C126}" type="datetimeFigureOut">
               <a:rPr lang="en-US" smtClean="0"/>
-              <a:t>3/31/2017</a:t>
+              <a:t>4/1/2017</a:t>
             </a:fld>
             <a:endParaRPr lang="en-US" dirty="0"/>
           </a:p>
@@ -4384,7 +5090,7 @@
           <a:p>
             <a:fld id="{48A87A34-81AB-432B-8DAE-1953F412C126}" type="datetimeFigureOut">
               <a:rPr lang="en-US" smtClean="0"/>
-              <a:t>3/31/2017</a:t>
+              <a:t>4/1/2017</a:t>
             </a:fld>
             <a:endParaRPr lang="en-US" dirty="0"/>
           </a:p>
@@ -4502,7 +5208,7 @@
           <a:p>
             <a:fld id="{48A87A34-81AB-432B-8DAE-1953F412C126}" type="datetimeFigureOut">
               <a:rPr lang="en-US" smtClean="0"/>
-              <a:t>3/31/2017</a:t>
+              <a:t>4/1/2017</a:t>
             </a:fld>
             <a:endParaRPr lang="en-US" dirty="0"/>
           </a:p>
@@ -4597,7 +5303,7 @@
           <a:p>
             <a:fld id="{48A87A34-81AB-432B-8DAE-1953F412C126}" type="datetimeFigureOut">
               <a:rPr lang="en-US" smtClean="0"/>
-              <a:t>3/31/2017</a:t>
+              <a:t>4/1/2017</a:t>
             </a:fld>
             <a:endParaRPr lang="en-US" dirty="0"/>
           </a:p>
@@ -4876,7 +5582,7 @@
           <a:p>
             <a:fld id="{48A87A34-81AB-432B-8DAE-1953F412C126}" type="datetimeFigureOut">
               <a:rPr lang="en-US" smtClean="0"/>
-              <a:t>3/31/2017</a:t>
+              <a:t>4/1/2017</a:t>
             </a:fld>
             <a:endParaRPr lang="en-US" dirty="0"/>
           </a:p>
@@ -5151,7 +5857,7 @@
           <a:p>
             <a:fld id="{48A87A34-81AB-432B-8DAE-1953F412C126}" type="datetimeFigureOut">
               <a:rPr lang="en-US" smtClean="0"/>
-              <a:t>3/31/2017</a:t>
+              <a:t>4/1/2017</a:t>
             </a:fld>
             <a:endParaRPr lang="en-US" dirty="0"/>
           </a:p>
@@ -5581,7 +6287,7 @@
             <a:fld id="{48A87A34-81AB-432B-8DAE-1953F412C126}" type="datetimeFigureOut">
               <a:rPr lang="en-US" smtClean="0"/>
               <a:pPr/>
-              <a:t>3/31/2017</a:t>
+              <a:t>4/1/2017</a:t>
             </a:fld>
             <a:endParaRPr lang="en-US" dirty="0"/>
           </a:p>
@@ -8769,7 +9475,7 @@
       </p:sp>
       <p:pic>
         <p:nvPicPr>
-          <p:cNvPr id="8" name="Content Placeholder 7"/>
+          <p:cNvPr id="11" name="Content Placeholder 10"/>
           <p:cNvPicPr>
             <a:picLocks noGrp="1" noChangeAspect="1"/>
           </p:cNvPicPr>
@@ -8785,8 +9491,8 @@
         </p:blipFill>
         <p:spPr>
           <a:xfrm>
-            <a:off x="7033288" y="1958788"/>
-            <a:ext cx="1836290" cy="3264516"/>
+            <a:off x="6798468" y="1448833"/>
+            <a:ext cx="2104727" cy="3741738"/>
           </a:xfrm>
         </p:spPr>
       </p:pic>
@@ -9836,4 +10542,299 @@
     </a:ext>
   </a:extLst>
 </a:theme>
+</file>
+
+<file path=ppt/theme/theme2.xml><?xml version="1.0" encoding="utf-8"?>
+<a:theme xmlns:a="http://schemas.openxmlformats.org/drawingml/2006/main" name="Office Theme">
+  <a:themeElements>
+    <a:clrScheme name="Office">
+      <a:dk1>
+        <a:sysClr val="windowText" lastClr="000000"/>
+      </a:dk1>
+      <a:lt1>
+        <a:sysClr val="window" lastClr="FFFFFF"/>
+      </a:lt1>
+      <a:dk2>
+        <a:srgbClr val="44546A"/>
+      </a:dk2>
+      <a:lt2>
+        <a:srgbClr val="E7E6E6"/>
+      </a:lt2>
+      <a:accent1>
+        <a:srgbClr val="4472C4"/>
+      </a:accent1>
+      <a:accent2>
+        <a:srgbClr val="ED7D31"/>
+      </a:accent2>
+      <a:accent3>
+        <a:srgbClr val="A5A5A5"/>
+      </a:accent3>
+      <a:accent4>
+        <a:srgbClr val="FFC000"/>
+      </a:accent4>
+      <a:accent5>
+        <a:srgbClr val="5B9BD5"/>
+      </a:accent5>
+      <a:accent6>
+        <a:srgbClr val="70AD47"/>
+      </a:accent6>
+      <a:hlink>
+        <a:srgbClr val="0563C1"/>
+      </a:hlink>
+      <a:folHlink>
+        <a:srgbClr val="954F72"/>
+      </a:folHlink>
+    </a:clrScheme>
+    <a:fontScheme name="Office">
+      <a:majorFont>
+        <a:latin typeface="Calibri Light" panose="020F0302020204030204"/>
+        <a:ea typeface=""/>
+        <a:cs typeface=""/>
+        <a:font script="Jpan" typeface="游ゴシック Light"/>
+        <a:font script="Hang" typeface="맑은 고딕"/>
+        <a:font script="Hans" typeface="等线 Light"/>
+        <a:font script="Hant" typeface="新細明體"/>
+        <a:font script="Arab" typeface="Times New Roman"/>
+        <a:font script="Hebr" typeface="Times New Roman"/>
+        <a:font script="Thai" typeface="Angsana New"/>
+        <a:font script="Ethi" typeface="Nyala"/>
+        <a:font script="Beng" typeface="Vrinda"/>
+        <a:font script="Gujr" typeface="Shruti"/>
+        <a:font script="Khmr" typeface="MoolBoran"/>
+        <a:font script="Knda" typeface="Tunga"/>
+        <a:font script="Guru" typeface="Raavi"/>
+        <a:font script="Cans" typeface="Euphemia"/>
+        <a:font script="Cher" typeface="Plantagenet Cherokee"/>
+        <a:font script="Yiii" typeface="Microsoft Yi Baiti"/>
+        <a:font script="Tibt" typeface="Microsoft Himalaya"/>
+        <a:font script="Thaa" typeface="MV Boli"/>
+        <a:font script="Deva" typeface="Mangal"/>
+        <a:font script="Telu" typeface="Gautami"/>
+        <a:font script="Taml" typeface="Latha"/>
+        <a:font script="Syrc" typeface="Estrangelo Edessa"/>
+        <a:font script="Orya" typeface="Kalinga"/>
+        <a:font script="Mlym" typeface="Kartika"/>
+        <a:font script="Laoo" typeface="DokChampa"/>
+        <a:font script="Sinh" typeface="Iskoola Pota"/>
+        <a:font script="Mong" typeface="Mongolian Baiti"/>
+        <a:font script="Viet" typeface="Times New Roman"/>
+        <a:font script="Uigh" typeface="Microsoft Uighur"/>
+        <a:font script="Geor" typeface="Sylfaen"/>
+        <a:font script="Armn" typeface="Arial"/>
+        <a:font script="Bugi" typeface="Leelawadee UI"/>
+        <a:font script="Bopo" typeface="Microsoft JhengHei"/>
+        <a:font script="Java" typeface="Javanese Text"/>
+        <a:font script="Lisu" typeface="Segoe UI"/>
+        <a:font script="Mymr" typeface="Myanmar Text"/>
+        <a:font script="Nkoo" typeface="Ebrima"/>
+        <a:font script="Olck" typeface="Nirmala UI"/>
+        <a:font script="Osma" typeface="Ebrima"/>
+        <a:font script="Phag" typeface="Phagspa"/>
+        <a:font script="Syrn" typeface="Estrangelo Edessa"/>
+        <a:font script="Syrj" typeface="Estrangelo Edessa"/>
+        <a:font script="Syre" typeface="Estrangelo Edessa"/>
+        <a:font script="Sora" typeface="Nirmala UI"/>
+        <a:font script="Tale" typeface="Microsoft Tai Le"/>
+        <a:font script="Talu" typeface="Microsoft New Tai Lue"/>
+        <a:font script="Tfng" typeface="Ebrima"/>
+      </a:majorFont>
+      <a:minorFont>
+        <a:latin typeface="Calibri" panose="020F0502020204030204"/>
+        <a:ea typeface=""/>
+        <a:cs typeface=""/>
+        <a:font script="Jpan" typeface="游ゴシック"/>
+        <a:font script="Hang" typeface="맑은 고딕"/>
+        <a:font script="Hans" typeface="等线"/>
+        <a:font script="Hant" typeface="新細明體"/>
+        <a:font script="Arab" typeface="Arial"/>
+        <a:font script="Hebr" typeface="Arial"/>
+        <a:font script="Thai" typeface="Cordia New"/>
+        <a:font script="Ethi" typeface="Nyala"/>
+        <a:font script="Beng" typeface="Vrinda"/>
+        <a:font script="Gujr" typeface="Shruti"/>
+        <a:font script="Khmr" typeface="DaunPenh"/>
+        <a:font script="Knda" typeface="Tunga"/>
+        <a:font script="Guru" typeface="Raavi"/>
+        <a:font script="Cans" typeface="Euphemia"/>
+        <a:font script="Cher" typeface="Plantagenet Cherokee"/>
+        <a:font script="Yiii" typeface="Microsoft Yi Baiti"/>
+        <a:font script="Tibt" typeface="Microsoft Himalaya"/>
+        <a:font script="Thaa" typeface="MV Boli"/>
+        <a:font script="Deva" typeface="Mangal"/>
+        <a:font script="Telu" typeface="Gautami"/>
+        <a:font script="Taml" typeface="Latha"/>
+        <a:font script="Syrc" typeface="Estrangelo Edessa"/>
+        <a:font script="Orya" typeface="Kalinga"/>
+        <a:font script="Mlym" typeface="Kartika"/>
+        <a:font script="Laoo" typeface="DokChampa"/>
+        <a:font script="Sinh" typeface="Iskoola Pota"/>
+        <a:font script="Mong" typeface="Mongolian Baiti"/>
+        <a:font script="Viet" typeface="Arial"/>
+        <a:font script="Uigh" typeface="Microsoft Uighur"/>
+        <a:font script="Geor" typeface="Sylfaen"/>
+        <a:font script="Armn" typeface="Arial"/>
+        <a:font script="Bugi" typeface="Leelawadee UI"/>
+        <a:font script="Bopo" typeface="Microsoft JhengHei"/>
+        <a:font script="Java" typeface="Javanese Text"/>
+        <a:font script="Lisu" typeface="Segoe UI"/>
+        <a:font script="Mymr" typeface="Myanmar Text"/>
+        <a:font script="Nkoo" typeface="Ebrima"/>
+        <a:font script="Olck" typeface="Nirmala UI"/>
+        <a:font script="Osma" typeface="Ebrima"/>
+        <a:font script="Phag" typeface="Phagspa"/>
+        <a:font script="Syrn" typeface="Estrangelo Edessa"/>
+        <a:font script="Syrj" typeface="Estrangelo Edessa"/>
+        <a:font script="Syre" typeface="Estrangelo Edessa"/>
+        <a:font script="Sora" typeface="Nirmala UI"/>
+        <a:font script="Tale" typeface="Microsoft Tai Le"/>
+        <a:font script="Talu" typeface="Microsoft New Tai Lue"/>
+        <a:font script="Tfng" typeface="Ebrima"/>
+      </a:minorFont>
+    </a:fontScheme>
+    <a:fmtScheme name="Office">
+      <a:fillStyleLst>
+        <a:solidFill>
+          <a:schemeClr val="phClr"/>
+        </a:solidFill>
+        <a:gradFill rotWithShape="1">
+          <a:gsLst>
+            <a:gs pos="0">
+              <a:schemeClr val="phClr">
+                <a:lumMod val="110000"/>
+                <a:satMod val="105000"/>
+                <a:tint val="67000"/>
+              </a:schemeClr>
+            </a:gs>
+            <a:gs pos="50000">
+              <a:schemeClr val="phClr">
+                <a:lumMod val="105000"/>
+                <a:satMod val="103000"/>
+                <a:tint val="73000"/>
+              </a:schemeClr>
+            </a:gs>
+            <a:gs pos="100000">
+              <a:schemeClr val="phClr">
+                <a:lumMod val="105000"/>
+                <a:satMod val="109000"/>
+                <a:tint val="81000"/>
+              </a:schemeClr>
+            </a:gs>
+          </a:gsLst>
+          <a:lin ang="5400000" scaled="0"/>
+        </a:gradFill>
+        <a:gradFill rotWithShape="1">
+          <a:gsLst>
+            <a:gs pos="0">
+              <a:schemeClr val="phClr">
+                <a:satMod val="103000"/>
+                <a:lumMod val="102000"/>
+                <a:tint val="94000"/>
+              </a:schemeClr>
+            </a:gs>
+            <a:gs pos="50000">
+              <a:schemeClr val="phClr">
+                <a:satMod val="110000"/>
+                <a:lumMod val="100000"/>
+                <a:shade val="100000"/>
+              </a:schemeClr>
+            </a:gs>
+            <a:gs pos="100000">
+              <a:schemeClr val="phClr">
+                <a:lumMod val="99000"/>
+                <a:satMod val="120000"/>
+                <a:shade val="78000"/>
+              </a:schemeClr>
+            </a:gs>
+          </a:gsLst>
+          <a:lin ang="5400000" scaled="0"/>
+        </a:gradFill>
+      </a:fillStyleLst>
+      <a:lnStyleLst>
+        <a:ln w="6350" cap="flat" cmpd="sng" algn="ctr">
+          <a:solidFill>
+            <a:schemeClr val="phClr"/>
+          </a:solidFill>
+          <a:prstDash val="solid"/>
+          <a:miter lim="800000"/>
+        </a:ln>
+        <a:ln w="12700" cap="flat" cmpd="sng" algn="ctr">
+          <a:solidFill>
+            <a:schemeClr val="phClr"/>
+          </a:solidFill>
+          <a:prstDash val="solid"/>
+          <a:miter lim="800000"/>
+        </a:ln>
+        <a:ln w="19050" cap="flat" cmpd="sng" algn="ctr">
+          <a:solidFill>
+            <a:schemeClr val="phClr"/>
+          </a:solidFill>
+          <a:prstDash val="solid"/>
+          <a:miter lim="800000"/>
+        </a:ln>
+      </a:lnStyleLst>
+      <a:effectStyleLst>
+        <a:effectStyle>
+          <a:effectLst/>
+        </a:effectStyle>
+        <a:effectStyle>
+          <a:effectLst/>
+        </a:effectStyle>
+        <a:effectStyle>
+          <a:effectLst>
+            <a:outerShdw blurRad="57150" dist="19050" dir="5400000" algn="ctr" rotWithShape="0">
+              <a:srgbClr val="000000">
+                <a:alpha val="63000"/>
+              </a:srgbClr>
+            </a:outerShdw>
+          </a:effectLst>
+        </a:effectStyle>
+      </a:effectStyleLst>
+      <a:bgFillStyleLst>
+        <a:solidFill>
+          <a:schemeClr val="phClr"/>
+        </a:solidFill>
+        <a:solidFill>
+          <a:schemeClr val="phClr">
+            <a:tint val="95000"/>
+            <a:satMod val="170000"/>
+          </a:schemeClr>
+        </a:solidFill>
+        <a:gradFill rotWithShape="1">
+          <a:gsLst>
+            <a:gs pos="0">
+              <a:schemeClr val="phClr">
+                <a:tint val="93000"/>
+                <a:satMod val="150000"/>
+                <a:shade val="98000"/>
+                <a:lumMod val="102000"/>
+              </a:schemeClr>
+            </a:gs>
+            <a:gs pos="50000">
+              <a:schemeClr val="phClr">
+                <a:tint val="98000"/>
+                <a:satMod val="130000"/>
+                <a:shade val="90000"/>
+                <a:lumMod val="103000"/>
+              </a:schemeClr>
+            </a:gs>
+            <a:gs pos="100000">
+              <a:schemeClr val="phClr">
+                <a:shade val="63000"/>
+                <a:satMod val="120000"/>
+              </a:schemeClr>
+            </a:gs>
+          </a:gsLst>
+          <a:lin ang="5400000" scaled="0"/>
+        </a:gradFill>
+      </a:bgFillStyleLst>
+    </a:fmtScheme>
+  </a:themeElements>
+  <a:objectDefaults/>
+  <a:extraClrSchemeLst/>
+  <a:extLst>
+    <a:ext uri="{05A4C25C-085E-4340-85A3-A5531E510DB2}">
+      <thm15:themeFamily xmlns:thm15="http://schemas.microsoft.com/office/thememl/2012/main" name="Office Theme" id="{62F939B6-93AF-4DB8-9C6B-D6C7DFDC589F}" vid="{4A3C46E8-61CC-4603-A589-7422A47A8E4A}"/>
+    </a:ext>
+  </a:extLst>
+</a:theme>
 </file>
</xml_diff>

<commit_message>
all of my speech in pp slide notes
</commit_message>
<xml_diff>
--- a/SCaRArcade.pptx
+++ b/SCaRArcade.pptx
@@ -214,7 +214,7 @@
           <a:p>
             <a:fld id="{A217C4EB-741C-46AC-ACC7-C6BD45D1E9A3}" type="datetimeFigureOut">
               <a:rPr lang="en-AU" smtClean="0"/>
-              <a:t>1/04/2017</a:t>
+              <a:t>2/04/2017</a:t>
             </a:fld>
             <a:endParaRPr lang="en-AU"/>
           </a:p>
@@ -528,7 +528,7 @@
           <a:p>
             <a:r>
               <a:rPr lang="en-AU" dirty="0"/>
-              <a:t>Greetings gentlemen, I am Martin and today I’ll be introducing our application Scar arcade, while also running through some of the components as well  as some of the issues anticipated and solutions to those issues. Ryan will then talk about a game in the application and its issues and solutions. Then Saxon will do the same and I’ll come back and wrap up the talk.</a:t>
+              <a:t>Greetings gentlemen, I am Martin and today I’ll be introducing our application Scar arcade, while also running through some of the components as well as some of the issues anticipated and solutions to those issues. Ryan will then talk about a game in the application and its issues and solutions. Then Saxon will do the same and wrap up the talk.</a:t>
             </a:r>
           </a:p>
         </p:txBody>
@@ -702,13 +702,8 @@
           <a:p>
             <a:r>
               <a:rPr lang="en-AU" dirty="0"/>
-              <a:t>Why did we choose this application, well games are a great way to utilize the skills taught in INFT2050, but it would be silly to try and implement all of the skills into just one game. When you can focus skills, like coding sensors for example with a game dedicated to using a sensor for an action. Grouping these games together in a manager seemed like the most logical step, this also gives us the ability to implement more skills like cloud services in </a:t>
-            </a:r>
-            <a:r>
-              <a:rPr lang="en-AU"/>
-              <a:t>leaderboards.</a:t>
-            </a:r>
-            <a:endParaRPr lang="en-AU" dirty="0"/>
+              <a:t>Why did we choose this application, well games are a great way to utilize the skills taught in INFT2050, but it would be silly to try and implement all of the skills into just one game. When you can focus skills, like coding sensors for example with a game dedicated to using a sensor for an action. Grouping these games together in a manager seemed like the most logical step, this also gives us the ability to implement more skills like cloud services in leader boards.</a:t>
+            </a:r>
           </a:p>
         </p:txBody>
       </p:sp>
@@ -835,6 +830,360 @@
 </p:notes>
 </file>
 
+<file path=ppt/notesSlides/notesSlide5.xml><?xml version="1.0" encoding="utf-8"?>
+<p:notes xmlns:a="http://schemas.openxmlformats.org/drawingml/2006/main" xmlns:r="http://schemas.openxmlformats.org/officeDocument/2006/relationships" xmlns:p="http://schemas.openxmlformats.org/presentationml/2006/main">
+  <p:cSld>
+    <p:spTree>
+      <p:nvGrpSpPr>
+        <p:cNvPr id="1" name=""/>
+        <p:cNvGrpSpPr/>
+        <p:nvPr/>
+      </p:nvGrpSpPr>
+      <p:grpSpPr>
+        <a:xfrm>
+          <a:off x="0" y="0"/>
+          <a:ext cx="0" cy="0"/>
+          <a:chOff x="0" y="0"/>
+          <a:chExt cx="0" cy="0"/>
+        </a:xfrm>
+      </p:grpSpPr>
+      <p:sp>
+        <p:nvSpPr>
+          <p:cNvPr id="2" name="Slide Image Placeholder 1"/>
+          <p:cNvSpPr>
+            <a:spLocks noGrp="1" noRot="1" noChangeAspect="1"/>
+          </p:cNvSpPr>
+          <p:nvPr>
+            <p:ph type="sldImg"/>
+          </p:nvPr>
+        </p:nvSpPr>
+        <p:spPr/>
+      </p:sp>
+      <p:sp>
+        <p:nvSpPr>
+          <p:cNvPr id="3" name="Notes Placeholder 2"/>
+          <p:cNvSpPr>
+            <a:spLocks noGrp="1"/>
+          </p:cNvSpPr>
+          <p:nvPr>
+            <p:ph type="body" idx="1"/>
+          </p:nvPr>
+        </p:nvSpPr>
+        <p:spPr/>
+        <p:txBody>
+          <a:bodyPr/>
+          <a:lstStyle/>
+          <a:p>
+            <a:r>
+              <a:rPr lang="en-AU" dirty="0"/>
+              <a:t>The game selection interface is the start point of the application, that gives the user the option to pick a program they want to run, it shows the title and logo of the game.</a:t>
+            </a:r>
+          </a:p>
+        </p:txBody>
+      </p:sp>
+      <p:sp>
+        <p:nvSpPr>
+          <p:cNvPr id="4" name="Slide Number Placeholder 3"/>
+          <p:cNvSpPr>
+            <a:spLocks noGrp="1"/>
+          </p:cNvSpPr>
+          <p:nvPr>
+            <p:ph type="sldNum" sz="quarter" idx="10"/>
+          </p:nvPr>
+        </p:nvSpPr>
+        <p:spPr/>
+        <p:txBody>
+          <a:bodyPr/>
+          <a:lstStyle/>
+          <a:p>
+            <a:fld id="{69EA1A26-A095-45B7-AC9F-041832E92BB7}" type="slidenum">
+              <a:rPr lang="en-AU" smtClean="0"/>
+              <a:t>5</a:t>
+            </a:fld>
+            <a:endParaRPr lang="en-AU"/>
+          </a:p>
+        </p:txBody>
+      </p:sp>
+    </p:spTree>
+    <p:extLst>
+      <p:ext uri="{BB962C8B-B14F-4D97-AF65-F5344CB8AC3E}">
+        <p14:creationId xmlns:p14="http://schemas.microsoft.com/office/powerpoint/2010/main" val="402995928"/>
+      </p:ext>
+    </p:extLst>
+  </p:cSld>
+  <p:clrMapOvr>
+    <a:masterClrMapping/>
+  </p:clrMapOvr>
+</p:notes>
+</file>
+
+<file path=ppt/notesSlides/notesSlide6.xml><?xml version="1.0" encoding="utf-8"?>
+<p:notes xmlns:a="http://schemas.openxmlformats.org/drawingml/2006/main" xmlns:r="http://schemas.openxmlformats.org/officeDocument/2006/relationships" xmlns:p="http://schemas.openxmlformats.org/presentationml/2006/main">
+  <p:cSld>
+    <p:spTree>
+      <p:nvGrpSpPr>
+        <p:cNvPr id="1" name=""/>
+        <p:cNvGrpSpPr/>
+        <p:nvPr/>
+      </p:nvGrpSpPr>
+      <p:grpSpPr>
+        <a:xfrm>
+          <a:off x="0" y="0"/>
+          <a:ext cx="0" cy="0"/>
+          <a:chOff x="0" y="0"/>
+          <a:chExt cx="0" cy="0"/>
+        </a:xfrm>
+      </p:grpSpPr>
+      <p:sp>
+        <p:nvSpPr>
+          <p:cNvPr id="2" name="Slide Image Placeholder 1"/>
+          <p:cNvSpPr>
+            <a:spLocks noGrp="1" noRot="1" noChangeAspect="1"/>
+          </p:cNvSpPr>
+          <p:nvPr>
+            <p:ph type="sldImg"/>
+          </p:nvPr>
+        </p:nvSpPr>
+        <p:spPr/>
+      </p:sp>
+      <p:sp>
+        <p:nvSpPr>
+          <p:cNvPr id="3" name="Notes Placeholder 2"/>
+          <p:cNvSpPr>
+            <a:spLocks noGrp="1"/>
+          </p:cNvSpPr>
+          <p:nvPr>
+            <p:ph type="body" idx="1"/>
+          </p:nvPr>
+        </p:nvSpPr>
+        <p:spPr/>
+        <p:txBody>
+          <a:bodyPr/>
+          <a:lstStyle/>
+          <a:p>
+            <a:r>
+              <a:rPr lang="en-AU" dirty="0"/>
+              <a:t>The game menu interface is the hub for games that has a difficulty modifier a start program button and a open leader board button and a way of getting back to the game selection interface. </a:t>
+            </a:r>
+          </a:p>
+        </p:txBody>
+      </p:sp>
+      <p:sp>
+        <p:nvSpPr>
+          <p:cNvPr id="4" name="Slide Number Placeholder 3"/>
+          <p:cNvSpPr>
+            <a:spLocks noGrp="1"/>
+          </p:cNvSpPr>
+          <p:nvPr>
+            <p:ph type="sldNum" sz="quarter" idx="10"/>
+          </p:nvPr>
+        </p:nvSpPr>
+        <p:spPr/>
+        <p:txBody>
+          <a:bodyPr/>
+          <a:lstStyle/>
+          <a:p>
+            <a:fld id="{69EA1A26-A095-45B7-AC9F-041832E92BB7}" type="slidenum">
+              <a:rPr lang="en-AU" smtClean="0"/>
+              <a:t>6</a:t>
+            </a:fld>
+            <a:endParaRPr lang="en-AU"/>
+          </a:p>
+        </p:txBody>
+      </p:sp>
+    </p:spTree>
+    <p:extLst>
+      <p:ext uri="{BB962C8B-B14F-4D97-AF65-F5344CB8AC3E}">
+        <p14:creationId xmlns:p14="http://schemas.microsoft.com/office/powerpoint/2010/main" val="1700409807"/>
+      </p:ext>
+    </p:extLst>
+  </p:cSld>
+  <p:clrMapOvr>
+    <a:masterClrMapping/>
+  </p:clrMapOvr>
+</p:notes>
+</file>
+
+<file path=ppt/notesSlides/notesSlide7.xml><?xml version="1.0" encoding="utf-8"?>
+<p:notes xmlns:a="http://schemas.openxmlformats.org/drawingml/2006/main" xmlns:r="http://schemas.openxmlformats.org/officeDocument/2006/relationships" xmlns:p="http://schemas.openxmlformats.org/presentationml/2006/main">
+  <p:cSld>
+    <p:spTree>
+      <p:nvGrpSpPr>
+        <p:cNvPr id="1" name=""/>
+        <p:cNvGrpSpPr/>
+        <p:nvPr/>
+      </p:nvGrpSpPr>
+      <p:grpSpPr>
+        <a:xfrm>
+          <a:off x="0" y="0"/>
+          <a:ext cx="0" cy="0"/>
+          <a:chOff x="0" y="0"/>
+          <a:chExt cx="0" cy="0"/>
+        </a:xfrm>
+      </p:grpSpPr>
+      <p:sp>
+        <p:nvSpPr>
+          <p:cNvPr id="2" name="Slide Image Placeholder 1"/>
+          <p:cNvSpPr>
+            <a:spLocks noGrp="1" noRot="1" noChangeAspect="1"/>
+          </p:cNvSpPr>
+          <p:nvPr>
+            <p:ph type="sldImg"/>
+          </p:nvPr>
+        </p:nvSpPr>
+        <p:spPr/>
+      </p:sp>
+      <p:sp>
+        <p:nvSpPr>
+          <p:cNvPr id="3" name="Notes Placeholder 2"/>
+          <p:cNvSpPr>
+            <a:spLocks noGrp="1"/>
+          </p:cNvSpPr>
+          <p:nvPr>
+            <p:ph type="body" idx="1"/>
+          </p:nvPr>
+        </p:nvSpPr>
+        <p:spPr/>
+        <p:txBody>
+          <a:bodyPr/>
+          <a:lstStyle/>
+          <a:p>
+            <a:r>
+              <a:rPr lang="en-AU" dirty="0"/>
+              <a:t>The leader board interface is a display for personal high scores that have been recorded after a game has ended.</a:t>
+            </a:r>
+          </a:p>
+        </p:txBody>
+      </p:sp>
+      <p:sp>
+        <p:nvSpPr>
+          <p:cNvPr id="4" name="Slide Number Placeholder 3"/>
+          <p:cNvSpPr>
+            <a:spLocks noGrp="1"/>
+          </p:cNvSpPr>
+          <p:nvPr>
+            <p:ph type="sldNum" sz="quarter" idx="10"/>
+          </p:nvPr>
+        </p:nvSpPr>
+        <p:spPr/>
+        <p:txBody>
+          <a:bodyPr/>
+          <a:lstStyle/>
+          <a:p>
+            <a:fld id="{69EA1A26-A095-45B7-AC9F-041832E92BB7}" type="slidenum">
+              <a:rPr lang="en-AU" smtClean="0"/>
+              <a:t>7</a:t>
+            </a:fld>
+            <a:endParaRPr lang="en-AU"/>
+          </a:p>
+        </p:txBody>
+      </p:sp>
+    </p:spTree>
+    <p:extLst>
+      <p:ext uri="{BB962C8B-B14F-4D97-AF65-F5344CB8AC3E}">
+        <p14:creationId xmlns:p14="http://schemas.microsoft.com/office/powerpoint/2010/main" val="1041313806"/>
+      </p:ext>
+    </p:extLst>
+  </p:cSld>
+  <p:clrMapOvr>
+    <a:masterClrMapping/>
+  </p:clrMapOvr>
+</p:notes>
+</file>
+
+<file path=ppt/notesSlides/notesSlide8.xml><?xml version="1.0" encoding="utf-8"?>
+<p:notes xmlns:a="http://schemas.openxmlformats.org/drawingml/2006/main" xmlns:r="http://schemas.openxmlformats.org/officeDocument/2006/relationships" xmlns:p="http://schemas.openxmlformats.org/presentationml/2006/main">
+  <p:cSld>
+    <p:spTree>
+      <p:nvGrpSpPr>
+        <p:cNvPr id="1" name=""/>
+        <p:cNvGrpSpPr/>
+        <p:nvPr/>
+      </p:nvGrpSpPr>
+      <p:grpSpPr>
+        <a:xfrm>
+          <a:off x="0" y="0"/>
+          <a:ext cx="0" cy="0"/>
+          <a:chOff x="0" y="0"/>
+          <a:chExt cx="0" cy="0"/>
+        </a:xfrm>
+      </p:grpSpPr>
+      <p:sp>
+        <p:nvSpPr>
+          <p:cNvPr id="2" name="Slide Image Placeholder 1"/>
+          <p:cNvSpPr>
+            <a:spLocks noGrp="1" noRot="1" noChangeAspect="1"/>
+          </p:cNvSpPr>
+          <p:nvPr>
+            <p:ph type="sldImg"/>
+          </p:nvPr>
+        </p:nvSpPr>
+        <p:spPr/>
+      </p:sp>
+      <p:sp>
+        <p:nvSpPr>
+          <p:cNvPr id="3" name="Notes Placeholder 2"/>
+          <p:cNvSpPr>
+            <a:spLocks noGrp="1"/>
+          </p:cNvSpPr>
+          <p:nvPr>
+            <p:ph type="body" idx="1"/>
+          </p:nvPr>
+        </p:nvSpPr>
+        <p:spPr/>
+        <p:txBody>
+          <a:bodyPr/>
+          <a:lstStyle/>
+          <a:p>
+            <a:r>
+              <a:rPr lang="en-AU" dirty="0"/>
+              <a:t>Some of the issues with these interfaces can be abnormalities when positioning application components, this can be over come by researching and testing different layouts and views.</a:t>
+            </a:r>
+          </a:p>
+          <a:p>
+            <a:r>
+              <a:rPr lang="en-AU" dirty="0"/>
+              <a:t>Another is the issue of updating files from cloud services if a online leader board was to be implemented these solution may come up in the upcoming class materials, so reading ahead would be necessary. Here is Ryan to explain His game and the issues he might face and some solutions.</a:t>
+            </a:r>
+          </a:p>
+        </p:txBody>
+      </p:sp>
+      <p:sp>
+        <p:nvSpPr>
+          <p:cNvPr id="4" name="Slide Number Placeholder 3"/>
+          <p:cNvSpPr>
+            <a:spLocks noGrp="1"/>
+          </p:cNvSpPr>
+          <p:nvPr>
+            <p:ph type="sldNum" sz="quarter" idx="10"/>
+          </p:nvPr>
+        </p:nvSpPr>
+        <p:spPr/>
+        <p:txBody>
+          <a:bodyPr/>
+          <a:lstStyle/>
+          <a:p>
+            <a:fld id="{69EA1A26-A095-45B7-AC9F-041832E92BB7}" type="slidenum">
+              <a:rPr lang="en-AU" smtClean="0"/>
+              <a:t>8</a:t>
+            </a:fld>
+            <a:endParaRPr lang="en-AU"/>
+          </a:p>
+        </p:txBody>
+      </p:sp>
+    </p:spTree>
+    <p:extLst>
+      <p:ext uri="{BB962C8B-B14F-4D97-AF65-F5344CB8AC3E}">
+        <p14:creationId xmlns:p14="http://schemas.microsoft.com/office/powerpoint/2010/main" val="665860310"/>
+      </p:ext>
+    </p:extLst>
+  </p:cSld>
+  <p:clrMapOvr>
+    <a:masterClrMapping/>
+  </p:clrMapOvr>
+</p:notes>
+</file>
+
 <file path=ppt/slideLayouts/slideLayout1.xml><?xml version="1.0" encoding="utf-8"?>
 <p:sldLayout xmlns:a="http://schemas.openxmlformats.org/drawingml/2006/main" xmlns:r="http://schemas.openxmlformats.org/officeDocument/2006/relationships" xmlns:p="http://schemas.openxmlformats.org/presentationml/2006/main" type="title" preserve="1">
   <p:cSld name="Title Slide">
@@ -1021,7 +1370,7 @@
           <a:p>
             <a:fld id="{48A87A34-81AB-432B-8DAE-1953F412C126}" type="datetimeFigureOut">
               <a:rPr lang="en-US" smtClean="0"/>
-              <a:t>4/1/2017</a:t>
+              <a:t>4/2/2017</a:t>
             </a:fld>
             <a:endParaRPr lang="en-US" dirty="0"/>
           </a:p>
@@ -1296,7 +1645,7 @@
           <a:p>
             <a:fld id="{48A87A34-81AB-432B-8DAE-1953F412C126}" type="datetimeFigureOut">
               <a:rPr lang="en-US" smtClean="0"/>
-              <a:t>4/1/2017</a:t>
+              <a:t>4/2/2017</a:t>
             </a:fld>
             <a:endParaRPr lang="en-US" dirty="0"/>
           </a:p>
@@ -1490,7 +1839,7 @@
           <a:p>
             <a:fld id="{48A87A34-81AB-432B-8DAE-1953F412C126}" type="datetimeFigureOut">
               <a:rPr lang="en-US" smtClean="0"/>
-              <a:t>4/1/2017</a:t>
+              <a:t>4/2/2017</a:t>
             </a:fld>
             <a:endParaRPr lang="en-US" dirty="0"/>
           </a:p>
@@ -1763,7 +2112,7 @@
           <a:p>
             <a:fld id="{48A87A34-81AB-432B-8DAE-1953F412C126}" type="datetimeFigureOut">
               <a:rPr lang="en-US" smtClean="0"/>
-              <a:t>4/1/2017</a:t>
+              <a:t>4/2/2017</a:t>
             </a:fld>
             <a:endParaRPr lang="en-US" dirty="0"/>
           </a:p>
@@ -2104,7 +2453,7 @@
           <a:p>
             <a:fld id="{48A87A34-81AB-432B-8DAE-1953F412C126}" type="datetimeFigureOut">
               <a:rPr lang="en-US" smtClean="0"/>
-              <a:t>4/1/2017</a:t>
+              <a:t>4/2/2017</a:t>
             </a:fld>
             <a:endParaRPr lang="en-US" dirty="0"/>
           </a:p>
@@ -2727,7 +3076,7 @@
           <a:p>
             <a:fld id="{48A87A34-81AB-432B-8DAE-1953F412C126}" type="datetimeFigureOut">
               <a:rPr lang="en-US" smtClean="0"/>
-              <a:t>4/1/2017</a:t>
+              <a:t>4/2/2017</a:t>
             </a:fld>
             <a:endParaRPr lang="en-US" dirty="0"/>
           </a:p>
@@ -3587,7 +3936,7 @@
           <a:p>
             <a:fld id="{48A87A34-81AB-432B-8DAE-1953F412C126}" type="datetimeFigureOut">
               <a:rPr lang="en-US" smtClean="0"/>
-              <a:t>4/1/2017</a:t>
+              <a:t>4/2/2017</a:t>
             </a:fld>
             <a:endParaRPr lang="en-US" dirty="0"/>
           </a:p>
@@ -3757,7 +4106,7 @@
           <a:p>
             <a:fld id="{48A87A34-81AB-432B-8DAE-1953F412C126}" type="datetimeFigureOut">
               <a:rPr lang="en-US" smtClean="0"/>
-              <a:t>4/1/2017</a:t>
+              <a:t>4/2/2017</a:t>
             </a:fld>
             <a:endParaRPr lang="en-US" dirty="0"/>
           </a:p>
@@ -3937,7 +4286,7 @@
           <a:p>
             <a:fld id="{48A87A34-81AB-432B-8DAE-1953F412C126}" type="datetimeFigureOut">
               <a:rPr lang="en-US" smtClean="0"/>
-              <a:t>4/1/2017</a:t>
+              <a:t>4/2/2017</a:t>
             </a:fld>
             <a:endParaRPr lang="en-US" dirty="0"/>
           </a:p>
@@ -4107,7 +4456,7 @@
           <a:p>
             <a:fld id="{48A87A34-81AB-432B-8DAE-1953F412C126}" type="datetimeFigureOut">
               <a:rPr lang="en-US" smtClean="0"/>
-              <a:t>4/1/2017</a:t>
+              <a:t>4/2/2017</a:t>
             </a:fld>
             <a:endParaRPr lang="en-US" dirty="0"/>
           </a:p>
@@ -4354,7 +4703,7 @@
           <a:p>
             <a:fld id="{48A87A34-81AB-432B-8DAE-1953F412C126}" type="datetimeFigureOut">
               <a:rPr lang="en-US" smtClean="0"/>
-              <a:t>4/1/2017</a:t>
+              <a:t>4/2/2017</a:t>
             </a:fld>
             <a:endParaRPr lang="en-US" dirty="0"/>
           </a:p>
@@ -4646,7 +4995,7 @@
           <a:p>
             <a:fld id="{48A87A34-81AB-432B-8DAE-1953F412C126}" type="datetimeFigureOut">
               <a:rPr lang="en-US" smtClean="0"/>
-              <a:t>4/1/2017</a:t>
+              <a:t>4/2/2017</a:t>
             </a:fld>
             <a:endParaRPr lang="en-US" dirty="0"/>
           </a:p>
@@ -5090,7 +5439,7 @@
           <a:p>
             <a:fld id="{48A87A34-81AB-432B-8DAE-1953F412C126}" type="datetimeFigureOut">
               <a:rPr lang="en-US" smtClean="0"/>
-              <a:t>4/1/2017</a:t>
+              <a:t>4/2/2017</a:t>
             </a:fld>
             <a:endParaRPr lang="en-US" dirty="0"/>
           </a:p>
@@ -5208,7 +5557,7 @@
           <a:p>
             <a:fld id="{48A87A34-81AB-432B-8DAE-1953F412C126}" type="datetimeFigureOut">
               <a:rPr lang="en-US" smtClean="0"/>
-              <a:t>4/1/2017</a:t>
+              <a:t>4/2/2017</a:t>
             </a:fld>
             <a:endParaRPr lang="en-US" dirty="0"/>
           </a:p>
@@ -5303,7 +5652,7 @@
           <a:p>
             <a:fld id="{48A87A34-81AB-432B-8DAE-1953F412C126}" type="datetimeFigureOut">
               <a:rPr lang="en-US" smtClean="0"/>
-              <a:t>4/1/2017</a:t>
+              <a:t>4/2/2017</a:t>
             </a:fld>
             <a:endParaRPr lang="en-US" dirty="0"/>
           </a:p>
@@ -5582,7 +5931,7 @@
           <a:p>
             <a:fld id="{48A87A34-81AB-432B-8DAE-1953F412C126}" type="datetimeFigureOut">
               <a:rPr lang="en-US" smtClean="0"/>
-              <a:t>4/1/2017</a:t>
+              <a:t>4/2/2017</a:t>
             </a:fld>
             <a:endParaRPr lang="en-US" dirty="0"/>
           </a:p>
@@ -5857,7 +6206,7 @@
           <a:p>
             <a:fld id="{48A87A34-81AB-432B-8DAE-1953F412C126}" type="datetimeFigureOut">
               <a:rPr lang="en-US" smtClean="0"/>
-              <a:t>4/1/2017</a:t>
+              <a:t>4/2/2017</a:t>
             </a:fld>
             <a:endParaRPr lang="en-US" dirty="0"/>
           </a:p>
@@ -6287,7 +6636,7 @@
             <a:fld id="{48A87A34-81AB-432B-8DAE-1953F412C126}" type="datetimeFigureOut">
               <a:rPr lang="en-US" smtClean="0"/>
               <a:pPr/>
-              <a:t>4/1/2017</a:t>
+              <a:t>4/2/2017</a:t>
             </a:fld>
             <a:endParaRPr lang="en-US" dirty="0"/>
           </a:p>
@@ -9484,7 +9833,7 @@
           </p:nvPr>
         </p:nvPicPr>
         <p:blipFill>
-          <a:blip r:embed="rId2"/>
+          <a:blip r:embed="rId3"/>
           <a:stretch>
             <a:fillRect/>
           </a:stretch>
@@ -9662,7 +10011,7 @@
           </p:nvPr>
         </p:nvPicPr>
         <p:blipFill rotWithShape="1">
-          <a:blip r:embed="rId2"/>
+          <a:blip r:embed="rId3"/>
           <a:srcRect l="30347" r="29127"/>
           <a:stretch/>
         </p:blipFill>
@@ -9842,7 +10191,7 @@
           </p:nvPr>
         </p:nvPicPr>
         <p:blipFill>
-          <a:blip r:embed="rId2">
+          <a:blip r:embed="rId3">
             <a:extLst>
               <a:ext uri="{28A0092B-C50C-407E-A947-70E740481C1C}">
                 <a14:useLocalDpi xmlns:a14="http://schemas.microsoft.com/office/drawing/2010/main" val="0"/>

</xml_diff>